<commit_message>
add images of past grouping work
</commit_message>
<xml_diff>
--- a/toolkit/job-analysis/job-analysis-presentation.pptx
+++ b/toolkit/job-analysis/job-analysis-presentation.pptx
@@ -5,10 +5,10 @@
     <p:sldMasterId id="2147483666" r:id="rId1"/>
   </p:sldMasterIdLst>
   <p:notesMasterIdLst>
-    <p:notesMasterId r:id="rId30"/>
+    <p:notesMasterId r:id="rId32"/>
   </p:notesMasterIdLst>
   <p:handoutMasterIdLst>
-    <p:handoutMasterId r:id="rId31"/>
+    <p:handoutMasterId r:id="rId33"/>
   </p:handoutMasterIdLst>
   <p:sldIdLst>
     <p:sldId id="256" r:id="rId2"/>
@@ -17,76 +17,78 @@
     <p:sldId id="257" r:id="rId5"/>
     <p:sldId id="261" r:id="rId6"/>
     <p:sldId id="347" r:id="rId7"/>
-    <p:sldId id="363" r:id="rId8"/>
+    <p:sldId id="364" r:id="rId8"/>
     <p:sldId id="323" r:id="rId9"/>
-    <p:sldId id="324" r:id="rId10"/>
-    <p:sldId id="327" r:id="rId11"/>
-    <p:sldId id="348" r:id="rId12"/>
-    <p:sldId id="329" r:id="rId13"/>
-    <p:sldId id="331" r:id="rId14"/>
-    <p:sldId id="291" r:id="rId15"/>
-    <p:sldId id="349" r:id="rId16"/>
-    <p:sldId id="350" r:id="rId17"/>
-    <p:sldId id="353" r:id="rId18"/>
-    <p:sldId id="354" r:id="rId19"/>
-    <p:sldId id="356" r:id="rId20"/>
-    <p:sldId id="357" r:id="rId21"/>
-    <p:sldId id="358" r:id="rId22"/>
-    <p:sldId id="359" r:id="rId23"/>
-    <p:sldId id="360" r:id="rId24"/>
-    <p:sldId id="361" r:id="rId25"/>
-    <p:sldId id="345" r:id="rId26"/>
-    <p:sldId id="355" r:id="rId27"/>
-    <p:sldId id="341" r:id="rId28"/>
-    <p:sldId id="362" r:id="rId29"/>
+    <p:sldId id="363" r:id="rId10"/>
+    <p:sldId id="365" r:id="rId11"/>
+    <p:sldId id="324" r:id="rId12"/>
+    <p:sldId id="327" r:id="rId13"/>
+    <p:sldId id="348" r:id="rId14"/>
+    <p:sldId id="329" r:id="rId15"/>
+    <p:sldId id="331" r:id="rId16"/>
+    <p:sldId id="291" r:id="rId17"/>
+    <p:sldId id="349" r:id="rId18"/>
+    <p:sldId id="350" r:id="rId19"/>
+    <p:sldId id="353" r:id="rId20"/>
+    <p:sldId id="354" r:id="rId21"/>
+    <p:sldId id="356" r:id="rId22"/>
+    <p:sldId id="357" r:id="rId23"/>
+    <p:sldId id="358" r:id="rId24"/>
+    <p:sldId id="359" r:id="rId25"/>
+    <p:sldId id="360" r:id="rId26"/>
+    <p:sldId id="361" r:id="rId27"/>
+    <p:sldId id="345" r:id="rId28"/>
+    <p:sldId id="355" r:id="rId29"/>
+    <p:sldId id="341" r:id="rId30"/>
+    <p:sldId id="362" r:id="rId31"/>
   </p:sldIdLst>
   <p:sldSz cx="17340263" cy="9753600"/>
   <p:notesSz cx="6881813" cy="9296400"/>
   <p:embeddedFontLst>
     <p:embeddedFont>
       <p:font typeface="Avenir" panose="02000503020000020003" pitchFamily="2" charset="0"/>
-      <p:regular r:id="rId32"/>
-      <p:italic r:id="rId33"/>
+      <p:regular r:id="rId34"/>
+      <p:italic r:id="rId35"/>
     </p:embeddedFont>
     <p:embeddedFont>
       <p:font typeface="Cambria" panose="02040503050406030204" pitchFamily="18" charset="0"/>
-      <p:regular r:id="rId34"/>
-      <p:bold r:id="rId35"/>
-      <p:italic r:id="rId36"/>
-      <p:boldItalic r:id="rId37"/>
+      <p:regular r:id="rId36"/>
+      <p:bold r:id="rId37"/>
+      <p:italic r:id="rId38"/>
+      <p:boldItalic r:id="rId39"/>
     </p:embeddedFont>
     <p:embeddedFont>
       <p:font typeface="Merriweather" pitchFamily="2" charset="77"/>
-      <p:regular r:id="rId38"/>
-      <p:bold r:id="rId39"/>
-      <p:italic r:id="rId40"/>
-      <p:boldItalic r:id="rId41"/>
+      <p:regular r:id="rId40"/>
+      <p:bold r:id="rId41"/>
+      <p:italic r:id="rId42"/>
+      <p:boldItalic r:id="rId43"/>
     </p:embeddedFont>
     <p:embeddedFont>
       <p:font typeface="Merriweather Sans" pitchFamily="2" charset="77"/>
-      <p:regular r:id="rId42"/>
-      <p:bold r:id="rId43"/>
-      <p:italic r:id="rId44"/>
-      <p:boldItalic r:id="rId45"/>
+      <p:regular r:id="rId44"/>
+      <p:bold r:id="rId45"/>
+      <p:italic r:id="rId46"/>
+      <p:boldItalic r:id="rId47"/>
     </p:embeddedFont>
     <p:embeddedFont>
       <p:font typeface="Rockwell" panose="02060603020205020403" pitchFamily="18" charset="77"/>
-      <p:regular r:id="rId46"/>
-      <p:bold r:id="rId47"/>
-      <p:italic r:id="rId48"/>
-      <p:boldItalic r:id="rId49"/>
+      <p:regular r:id="rId48"/>
+      <p:bold r:id="rId49"/>
+      <p:italic r:id="rId50"/>
+      <p:boldItalic r:id="rId51"/>
     </p:embeddedFont>
     <p:embeddedFont>
       <p:font typeface="Source Sans Pro" panose="020B0503030403020204" pitchFamily="34" charset="0"/>
-      <p:regular r:id="rId50"/>
-      <p:bold r:id="rId51"/>
-      <p:italic r:id="rId52"/>
-      <p:boldItalic r:id="rId53"/>
+      <p:regular r:id="rId52"/>
+      <p:bold r:id="rId53"/>
+      <p:italic r:id="rId54"/>
+      <p:boldItalic r:id="rId55"/>
     </p:embeddedFont>
     <p:embeddedFont>
       <p:font typeface="Source Sans Pro SemiBold" panose="020B0603030403020204" pitchFamily="34" charset="0"/>
-      <p:bold r:id="rId54"/>
-      <p:boldItalic r:id="rId55"/>
+      <p:bold r:id="rId56"/>
+      <p:boldItalic r:id="rId57"/>
     </p:embeddedFont>
   </p:embeddedFontLst>
   <p:defaultTextStyle>
@@ -1272,14 +1274,6 @@
           <a:bodyPr/>
           <a:lstStyle/>
           <a:p>
-            <a:r>
-              <a:rPr lang="en-US" dirty="0"/>
-              <a:t>Note to facilitator:</a:t>
-            </a:r>
-            <a:r>
-              <a:rPr lang="en-US" baseline="0" dirty="0"/>
-              <a:t> To save time, divide the room in half and have half the participants do half the competencies per group. The levels should built upon each other. They should be as succinct as possible.</a:t>
-            </a:r>
             <a:endParaRPr lang="en-US" dirty="0"/>
           </a:p>
         </p:txBody>
@@ -1287,7 +1281,7 @@
     </p:spTree>
     <p:extLst>
       <p:ext uri="{BB962C8B-B14F-4D97-AF65-F5344CB8AC3E}">
-        <p14:creationId xmlns:p14="http://schemas.microsoft.com/office/powerpoint/2010/main" val="3067309723"/>
+        <p14:creationId xmlns:p14="http://schemas.microsoft.com/office/powerpoint/2010/main" val="627141534"/>
       </p:ext>
     </p:extLst>
   </p:cSld>
@@ -1341,6 +1335,180 @@
           <a:bodyPr/>
           <a:lstStyle/>
           <a:p>
+            <a:endParaRPr lang="en-US" dirty="0"/>
+          </a:p>
+          <a:p>
+            <a:r>
+              <a:rPr lang="en-US" sz="2200" b="0" i="0" u="none" strike="noStrike" cap="none" dirty="0">
+                <a:solidFill>
+                  <a:srgbClr val="000000"/>
+                </a:solidFill>
+                <a:effectLst/>
+                <a:latin typeface="Merriweather Sans"/>
+                <a:ea typeface="Merriweather Sans"/>
+                <a:cs typeface="Merriweather Sans"/>
+                <a:sym typeface="Merriweather Sans"/>
+              </a:rPr>
+              <a:t>DO NOT require agency-specific certifications, technologies, etc. that aren’t common in the private sector. </a:t>
+            </a:r>
+          </a:p>
+          <a:p>
+            <a:endParaRPr lang="en-US" sz="2200" b="0" i="0" u="none" strike="noStrike" cap="none" dirty="0">
+              <a:solidFill>
+                <a:srgbClr val="000000"/>
+              </a:solidFill>
+              <a:effectLst/>
+              <a:latin typeface="Merriweather Sans"/>
+              <a:ea typeface="Merriweather Sans"/>
+              <a:cs typeface="Merriweather Sans"/>
+              <a:sym typeface="Merriweather Sans"/>
+            </a:endParaRPr>
+          </a:p>
+          <a:p>
+            <a:r>
+              <a:rPr lang="en-US" sz="2200" b="0" i="0" u="none" strike="noStrike" cap="none" dirty="0">
+                <a:solidFill>
+                  <a:srgbClr val="000000"/>
+                </a:solidFill>
+                <a:effectLst/>
+                <a:latin typeface="Merriweather Sans"/>
+                <a:sym typeface="Merriweather Sans"/>
+              </a:rPr>
+              <a:t>DO NOT require experience with government-only tech, this may exclude private sector applicants who could do the job well</a:t>
+            </a:r>
+            <a:endParaRPr lang="en-US" dirty="0"/>
+          </a:p>
+          <a:p>
+            <a:endParaRPr lang="en-US" dirty="0"/>
+          </a:p>
+        </p:txBody>
+      </p:sp>
+    </p:spTree>
+    <p:extLst>
+      <p:ext uri="{BB962C8B-B14F-4D97-AF65-F5344CB8AC3E}">
+        <p14:creationId xmlns:p14="http://schemas.microsoft.com/office/powerpoint/2010/main" val="4230347775"/>
+      </p:ext>
+    </p:extLst>
+  </p:cSld>
+  <p:clrMapOvr>
+    <a:masterClrMapping/>
+  </p:clrMapOvr>
+</p:notes>
+</file>
+
+<file path=ppt/notesSlides/notesSlide12.xml><?xml version="1.0" encoding="utf-8"?>
+<p:notes xmlns:a="http://schemas.openxmlformats.org/drawingml/2006/main" xmlns:r="http://schemas.openxmlformats.org/officeDocument/2006/relationships" xmlns:p="http://schemas.openxmlformats.org/presentationml/2006/main">
+  <p:cSld>
+    <p:spTree>
+      <p:nvGrpSpPr>
+        <p:cNvPr id="1" name=""/>
+        <p:cNvGrpSpPr/>
+        <p:nvPr/>
+      </p:nvGrpSpPr>
+      <p:grpSpPr>
+        <a:xfrm>
+          <a:off x="0" y="0"/>
+          <a:ext cx="0" cy="0"/>
+          <a:chOff x="0" y="0"/>
+          <a:chExt cx="0" cy="0"/>
+        </a:xfrm>
+      </p:grpSpPr>
+      <p:sp>
+        <p:nvSpPr>
+          <p:cNvPr id="2" name="Slide Image Placeholder 1"/>
+          <p:cNvSpPr>
+            <a:spLocks noGrp="1" noRot="1" noChangeAspect="1"/>
+          </p:cNvSpPr>
+          <p:nvPr>
+            <p:ph type="sldImg"/>
+          </p:nvPr>
+        </p:nvSpPr>
+        <p:spPr/>
+      </p:sp>
+      <p:sp>
+        <p:nvSpPr>
+          <p:cNvPr id="3" name="Notes Placeholder 2"/>
+          <p:cNvSpPr>
+            <a:spLocks noGrp="1"/>
+          </p:cNvSpPr>
+          <p:nvPr>
+            <p:ph type="body" idx="1"/>
+          </p:nvPr>
+        </p:nvSpPr>
+        <p:spPr/>
+        <p:txBody>
+          <a:bodyPr/>
+          <a:lstStyle/>
+          <a:p>
+            <a:r>
+              <a:rPr lang="en-US" dirty="0"/>
+              <a:t>Note to facilitator:</a:t>
+            </a:r>
+            <a:r>
+              <a:rPr lang="en-US" baseline="0" dirty="0"/>
+              <a:t> To save time, divide the room in half and have half the participants do half the competencies per group. The levels should built upon each other. They should be as succinct as possible.</a:t>
+            </a:r>
+            <a:endParaRPr lang="en-US" dirty="0"/>
+          </a:p>
+        </p:txBody>
+      </p:sp>
+    </p:spTree>
+    <p:extLst>
+      <p:ext uri="{BB962C8B-B14F-4D97-AF65-F5344CB8AC3E}">
+        <p14:creationId xmlns:p14="http://schemas.microsoft.com/office/powerpoint/2010/main" val="3067309723"/>
+      </p:ext>
+    </p:extLst>
+  </p:cSld>
+  <p:clrMapOvr>
+    <a:masterClrMapping/>
+  </p:clrMapOvr>
+</p:notes>
+</file>
+
+<file path=ppt/notesSlides/notesSlide13.xml><?xml version="1.0" encoding="utf-8"?>
+<p:notes xmlns:a="http://schemas.openxmlformats.org/drawingml/2006/main" xmlns:r="http://schemas.openxmlformats.org/officeDocument/2006/relationships" xmlns:p="http://schemas.openxmlformats.org/presentationml/2006/main">
+  <p:cSld>
+    <p:spTree>
+      <p:nvGrpSpPr>
+        <p:cNvPr id="1" name=""/>
+        <p:cNvGrpSpPr/>
+        <p:nvPr/>
+      </p:nvGrpSpPr>
+      <p:grpSpPr>
+        <a:xfrm>
+          <a:off x="0" y="0"/>
+          <a:ext cx="0" cy="0"/>
+          <a:chOff x="0" y="0"/>
+          <a:chExt cx="0" cy="0"/>
+        </a:xfrm>
+      </p:grpSpPr>
+      <p:sp>
+        <p:nvSpPr>
+          <p:cNvPr id="2" name="Slide Image Placeholder 1"/>
+          <p:cNvSpPr>
+            <a:spLocks noGrp="1" noRot="1" noChangeAspect="1"/>
+          </p:cNvSpPr>
+          <p:nvPr>
+            <p:ph type="sldImg"/>
+          </p:nvPr>
+        </p:nvSpPr>
+        <p:spPr/>
+      </p:sp>
+      <p:sp>
+        <p:nvSpPr>
+          <p:cNvPr id="3" name="Notes Placeholder 2"/>
+          <p:cNvSpPr>
+            <a:spLocks noGrp="1"/>
+          </p:cNvSpPr>
+          <p:nvPr>
+            <p:ph type="body" idx="1"/>
+          </p:nvPr>
+        </p:nvSpPr>
+        <p:spPr/>
+        <p:txBody>
+          <a:bodyPr/>
+          <a:lstStyle/>
+          <a:p>
             <a:pPr marL="457200" marR="0" lvl="0" indent="-228600" algn="l" defTabSz="914400" rtl="0" eaLnBrk="1" fontAlgn="auto" latinLnBrk="0" hangingPunct="1">
               <a:lnSpc>
                 <a:spcPct val="100000"/>
@@ -1388,7 +1556,7 @@
 </p:notes>
 </file>
 
-<file path=ppt/notesSlides/notesSlide12.xml><?xml version="1.0" encoding="utf-8"?>
+<file path=ppt/notesSlides/notesSlide14.xml><?xml version="1.0" encoding="utf-8"?>
 <p:notes xmlns:a="http://schemas.openxmlformats.org/drawingml/2006/main" xmlns:r="http://schemas.openxmlformats.org/officeDocument/2006/relationships" xmlns:p="http://schemas.openxmlformats.org/presentationml/2006/main" showMasterSp="0" showMasterPhAnim="0">
   <p:cSld>
     <p:spTree>
@@ -1504,7 +1672,7 @@
 </p:notes>
 </file>
 
-<file path=ppt/notesSlides/notesSlide13.xml><?xml version="1.0" encoding="utf-8"?>
+<file path=ppt/notesSlides/notesSlide15.xml><?xml version="1.0" encoding="utf-8"?>
 <p:notes xmlns:a="http://schemas.openxmlformats.org/drawingml/2006/main" xmlns:r="http://schemas.openxmlformats.org/officeDocument/2006/relationships" xmlns:p="http://schemas.openxmlformats.org/presentationml/2006/main">
   <p:cSld>
     <p:spTree>
@@ -1565,7 +1733,7 @@
 </p:notes>
 </file>
 
-<file path=ppt/notesSlides/notesSlide14.xml><?xml version="1.0" encoding="utf-8"?>
+<file path=ppt/notesSlides/notesSlide16.xml><?xml version="1.0" encoding="utf-8"?>
 <p:notes xmlns:a="http://schemas.openxmlformats.org/drawingml/2006/main" xmlns:r="http://schemas.openxmlformats.org/officeDocument/2006/relationships" xmlns:p="http://schemas.openxmlformats.org/presentationml/2006/main" showMasterSp="0" showMasterPhAnim="0">
   <p:cSld>
     <p:spTree>
@@ -1686,7 +1854,7 @@
 </p:notes>
 </file>
 
-<file path=ppt/notesSlides/notesSlide15.xml><?xml version="1.0" encoding="utf-8"?>
+<file path=ppt/notesSlides/notesSlide17.xml><?xml version="1.0" encoding="utf-8"?>
 <p:notes xmlns:a="http://schemas.openxmlformats.org/drawingml/2006/main" xmlns:r="http://schemas.openxmlformats.org/officeDocument/2006/relationships" xmlns:p="http://schemas.openxmlformats.org/presentationml/2006/main" showMasterSp="0" showMasterPhAnim="0">
   <p:cSld>
     <p:spTree>
@@ -1807,167 +1975,6 @@
 </p:notes>
 </file>
 
-<file path=ppt/notesSlides/notesSlide16.xml><?xml version="1.0" encoding="utf-8"?>
-<p:notes xmlns:a="http://schemas.openxmlformats.org/drawingml/2006/main" xmlns:r="http://schemas.openxmlformats.org/officeDocument/2006/relationships" xmlns:p="http://schemas.openxmlformats.org/presentationml/2006/main">
-  <p:cSld>
-    <p:spTree>
-      <p:nvGrpSpPr>
-        <p:cNvPr id="1" name=""/>
-        <p:cNvGrpSpPr/>
-        <p:nvPr/>
-      </p:nvGrpSpPr>
-      <p:grpSpPr>
-        <a:xfrm>
-          <a:off x="0" y="0"/>
-          <a:ext cx="0" cy="0"/>
-          <a:chOff x="0" y="0"/>
-          <a:chExt cx="0" cy="0"/>
-        </a:xfrm>
-      </p:grpSpPr>
-      <p:sp>
-        <p:nvSpPr>
-          <p:cNvPr id="2" name="Slide Image Placeholder 1"/>
-          <p:cNvSpPr>
-            <a:spLocks noGrp="1" noRot="1" noChangeAspect="1"/>
-          </p:cNvSpPr>
-          <p:nvPr>
-            <p:ph type="sldImg"/>
-          </p:nvPr>
-        </p:nvSpPr>
-        <p:spPr/>
-      </p:sp>
-      <p:sp>
-        <p:nvSpPr>
-          <p:cNvPr id="3" name="Notes Placeholder 2"/>
-          <p:cNvSpPr>
-            <a:spLocks noGrp="1"/>
-          </p:cNvSpPr>
-          <p:nvPr>
-            <p:ph type="body" idx="1"/>
-          </p:nvPr>
-        </p:nvSpPr>
-        <p:spPr/>
-        <p:txBody>
-          <a:bodyPr/>
-          <a:lstStyle/>
-          <a:p>
-            <a:r>
-              <a:rPr lang="en-US" dirty="0"/>
-              <a:t>Use 4-5 sample resumes you prepared ahead of time</a:t>
-            </a:r>
-          </a:p>
-          <a:p>
-            <a:endParaRPr lang="en-US" dirty="0"/>
-          </a:p>
-          <a:p>
-            <a:r>
-              <a:rPr lang="en-US" dirty="0"/>
-              <a:t>Take 1 hour to try to use competencies to do resume review</a:t>
-            </a:r>
-          </a:p>
-          <a:p>
-            <a:endParaRPr lang="en-US" dirty="0"/>
-          </a:p>
-          <a:p>
-            <a:r>
-              <a:rPr lang="en-US" dirty="0"/>
-              <a:t>It’s OK to decide not all competencies are required to appear in a resume, but this must be decided ahead of time in the assessment strategy</a:t>
-            </a:r>
-          </a:p>
-          <a:p>
-            <a:endParaRPr lang="en-US" dirty="0"/>
-          </a:p>
-          <a:p>
-            <a:r>
-              <a:rPr lang="en-US" dirty="0"/>
-              <a:t>Figure out how many pages of job experience is sufficient to make a determination</a:t>
-            </a:r>
-          </a:p>
-          <a:p>
-            <a:endParaRPr lang="en-US" dirty="0"/>
-          </a:p>
-          <a:p>
-            <a:r>
-              <a:rPr lang="en-US" dirty="0"/>
-              <a:t>Play close attention to the discussion about proficiency level required for each competency – this will be needed in a later step</a:t>
-            </a:r>
-          </a:p>
-        </p:txBody>
-      </p:sp>
-    </p:spTree>
-    <p:extLst>
-      <p:ext uri="{BB962C8B-B14F-4D97-AF65-F5344CB8AC3E}">
-        <p14:creationId xmlns:p14="http://schemas.microsoft.com/office/powerpoint/2010/main" val="3624751010"/>
-      </p:ext>
-    </p:extLst>
-  </p:cSld>
-  <p:clrMapOvr>
-    <a:masterClrMapping/>
-  </p:clrMapOvr>
-</p:notes>
-</file>
-
-<file path=ppt/notesSlides/notesSlide17.xml><?xml version="1.0" encoding="utf-8"?>
-<p:notes xmlns:a="http://schemas.openxmlformats.org/drawingml/2006/main" xmlns:r="http://schemas.openxmlformats.org/officeDocument/2006/relationships" xmlns:p="http://schemas.openxmlformats.org/presentationml/2006/main">
-  <p:cSld>
-    <p:spTree>
-      <p:nvGrpSpPr>
-        <p:cNvPr id="1" name=""/>
-        <p:cNvGrpSpPr/>
-        <p:nvPr/>
-      </p:nvGrpSpPr>
-      <p:grpSpPr>
-        <a:xfrm>
-          <a:off x="0" y="0"/>
-          <a:ext cx="0" cy="0"/>
-          <a:chOff x="0" y="0"/>
-          <a:chExt cx="0" cy="0"/>
-        </a:xfrm>
-      </p:grpSpPr>
-      <p:sp>
-        <p:nvSpPr>
-          <p:cNvPr id="2" name="Slide Image Placeholder 1"/>
-          <p:cNvSpPr>
-            <a:spLocks noGrp="1" noRot="1" noChangeAspect="1"/>
-          </p:cNvSpPr>
-          <p:nvPr>
-            <p:ph type="sldImg"/>
-          </p:nvPr>
-        </p:nvSpPr>
-        <p:spPr/>
-      </p:sp>
-      <p:sp>
-        <p:nvSpPr>
-          <p:cNvPr id="3" name="Notes Placeholder 2"/>
-          <p:cNvSpPr>
-            <a:spLocks noGrp="1"/>
-          </p:cNvSpPr>
-          <p:nvPr>
-            <p:ph type="body" idx="1"/>
-          </p:nvPr>
-        </p:nvSpPr>
-        <p:spPr/>
-        <p:txBody>
-          <a:bodyPr/>
-          <a:lstStyle/>
-          <a:p>
-            <a:endParaRPr lang="en-US" dirty="0"/>
-          </a:p>
-        </p:txBody>
-      </p:sp>
-    </p:spTree>
-    <p:extLst>
-      <p:ext uri="{BB962C8B-B14F-4D97-AF65-F5344CB8AC3E}">
-        <p14:creationId xmlns:p14="http://schemas.microsoft.com/office/powerpoint/2010/main" val="18592764"/>
-      </p:ext>
-    </p:extLst>
-  </p:cSld>
-  <p:clrMapOvr>
-    <a:masterClrMapping/>
-  </p:clrMapOvr>
-</p:notes>
-</file>
-
 <file path=ppt/notesSlides/notesSlide18.xml><?xml version="1.0" encoding="utf-8"?>
 <p:notes xmlns:a="http://schemas.openxmlformats.org/drawingml/2006/main" xmlns:r="http://schemas.openxmlformats.org/officeDocument/2006/relationships" xmlns:p="http://schemas.openxmlformats.org/presentationml/2006/main">
   <p:cSld>
@@ -2012,133 +2019,53 @@
           <a:bodyPr/>
           <a:lstStyle/>
           <a:p>
-            <a:pPr lvl="0"/>
-            <a:r>
-              <a:rPr lang="en-US" sz="2200" b="0" i="0" u="none" strike="noStrike" cap="none" dirty="0">
-                <a:solidFill>
-                  <a:srgbClr val="000000"/>
-                </a:solidFill>
-                <a:effectLst/>
-                <a:latin typeface="Merriweather Sans"/>
-                <a:ea typeface="Merriweather Sans"/>
-                <a:cs typeface="Merriweather Sans"/>
-                <a:sym typeface="Merriweather Sans"/>
-              </a:rPr>
-              <a:t>Trying to discover applicant’s ability to apply their experience in a new situation</a:t>
-            </a:r>
-          </a:p>
-          <a:p>
-            <a:pPr lvl="0"/>
-            <a:r>
-              <a:rPr lang="en-US" sz="2200" b="0" i="0" u="none" strike="noStrike" cap="none" dirty="0">
-                <a:solidFill>
-                  <a:srgbClr val="000000"/>
-                </a:solidFill>
-                <a:effectLst/>
-                <a:latin typeface="Merriweather Sans"/>
-                <a:ea typeface="Merriweather Sans"/>
-                <a:cs typeface="Merriweather Sans"/>
-                <a:sym typeface="Merriweather Sans"/>
-              </a:rPr>
-              <a:t>“and can you give an example of when you did this in the past”</a:t>
-            </a:r>
-          </a:p>
-          <a:p>
-            <a:pPr lvl="0"/>
-            <a:endParaRPr lang="en-US" sz="2200" b="0" i="0" u="none" strike="noStrike" cap="none" dirty="0">
-              <a:solidFill>
-                <a:srgbClr val="000000"/>
-              </a:solidFill>
-              <a:effectLst/>
-              <a:latin typeface="Merriweather Sans"/>
-              <a:ea typeface="Merriweather Sans"/>
-              <a:cs typeface="Merriweather Sans"/>
-              <a:sym typeface="Merriweather Sans"/>
-            </a:endParaRPr>
-          </a:p>
-          <a:p>
-            <a:pPr lvl="0"/>
-            <a:r>
-              <a:rPr lang="en-US" sz="2200" b="0" i="0" u="none" strike="noStrike" cap="none" dirty="0">
-                <a:solidFill>
-                  <a:srgbClr val="000000"/>
-                </a:solidFill>
-                <a:effectLst/>
-                <a:latin typeface="Merriweather Sans"/>
-                <a:ea typeface="Merriweather Sans"/>
-                <a:cs typeface="Merriweather Sans"/>
-                <a:sym typeface="Merriweather Sans"/>
-              </a:rPr>
-              <a:t>Be intentional about the kinds of questions there can be</a:t>
-            </a:r>
-          </a:p>
-          <a:p>
-            <a:pPr lvl="0"/>
-            <a:endParaRPr lang="en-US" sz="2200" b="0" i="0" u="none" strike="noStrike" cap="none" dirty="0">
-              <a:solidFill>
-                <a:srgbClr val="000000"/>
-              </a:solidFill>
-              <a:effectLst/>
-              <a:latin typeface="Merriweather Sans"/>
-              <a:ea typeface="Merriweather Sans"/>
-              <a:cs typeface="Merriweather Sans"/>
-              <a:sym typeface="Merriweather Sans"/>
-            </a:endParaRPr>
-          </a:p>
-          <a:p>
-            <a:pPr lvl="0"/>
-            <a:r>
-              <a:rPr lang="en-US" sz="2200" b="0" i="0" u="none" strike="noStrike" cap="none" dirty="0">
-                <a:solidFill>
-                  <a:srgbClr val="000000"/>
-                </a:solidFill>
-                <a:effectLst/>
-                <a:latin typeface="Merriweather Sans"/>
-                <a:ea typeface="Merriweather Sans"/>
-                <a:cs typeface="Merriweather Sans"/>
-                <a:sym typeface="Merriweather Sans"/>
-              </a:rPr>
-              <a:t>Wording of the hypothetical questions is very tricky – it can be confusing to the applicants, difficult to “set the scene” so it makes sense for them</a:t>
-            </a:r>
-          </a:p>
-          <a:p>
-            <a:pPr lvl="0"/>
-            <a:endParaRPr lang="en-US" sz="2200" b="0" i="0" u="none" strike="noStrike" cap="none" dirty="0">
-              <a:solidFill>
-                <a:srgbClr val="000000"/>
-              </a:solidFill>
-              <a:effectLst/>
-              <a:latin typeface="Merriweather Sans"/>
-              <a:ea typeface="Merriweather Sans"/>
-              <a:cs typeface="Merriweather Sans"/>
-              <a:sym typeface="Merriweather Sans"/>
-            </a:endParaRPr>
-          </a:p>
-          <a:p>
-            <a:pPr lvl="0"/>
-            <a:r>
-              <a:rPr lang="en-US" sz="2200" b="0" i="0" u="none" strike="noStrike" cap="none" dirty="0">
-                <a:solidFill>
-                  <a:srgbClr val="000000"/>
-                </a:solidFill>
-                <a:effectLst/>
-                <a:latin typeface="Merriweather Sans"/>
-                <a:ea typeface="Merriweather Sans"/>
-                <a:cs typeface="Merriweather Sans"/>
-                <a:sym typeface="Merriweather Sans"/>
-              </a:rPr>
-              <a:t>Strike the balance between the two question types</a:t>
+            <a:r>
+              <a:rPr lang="en-US" dirty="0"/>
+              <a:t>Use 4-5 sample resumes you prepared ahead of time</a:t>
             </a:r>
           </a:p>
           <a:p>
             <a:endParaRPr lang="en-US" dirty="0"/>
+          </a:p>
+          <a:p>
+            <a:r>
+              <a:rPr lang="en-US" dirty="0"/>
+              <a:t>Take 1 hour to try to use competencies to do resume review</a:t>
+            </a:r>
+          </a:p>
+          <a:p>
+            <a:endParaRPr lang="en-US" dirty="0"/>
+          </a:p>
+          <a:p>
+            <a:r>
+              <a:rPr lang="en-US" dirty="0"/>
+              <a:t>It’s OK to decide not all competencies are required to appear in a resume, but this must be decided ahead of time in the assessment strategy</a:t>
+            </a:r>
+          </a:p>
+          <a:p>
+            <a:endParaRPr lang="en-US" dirty="0"/>
+          </a:p>
+          <a:p>
+            <a:r>
+              <a:rPr lang="en-US" dirty="0"/>
+              <a:t>Figure out how many pages of job experience is sufficient to make a determination</a:t>
+            </a:r>
+          </a:p>
+          <a:p>
+            <a:endParaRPr lang="en-US" dirty="0"/>
+          </a:p>
+          <a:p>
+            <a:r>
+              <a:rPr lang="en-US" dirty="0"/>
+              <a:t>Play close attention to the discussion about proficiency level required for each competency – this will be needed in a later step</a:t>
+            </a:r>
           </a:p>
         </p:txBody>
       </p:sp>
     </p:spTree>
     <p:extLst>
       <p:ext uri="{BB962C8B-B14F-4D97-AF65-F5344CB8AC3E}">
-        <p14:creationId xmlns:p14="http://schemas.microsoft.com/office/powerpoint/2010/main" val="63585316"/>
+        <p14:creationId xmlns:p14="http://schemas.microsoft.com/office/powerpoint/2010/main" val="3624751010"/>
       </p:ext>
     </p:extLst>
   </p:cSld>
@@ -2149,11 +2076,11 @@
 </file>
 
 <file path=ppt/notesSlides/notesSlide19.xml><?xml version="1.0" encoding="utf-8"?>
-<p:notes xmlns:a="http://schemas.openxmlformats.org/drawingml/2006/main" xmlns:r="http://schemas.openxmlformats.org/officeDocument/2006/relationships" xmlns:p="http://schemas.openxmlformats.org/presentationml/2006/main" showMasterSp="0" showMasterPhAnim="0">
+<p:notes xmlns:a="http://schemas.openxmlformats.org/drawingml/2006/main" xmlns:r="http://schemas.openxmlformats.org/officeDocument/2006/relationships" xmlns:p="http://schemas.openxmlformats.org/presentationml/2006/main">
   <p:cSld>
     <p:spTree>
       <p:nvGrpSpPr>
-        <p:cNvPr id="1" name="Shape 304"/>
+        <p:cNvPr id="1" name=""/>
         <p:cNvGrpSpPr/>
         <p:nvPr/>
       </p:nvGrpSpPr>
@@ -2167,99 +2094,39 @@
       </p:grpSpPr>
       <p:sp>
         <p:nvSpPr>
-          <p:cNvPr id="305" name="Google Shape;305;p34:notes"/>
-          <p:cNvSpPr txBox="1">
+          <p:cNvPr id="2" name="Slide Image Placeholder 1"/>
+          <p:cNvSpPr>
+            <a:spLocks noGrp="1" noRot="1" noChangeAspect="1"/>
+          </p:cNvSpPr>
+          <p:nvPr>
+            <p:ph type="sldImg"/>
+          </p:nvPr>
+        </p:nvSpPr>
+        <p:spPr/>
+      </p:sp>
+      <p:sp>
+        <p:nvSpPr>
+          <p:cNvPr id="3" name="Notes Placeholder 2"/>
+          <p:cNvSpPr>
             <a:spLocks noGrp="1"/>
           </p:cNvSpPr>
           <p:nvPr>
             <p:ph type="body" idx="1"/>
           </p:nvPr>
         </p:nvSpPr>
-        <p:spPr>
-          <a:xfrm>
-            <a:off x="917575" y="4415790"/>
-            <a:ext cx="5046663" cy="4183380"/>
-          </a:xfrm>
-          <a:prstGeom prst="rect">
-            <a:avLst/>
-          </a:prstGeom>
-          <a:noFill/>
-          <a:ln>
-            <a:noFill/>
-          </a:ln>
-        </p:spPr>
+        <p:spPr/>
         <p:txBody>
-          <a:bodyPr spcFirstLastPara="1" wrap="square" lIns="92425" tIns="46200" rIns="92425" bIns="46200" anchor="t" anchorCtr="0">
-            <a:noAutofit/>
-          </a:bodyPr>
+          <a:bodyPr/>
           <a:lstStyle/>
           <a:p>
-            <a:pPr marL="0" lvl="0" indent="0" algn="l" rtl="0">
-              <a:lnSpc>
-                <a:spcPct val="100000"/>
-              </a:lnSpc>
-              <a:spcBef>
-                <a:spcPts val="0"/>
-              </a:spcBef>
-              <a:spcAft>
-                <a:spcPts val="0"/>
-              </a:spcAft>
-              <a:buSzPts val="1400"/>
-              <a:buNone/>
-            </a:pPr>
-            <a:endParaRPr/>
+            <a:endParaRPr lang="en-US" dirty="0"/>
           </a:p>
         </p:txBody>
-      </p:sp>
-      <p:sp>
-        <p:nvSpPr>
-          <p:cNvPr id="306" name="Google Shape;306;p34:notes"/>
-          <p:cNvSpPr>
-            <a:spLocks noGrp="1" noRot="1" noChangeAspect="1"/>
-          </p:cNvSpPr>
-          <p:nvPr>
-            <p:ph type="sldImg" idx="2"/>
-          </p:nvPr>
-        </p:nvSpPr>
-        <p:spPr>
-          <a:xfrm>
-            <a:off x="342900" y="696913"/>
-            <a:ext cx="6197600" cy="3486150"/>
-          </a:xfrm>
-          <a:custGeom>
-            <a:avLst/>
-            <a:gdLst/>
-            <a:ahLst/>
-            <a:cxnLst/>
-            <a:rect l="l" t="t" r="r" b="b"/>
-            <a:pathLst>
-              <a:path w="120000" h="120000" extrusionOk="0">
-                <a:moveTo>
-                  <a:pt x="0" y="0"/>
-                </a:moveTo>
-                <a:lnTo>
-                  <a:pt x="120000" y="0"/>
-                </a:lnTo>
-                <a:lnTo>
-                  <a:pt x="120000" y="120000"/>
-                </a:lnTo>
-                <a:lnTo>
-                  <a:pt x="0" y="120000"/>
-                </a:lnTo>
-                <a:close/>
-              </a:path>
-            </a:pathLst>
-          </a:custGeom>
-          <a:noFill/>
-          <a:ln>
-            <a:noFill/>
-          </a:ln>
-        </p:spPr>
       </p:sp>
     </p:spTree>
     <p:extLst>
       <p:ext uri="{BB962C8B-B14F-4D97-AF65-F5344CB8AC3E}">
-        <p14:creationId xmlns:p14="http://schemas.microsoft.com/office/powerpoint/2010/main" val="1352616743"/>
+        <p14:creationId xmlns:p14="http://schemas.microsoft.com/office/powerpoint/2010/main" val="18592764"/>
       </p:ext>
     </p:extLst>
   </p:cSld>
@@ -2324,6 +2191,307 @@
     <p:extLst>
       <p:ext uri="{BB962C8B-B14F-4D97-AF65-F5344CB8AC3E}">
         <p14:creationId xmlns:p14="http://schemas.microsoft.com/office/powerpoint/2010/main" val="501840269"/>
+      </p:ext>
+    </p:extLst>
+  </p:cSld>
+  <p:clrMapOvr>
+    <a:masterClrMapping/>
+  </p:clrMapOvr>
+</p:notes>
+</file>
+
+<file path=ppt/notesSlides/notesSlide20.xml><?xml version="1.0" encoding="utf-8"?>
+<p:notes xmlns:a="http://schemas.openxmlformats.org/drawingml/2006/main" xmlns:r="http://schemas.openxmlformats.org/officeDocument/2006/relationships" xmlns:p="http://schemas.openxmlformats.org/presentationml/2006/main">
+  <p:cSld>
+    <p:spTree>
+      <p:nvGrpSpPr>
+        <p:cNvPr id="1" name=""/>
+        <p:cNvGrpSpPr/>
+        <p:nvPr/>
+      </p:nvGrpSpPr>
+      <p:grpSpPr>
+        <a:xfrm>
+          <a:off x="0" y="0"/>
+          <a:ext cx="0" cy="0"/>
+          <a:chOff x="0" y="0"/>
+          <a:chExt cx="0" cy="0"/>
+        </a:xfrm>
+      </p:grpSpPr>
+      <p:sp>
+        <p:nvSpPr>
+          <p:cNvPr id="2" name="Slide Image Placeholder 1"/>
+          <p:cNvSpPr>
+            <a:spLocks noGrp="1" noRot="1" noChangeAspect="1"/>
+          </p:cNvSpPr>
+          <p:nvPr>
+            <p:ph type="sldImg"/>
+          </p:nvPr>
+        </p:nvSpPr>
+        <p:spPr/>
+      </p:sp>
+      <p:sp>
+        <p:nvSpPr>
+          <p:cNvPr id="3" name="Notes Placeholder 2"/>
+          <p:cNvSpPr>
+            <a:spLocks noGrp="1"/>
+          </p:cNvSpPr>
+          <p:nvPr>
+            <p:ph type="body" idx="1"/>
+          </p:nvPr>
+        </p:nvSpPr>
+        <p:spPr/>
+        <p:txBody>
+          <a:bodyPr/>
+          <a:lstStyle/>
+          <a:p>
+            <a:pPr lvl="0"/>
+            <a:r>
+              <a:rPr lang="en-US" sz="2200" b="0" i="0" u="none" strike="noStrike" cap="none" dirty="0">
+                <a:solidFill>
+                  <a:srgbClr val="000000"/>
+                </a:solidFill>
+                <a:effectLst/>
+                <a:latin typeface="Merriweather Sans"/>
+                <a:ea typeface="Merriweather Sans"/>
+                <a:cs typeface="Merriweather Sans"/>
+                <a:sym typeface="Merriweather Sans"/>
+              </a:rPr>
+              <a:t>Trying to discover applicant’s ability to apply their experience in a new situation</a:t>
+            </a:r>
+          </a:p>
+          <a:p>
+            <a:pPr lvl="0"/>
+            <a:r>
+              <a:rPr lang="en-US" sz="2200" b="0" i="0" u="none" strike="noStrike" cap="none" dirty="0">
+                <a:solidFill>
+                  <a:srgbClr val="000000"/>
+                </a:solidFill>
+                <a:effectLst/>
+                <a:latin typeface="Merriweather Sans"/>
+                <a:ea typeface="Merriweather Sans"/>
+                <a:cs typeface="Merriweather Sans"/>
+                <a:sym typeface="Merriweather Sans"/>
+              </a:rPr>
+              <a:t>“and can you give an example of when you did this in the past”</a:t>
+            </a:r>
+          </a:p>
+          <a:p>
+            <a:pPr lvl="0"/>
+            <a:endParaRPr lang="en-US" sz="2200" b="0" i="0" u="none" strike="noStrike" cap="none" dirty="0">
+              <a:solidFill>
+                <a:srgbClr val="000000"/>
+              </a:solidFill>
+              <a:effectLst/>
+              <a:latin typeface="Merriweather Sans"/>
+              <a:ea typeface="Merriweather Sans"/>
+              <a:cs typeface="Merriweather Sans"/>
+              <a:sym typeface="Merriweather Sans"/>
+            </a:endParaRPr>
+          </a:p>
+          <a:p>
+            <a:pPr lvl="0"/>
+            <a:r>
+              <a:rPr lang="en-US" sz="2200" b="0" i="0" u="none" strike="noStrike" cap="none" dirty="0">
+                <a:solidFill>
+                  <a:srgbClr val="000000"/>
+                </a:solidFill>
+                <a:effectLst/>
+                <a:latin typeface="Merriweather Sans"/>
+                <a:ea typeface="Merriweather Sans"/>
+                <a:cs typeface="Merriweather Sans"/>
+                <a:sym typeface="Merriweather Sans"/>
+              </a:rPr>
+              <a:t>Be intentional about the kinds of questions there can be</a:t>
+            </a:r>
+          </a:p>
+          <a:p>
+            <a:pPr lvl="0"/>
+            <a:endParaRPr lang="en-US" sz="2200" b="0" i="0" u="none" strike="noStrike" cap="none" dirty="0">
+              <a:solidFill>
+                <a:srgbClr val="000000"/>
+              </a:solidFill>
+              <a:effectLst/>
+              <a:latin typeface="Merriweather Sans"/>
+              <a:ea typeface="Merriweather Sans"/>
+              <a:cs typeface="Merriweather Sans"/>
+              <a:sym typeface="Merriweather Sans"/>
+            </a:endParaRPr>
+          </a:p>
+          <a:p>
+            <a:pPr lvl="0"/>
+            <a:r>
+              <a:rPr lang="en-US" sz="2200" b="0" i="0" u="none" strike="noStrike" cap="none" dirty="0">
+                <a:solidFill>
+                  <a:srgbClr val="000000"/>
+                </a:solidFill>
+                <a:effectLst/>
+                <a:latin typeface="Merriweather Sans"/>
+                <a:ea typeface="Merriweather Sans"/>
+                <a:cs typeface="Merriweather Sans"/>
+                <a:sym typeface="Merriweather Sans"/>
+              </a:rPr>
+              <a:t>Wording of the hypothetical questions is very tricky – it can be confusing to the applicants, difficult to “set the scene” so it makes sense for them</a:t>
+            </a:r>
+          </a:p>
+          <a:p>
+            <a:pPr lvl="0"/>
+            <a:endParaRPr lang="en-US" sz="2200" b="0" i="0" u="none" strike="noStrike" cap="none" dirty="0">
+              <a:solidFill>
+                <a:srgbClr val="000000"/>
+              </a:solidFill>
+              <a:effectLst/>
+              <a:latin typeface="Merriweather Sans"/>
+              <a:ea typeface="Merriweather Sans"/>
+              <a:cs typeface="Merriweather Sans"/>
+              <a:sym typeface="Merriweather Sans"/>
+            </a:endParaRPr>
+          </a:p>
+          <a:p>
+            <a:pPr lvl="0"/>
+            <a:r>
+              <a:rPr lang="en-US" sz="2200" b="0" i="0" u="none" strike="noStrike" cap="none" dirty="0">
+                <a:solidFill>
+                  <a:srgbClr val="000000"/>
+                </a:solidFill>
+                <a:effectLst/>
+                <a:latin typeface="Merriweather Sans"/>
+                <a:ea typeface="Merriweather Sans"/>
+                <a:cs typeface="Merriweather Sans"/>
+                <a:sym typeface="Merriweather Sans"/>
+              </a:rPr>
+              <a:t>Strike the balance between the two question types</a:t>
+            </a:r>
+          </a:p>
+          <a:p>
+            <a:endParaRPr lang="en-US" dirty="0"/>
+          </a:p>
+        </p:txBody>
+      </p:sp>
+    </p:spTree>
+    <p:extLst>
+      <p:ext uri="{BB962C8B-B14F-4D97-AF65-F5344CB8AC3E}">
+        <p14:creationId xmlns:p14="http://schemas.microsoft.com/office/powerpoint/2010/main" val="63585316"/>
+      </p:ext>
+    </p:extLst>
+  </p:cSld>
+  <p:clrMapOvr>
+    <a:masterClrMapping/>
+  </p:clrMapOvr>
+</p:notes>
+</file>
+
+<file path=ppt/notesSlides/notesSlide21.xml><?xml version="1.0" encoding="utf-8"?>
+<p:notes xmlns:a="http://schemas.openxmlformats.org/drawingml/2006/main" xmlns:r="http://schemas.openxmlformats.org/officeDocument/2006/relationships" xmlns:p="http://schemas.openxmlformats.org/presentationml/2006/main" showMasterSp="0" showMasterPhAnim="0">
+  <p:cSld>
+    <p:spTree>
+      <p:nvGrpSpPr>
+        <p:cNvPr id="1" name="Shape 304"/>
+        <p:cNvGrpSpPr/>
+        <p:nvPr/>
+      </p:nvGrpSpPr>
+      <p:grpSpPr>
+        <a:xfrm>
+          <a:off x="0" y="0"/>
+          <a:ext cx="0" cy="0"/>
+          <a:chOff x="0" y="0"/>
+          <a:chExt cx="0" cy="0"/>
+        </a:xfrm>
+      </p:grpSpPr>
+      <p:sp>
+        <p:nvSpPr>
+          <p:cNvPr id="305" name="Google Shape;305;p34:notes"/>
+          <p:cNvSpPr txBox="1">
+            <a:spLocks noGrp="1"/>
+          </p:cNvSpPr>
+          <p:nvPr>
+            <p:ph type="body" idx="1"/>
+          </p:nvPr>
+        </p:nvSpPr>
+        <p:spPr>
+          <a:xfrm>
+            <a:off x="917575" y="4415790"/>
+            <a:ext cx="5046663" cy="4183380"/>
+          </a:xfrm>
+          <a:prstGeom prst="rect">
+            <a:avLst/>
+          </a:prstGeom>
+          <a:noFill/>
+          <a:ln>
+            <a:noFill/>
+          </a:ln>
+        </p:spPr>
+        <p:txBody>
+          <a:bodyPr spcFirstLastPara="1" wrap="square" lIns="92425" tIns="46200" rIns="92425" bIns="46200" anchor="t" anchorCtr="0">
+            <a:noAutofit/>
+          </a:bodyPr>
+          <a:lstStyle/>
+          <a:p>
+            <a:pPr marL="0" lvl="0" indent="0" algn="l" rtl="0">
+              <a:lnSpc>
+                <a:spcPct val="100000"/>
+              </a:lnSpc>
+              <a:spcBef>
+                <a:spcPts val="0"/>
+              </a:spcBef>
+              <a:spcAft>
+                <a:spcPts val="0"/>
+              </a:spcAft>
+              <a:buSzPts val="1400"/>
+              <a:buNone/>
+            </a:pPr>
+            <a:endParaRPr/>
+          </a:p>
+        </p:txBody>
+      </p:sp>
+      <p:sp>
+        <p:nvSpPr>
+          <p:cNvPr id="306" name="Google Shape;306;p34:notes"/>
+          <p:cNvSpPr>
+            <a:spLocks noGrp="1" noRot="1" noChangeAspect="1"/>
+          </p:cNvSpPr>
+          <p:nvPr>
+            <p:ph type="sldImg" idx="2"/>
+          </p:nvPr>
+        </p:nvSpPr>
+        <p:spPr>
+          <a:xfrm>
+            <a:off x="342900" y="696913"/>
+            <a:ext cx="6197600" cy="3486150"/>
+          </a:xfrm>
+          <a:custGeom>
+            <a:avLst/>
+            <a:gdLst/>
+            <a:ahLst/>
+            <a:cxnLst/>
+            <a:rect l="l" t="t" r="r" b="b"/>
+            <a:pathLst>
+              <a:path w="120000" h="120000" extrusionOk="0">
+                <a:moveTo>
+                  <a:pt x="0" y="0"/>
+                </a:moveTo>
+                <a:lnTo>
+                  <a:pt x="120000" y="0"/>
+                </a:lnTo>
+                <a:lnTo>
+                  <a:pt x="120000" y="120000"/>
+                </a:lnTo>
+                <a:lnTo>
+                  <a:pt x="0" y="120000"/>
+                </a:lnTo>
+                <a:close/>
+              </a:path>
+            </a:pathLst>
+          </a:custGeom>
+          <a:noFill/>
+          <a:ln>
+            <a:noFill/>
+          </a:ln>
+        </p:spPr>
+      </p:sp>
+    </p:spTree>
+    <p:extLst>
+      <p:ext uri="{BB962C8B-B14F-4D97-AF65-F5344CB8AC3E}">
+        <p14:creationId xmlns:p14="http://schemas.microsoft.com/office/powerpoint/2010/main" val="1352616743"/>
       </p:ext>
     </p:extLst>
   </p:cSld>
@@ -3402,18 +3570,9 @@
               <a:t> </a:t>
             </a:r>
             <a:r>
-              <a:rPr lang="en-US" sz="1600"/>
-              <a:t>Participants should take </a:t>
-            </a:r>
-            <a:r>
               <a:rPr lang="en-US" sz="1600" dirty="0"/>
-              <a:t>about 15 minutes to write down daily job tasks for </a:t>
-            </a:r>
-            <a:r>
-              <a:rPr lang="en-US" sz="1600"/>
-              <a:t>the role.</a:t>
-            </a:r>
-            <a:endParaRPr lang="en-US" sz="1600" dirty="0"/>
+              <a:t>Participants should take about 15 minutes to write down daily job tasks for the role.</a:t>
+            </a:r>
           </a:p>
         </p:txBody>
       </p:sp>
@@ -3542,139 +3701,15 @@
             </a:r>
             <a:r>
               <a:rPr lang="en-US" sz="1600" dirty="0"/>
-              <a:t>After</a:t>
-            </a:r>
-            <a:r>
-              <a:rPr lang="en-US" sz="1600" baseline="0" dirty="0"/>
-              <a:t> 10 minutes, if some folks are done, invite them to start coming up to put their tasks down while reading them aloud. If any are multiple tasks in one note, the leader should ask them to break it up into two different notes. If something is not really a task beginning with a verb, it should also be sent back.</a:t>
-            </a:r>
-          </a:p>
-          <a:p>
-            <a:pPr marL="0" marR="0" lvl="0" indent="0" algn="l" defTabSz="914400" rtl="0" eaLnBrk="1" fontAlgn="auto" latinLnBrk="0" hangingPunct="1">
-              <a:lnSpc>
-                <a:spcPct val="100000"/>
-              </a:lnSpc>
-              <a:spcBef>
-                <a:spcPts val="0"/>
-              </a:spcBef>
-              <a:spcAft>
-                <a:spcPts val="0"/>
-              </a:spcAft>
-              <a:buClr>
-                <a:srgbClr val="000000"/>
-              </a:buClr>
-              <a:buSzPts val="1400"/>
-              <a:buFont typeface="Arial"/>
-              <a:buNone/>
-              <a:tabLst/>
-              <a:defRPr/>
-            </a:pPr>
-            <a:r>
-              <a:rPr lang="en-US" sz="1600" baseline="0" dirty="0"/>
-              <a:t>As people come up to read and add their notes, if they’re similar to another note, they should put them close together.</a:t>
-            </a:r>
-          </a:p>
-          <a:p>
-            <a:pPr marL="0" marR="0" lvl="0" indent="0" algn="l" defTabSz="914400" rtl="0" eaLnBrk="1" fontAlgn="auto" latinLnBrk="0" hangingPunct="1">
-              <a:lnSpc>
-                <a:spcPct val="100000"/>
-              </a:lnSpc>
-              <a:spcBef>
-                <a:spcPts val="0"/>
-              </a:spcBef>
-              <a:spcAft>
-                <a:spcPts val="0"/>
-              </a:spcAft>
-              <a:buClr>
-                <a:srgbClr val="000000"/>
-              </a:buClr>
-              <a:buSzPts val="1400"/>
-              <a:buFont typeface="Arial"/>
-              <a:buNone/>
-              <a:tabLst/>
-              <a:defRPr/>
-            </a:pPr>
-            <a:r>
-              <a:rPr lang="en-US" sz="1600" baseline="0" dirty="0"/>
-              <a:t>Then the whole group should come up and make sure all common tasks are bunched up together. </a:t>
-            </a:r>
-          </a:p>
-          <a:p>
-            <a:pPr marL="0" marR="0" lvl="0" indent="0" algn="l" defTabSz="914400" rtl="0" eaLnBrk="1" fontAlgn="auto" latinLnBrk="0" hangingPunct="1">
-              <a:lnSpc>
-                <a:spcPct val="100000"/>
-              </a:lnSpc>
-              <a:spcBef>
-                <a:spcPts val="0"/>
-              </a:spcBef>
-              <a:spcAft>
-                <a:spcPts val="0"/>
-              </a:spcAft>
-              <a:buClr>
-                <a:srgbClr val="000000"/>
-              </a:buClr>
-              <a:buSzPts val="1400"/>
-              <a:buFont typeface="Arial"/>
-              <a:buNone/>
-              <a:tabLst/>
-              <a:defRPr/>
-            </a:pPr>
-            <a:r>
-              <a:rPr lang="en-US" sz="1600" dirty="0"/>
-              <a:t> Then the group can create a competency name that they think is covered</a:t>
-            </a:r>
-            <a:r>
-              <a:rPr lang="en-US" sz="1600" baseline="0" dirty="0"/>
-              <a:t> by each common group of tasks. </a:t>
-            </a:r>
-            <a:endParaRPr lang="en-US" sz="1600" dirty="0"/>
-          </a:p>
-          <a:p>
-            <a:pPr marL="0" lvl="0" indent="0" algn="l" rtl="0">
-              <a:spcBef>
-                <a:spcPts val="0"/>
-              </a:spcBef>
-              <a:spcAft>
-                <a:spcPts val="0"/>
-              </a:spcAft>
-              <a:buNone/>
-            </a:pPr>
-            <a:endParaRPr lang="en-US" sz="1600" dirty="0"/>
-          </a:p>
-          <a:p>
-            <a:pPr marL="0" lvl="0" indent="0" algn="l" rtl="0">
-              <a:spcBef>
-                <a:spcPts val="0"/>
-              </a:spcBef>
-              <a:spcAft>
-                <a:spcPts val="0"/>
-              </a:spcAft>
-              <a:buNone/>
-            </a:pPr>
-            <a:r>
-              <a:rPr lang="en-US" sz="1600" dirty="0"/>
-              <a:t>Ask</a:t>
-            </a:r>
-            <a:r>
-              <a:rPr lang="en-US" sz="1600" baseline="0" dirty="0"/>
-              <a:t> the SMEs if there are any EQ related competencies they think are required that are not represented by the groupings. Also ask them if there is enough technical competencies represented versus only soft competencies (leadership, collaboration, analysis, </a:t>
-            </a:r>
-            <a:r>
-              <a:rPr lang="en-US" sz="1600" baseline="0" dirty="0" err="1"/>
-              <a:t>etc</a:t>
-            </a:r>
-            <a:r>
-              <a:rPr lang="en-US" sz="1600" baseline="0" dirty="0"/>
-              <a:t>).  </a:t>
-            </a:r>
-            <a:endParaRPr lang="en-US" sz="1600" dirty="0"/>
+              <a:t>Participants should take about 15 minutes to write down daily job tasks for the role.</a:t>
+            </a:r>
           </a:p>
         </p:txBody>
       </p:sp>
     </p:spTree>
     <p:extLst>
       <p:ext uri="{BB962C8B-B14F-4D97-AF65-F5344CB8AC3E}">
-        <p14:creationId xmlns:p14="http://schemas.microsoft.com/office/powerpoint/2010/main" val="340954401"/>
+        <p14:creationId xmlns:p14="http://schemas.microsoft.com/office/powerpoint/2010/main" val="138556394"/>
       </p:ext>
     </p:extLst>
   </p:cSld>
@@ -3765,11 +3800,11 @@
 </file>
 
 <file path=ppt/notesSlides/notesSlide8.xml><?xml version="1.0" encoding="utf-8"?>
-<p:notes xmlns:a="http://schemas.openxmlformats.org/drawingml/2006/main" xmlns:r="http://schemas.openxmlformats.org/officeDocument/2006/relationships" xmlns:p="http://schemas.openxmlformats.org/presentationml/2006/main">
+<p:notes xmlns:a="http://schemas.openxmlformats.org/drawingml/2006/main" xmlns:r="http://schemas.openxmlformats.org/officeDocument/2006/relationships" xmlns:p="http://schemas.openxmlformats.org/presentationml/2006/main" showMasterSp="0" showMasterPhAnim="0">
   <p:cSld>
     <p:spTree>
       <p:nvGrpSpPr>
-        <p:cNvPr id="1" name=""/>
+        <p:cNvPr id="1" name="Shape 161"/>
         <p:cNvGrpSpPr/>
         <p:nvPr/>
       </p:nvGrpSpPr>
@@ -3783,39 +3818,232 @@
       </p:grpSpPr>
       <p:sp>
         <p:nvSpPr>
-          <p:cNvPr id="2" name="Slide Image Placeholder 1"/>
+          <p:cNvPr id="162" name="Google Shape;162;g4e285569a2_1_0:notes"/>
           <p:cNvSpPr>
             <a:spLocks noGrp="1" noRot="1" noChangeAspect="1"/>
           </p:cNvSpPr>
           <p:nvPr>
-            <p:ph type="sldImg"/>
+            <p:ph type="sldImg" idx="2"/>
           </p:nvPr>
         </p:nvSpPr>
-        <p:spPr/>
+        <p:spPr>
+          <a:xfrm>
+            <a:off x="342900" y="696913"/>
+            <a:ext cx="6197600" cy="3486150"/>
+          </a:xfrm>
+          <a:custGeom>
+            <a:avLst/>
+            <a:gdLst/>
+            <a:ahLst/>
+            <a:cxnLst/>
+            <a:rect l="l" t="t" r="r" b="b"/>
+            <a:pathLst>
+              <a:path w="120000" h="120000" extrusionOk="0">
+                <a:moveTo>
+                  <a:pt x="0" y="0"/>
+                </a:moveTo>
+                <a:lnTo>
+                  <a:pt x="120000" y="0"/>
+                </a:lnTo>
+                <a:lnTo>
+                  <a:pt x="120000" y="120000"/>
+                </a:lnTo>
+                <a:lnTo>
+                  <a:pt x="0" y="120000"/>
+                </a:lnTo>
+                <a:close/>
+              </a:path>
+            </a:pathLst>
+          </a:custGeom>
+        </p:spPr>
       </p:sp>
       <p:sp>
         <p:nvSpPr>
-          <p:cNvPr id="3" name="Notes Placeholder 2"/>
-          <p:cNvSpPr>
+          <p:cNvPr id="163" name="Google Shape;163;g4e285569a2_1_0:notes"/>
+          <p:cNvSpPr txBox="1">
             <a:spLocks noGrp="1"/>
           </p:cNvSpPr>
           <p:nvPr>
             <p:ph type="body" idx="1"/>
           </p:nvPr>
         </p:nvSpPr>
-        <p:spPr/>
+        <p:spPr>
+          <a:xfrm>
+            <a:off x="917575" y="4415790"/>
+            <a:ext cx="5046600" cy="4183500"/>
+          </a:xfrm>
+          <a:prstGeom prst="rect">
+            <a:avLst/>
+          </a:prstGeom>
+        </p:spPr>
         <p:txBody>
-          <a:bodyPr/>
+          <a:bodyPr spcFirstLastPara="1" wrap="square" lIns="92425" tIns="46200" rIns="92425" bIns="46200" anchor="t" anchorCtr="0">
+            <a:noAutofit/>
+          </a:bodyPr>
           <a:lstStyle/>
           <a:p>
-            <a:endParaRPr lang="en-US" dirty="0"/>
+            <a:pPr marL="0" marR="0" lvl="0" indent="0" algn="l" defTabSz="914400" rtl="0" eaLnBrk="1" fontAlgn="auto" latinLnBrk="0" hangingPunct="1">
+              <a:lnSpc>
+                <a:spcPct val="100000"/>
+              </a:lnSpc>
+              <a:spcBef>
+                <a:spcPts val="0"/>
+              </a:spcBef>
+              <a:spcAft>
+                <a:spcPts val="0"/>
+              </a:spcAft>
+              <a:buClr>
+                <a:srgbClr val="000000"/>
+              </a:buClr>
+              <a:buSzPts val="1400"/>
+              <a:buFont typeface="Arial"/>
+              <a:buNone/>
+              <a:tabLst/>
+              <a:defRPr/>
+            </a:pPr>
+            <a:r>
+              <a:rPr lang="en-US" sz="1600" dirty="0"/>
+              <a:t>Notes for instructor:</a:t>
+            </a:r>
+            <a:r>
+              <a:rPr lang="en-US" sz="1600" baseline="0" dirty="0"/>
+              <a:t> </a:t>
+            </a:r>
+            <a:r>
+              <a:rPr lang="en-US" sz="1600" dirty="0"/>
+              <a:t>After</a:t>
+            </a:r>
+            <a:r>
+              <a:rPr lang="en-US" sz="1600" baseline="0" dirty="0"/>
+              <a:t> 10 minutes, if some folks are done, invite them to start coming up to put their tasks down while reading them aloud. If any are multiple tasks in one note, the leader should ask them to break it up into two different notes. If something is not really a task beginning with a verb, it should also be sent back.</a:t>
+            </a:r>
+          </a:p>
+          <a:p>
+            <a:pPr marL="0" marR="0" lvl="0" indent="0" algn="l" defTabSz="914400" rtl="0" eaLnBrk="1" fontAlgn="auto" latinLnBrk="0" hangingPunct="1">
+              <a:lnSpc>
+                <a:spcPct val="100000"/>
+              </a:lnSpc>
+              <a:spcBef>
+                <a:spcPts val="0"/>
+              </a:spcBef>
+              <a:spcAft>
+                <a:spcPts val="0"/>
+              </a:spcAft>
+              <a:buClr>
+                <a:srgbClr val="000000"/>
+              </a:buClr>
+              <a:buSzPts val="1400"/>
+              <a:buFont typeface="Arial"/>
+              <a:buNone/>
+              <a:tabLst/>
+              <a:defRPr/>
+            </a:pPr>
+            <a:r>
+              <a:rPr lang="en-US" sz="1600" baseline="0" dirty="0"/>
+              <a:t>As people come up to read and add their notes, if they’re similar to another note, they should put them close together.</a:t>
+            </a:r>
+          </a:p>
+          <a:p>
+            <a:pPr marL="0" marR="0" lvl="0" indent="0" algn="l" defTabSz="914400" rtl="0" eaLnBrk="1" fontAlgn="auto" latinLnBrk="0" hangingPunct="1">
+              <a:lnSpc>
+                <a:spcPct val="100000"/>
+              </a:lnSpc>
+              <a:spcBef>
+                <a:spcPts val="0"/>
+              </a:spcBef>
+              <a:spcAft>
+                <a:spcPts val="0"/>
+              </a:spcAft>
+              <a:buClr>
+                <a:srgbClr val="000000"/>
+              </a:buClr>
+              <a:buSzPts val="1400"/>
+              <a:buFont typeface="Arial"/>
+              <a:buNone/>
+              <a:tabLst/>
+              <a:defRPr/>
+            </a:pPr>
+            <a:r>
+              <a:rPr lang="en-US" sz="1600" baseline="0" dirty="0"/>
+              <a:t>Then the whole group should come up and make sure all common tasks are bunched up together. </a:t>
+            </a:r>
+          </a:p>
+          <a:p>
+            <a:pPr marL="0" marR="0" lvl="0" indent="0" algn="l" defTabSz="914400" rtl="0" eaLnBrk="1" fontAlgn="auto" latinLnBrk="0" hangingPunct="1">
+              <a:lnSpc>
+                <a:spcPct val="100000"/>
+              </a:lnSpc>
+              <a:spcBef>
+                <a:spcPts val="0"/>
+              </a:spcBef>
+              <a:spcAft>
+                <a:spcPts val="0"/>
+              </a:spcAft>
+              <a:buClr>
+                <a:srgbClr val="000000"/>
+              </a:buClr>
+              <a:buSzPts val="1400"/>
+              <a:buFont typeface="Arial"/>
+              <a:buNone/>
+              <a:tabLst/>
+              <a:defRPr/>
+            </a:pPr>
+            <a:r>
+              <a:rPr lang="en-US" sz="1600" dirty="0"/>
+              <a:t> Then the group can create a competency name that they think is covered</a:t>
+            </a:r>
+            <a:r>
+              <a:rPr lang="en-US" sz="1600" baseline="0" dirty="0"/>
+              <a:t> by each common group of tasks. </a:t>
+            </a:r>
+            <a:endParaRPr lang="en-US" sz="1600" dirty="0"/>
+          </a:p>
+          <a:p>
+            <a:pPr marL="0" lvl="0" indent="0" algn="l" rtl="0">
+              <a:spcBef>
+                <a:spcPts val="0"/>
+              </a:spcBef>
+              <a:spcAft>
+                <a:spcPts val="0"/>
+              </a:spcAft>
+              <a:buNone/>
+            </a:pPr>
+            <a:endParaRPr lang="en-US" sz="1600" dirty="0"/>
+          </a:p>
+          <a:p>
+            <a:pPr marL="0" lvl="0" indent="0" algn="l" rtl="0">
+              <a:spcBef>
+                <a:spcPts val="0"/>
+              </a:spcBef>
+              <a:spcAft>
+                <a:spcPts val="0"/>
+              </a:spcAft>
+              <a:buNone/>
+            </a:pPr>
+            <a:r>
+              <a:rPr lang="en-US" sz="1600" dirty="0"/>
+              <a:t>Ask</a:t>
+            </a:r>
+            <a:r>
+              <a:rPr lang="en-US" sz="1600" baseline="0" dirty="0"/>
+              <a:t> the SMEs if there are any EQ related competencies they think are required that are not represented by the groupings. Also ask them if there is enough technical competencies represented versus only soft competencies (leadership, collaboration, analysis, </a:t>
+            </a:r>
+            <a:r>
+              <a:rPr lang="en-US" sz="1600" baseline="0" dirty="0" err="1"/>
+              <a:t>etc</a:t>
+            </a:r>
+            <a:r>
+              <a:rPr lang="en-US" sz="1600" baseline="0" dirty="0"/>
+              <a:t>).  </a:t>
+            </a:r>
+            <a:endParaRPr lang="en-US" sz="1600" dirty="0"/>
           </a:p>
         </p:txBody>
       </p:sp>
     </p:spTree>
     <p:extLst>
       <p:ext uri="{BB962C8B-B14F-4D97-AF65-F5344CB8AC3E}">
-        <p14:creationId xmlns:p14="http://schemas.microsoft.com/office/powerpoint/2010/main" val="627141534"/>
+        <p14:creationId xmlns:p14="http://schemas.microsoft.com/office/powerpoint/2010/main" val="340954401"/>
       </p:ext>
     </p:extLst>
   </p:cSld>
@@ -3826,11 +4054,11 @@
 </file>
 
 <file path=ppt/notesSlides/notesSlide9.xml><?xml version="1.0" encoding="utf-8"?>
-<p:notes xmlns:a="http://schemas.openxmlformats.org/drawingml/2006/main" xmlns:r="http://schemas.openxmlformats.org/officeDocument/2006/relationships" xmlns:p="http://schemas.openxmlformats.org/presentationml/2006/main">
+<p:notes xmlns:a="http://schemas.openxmlformats.org/drawingml/2006/main" xmlns:r="http://schemas.openxmlformats.org/officeDocument/2006/relationships" xmlns:p="http://schemas.openxmlformats.org/presentationml/2006/main" showMasterSp="0" showMasterPhAnim="0">
   <p:cSld>
     <p:spTree>
       <p:nvGrpSpPr>
-        <p:cNvPr id="1" name=""/>
+        <p:cNvPr id="1" name="Shape 161"/>
         <p:cNvGrpSpPr/>
         <p:nvPr/>
       </p:nvGrpSpPr>
@@ -3844,83 +4072,97 @@
       </p:grpSpPr>
       <p:sp>
         <p:nvSpPr>
-          <p:cNvPr id="2" name="Slide Image Placeholder 1"/>
+          <p:cNvPr id="162" name="Google Shape;162;g4e285569a2_1_0:notes"/>
           <p:cNvSpPr>
             <a:spLocks noGrp="1" noRot="1" noChangeAspect="1"/>
           </p:cNvSpPr>
           <p:nvPr>
-            <p:ph type="sldImg"/>
+            <p:ph type="sldImg" idx="2"/>
           </p:nvPr>
         </p:nvSpPr>
-        <p:spPr/>
+        <p:spPr>
+          <a:xfrm>
+            <a:off x="342900" y="696913"/>
+            <a:ext cx="6197600" cy="3486150"/>
+          </a:xfrm>
+          <a:custGeom>
+            <a:avLst/>
+            <a:gdLst/>
+            <a:ahLst/>
+            <a:cxnLst/>
+            <a:rect l="l" t="t" r="r" b="b"/>
+            <a:pathLst>
+              <a:path w="120000" h="120000" extrusionOk="0">
+                <a:moveTo>
+                  <a:pt x="0" y="0"/>
+                </a:moveTo>
+                <a:lnTo>
+                  <a:pt x="120000" y="0"/>
+                </a:lnTo>
+                <a:lnTo>
+                  <a:pt x="120000" y="120000"/>
+                </a:lnTo>
+                <a:lnTo>
+                  <a:pt x="0" y="120000"/>
+                </a:lnTo>
+                <a:close/>
+              </a:path>
+            </a:pathLst>
+          </a:custGeom>
+        </p:spPr>
       </p:sp>
       <p:sp>
         <p:nvSpPr>
-          <p:cNvPr id="3" name="Notes Placeholder 2"/>
-          <p:cNvSpPr>
+          <p:cNvPr id="163" name="Google Shape;163;g4e285569a2_1_0:notes"/>
+          <p:cNvSpPr txBox="1">
             <a:spLocks noGrp="1"/>
           </p:cNvSpPr>
           <p:nvPr>
             <p:ph type="body" idx="1"/>
           </p:nvPr>
         </p:nvSpPr>
-        <p:spPr/>
+        <p:spPr>
+          <a:xfrm>
+            <a:off x="917575" y="4415790"/>
+            <a:ext cx="5046600" cy="4183500"/>
+          </a:xfrm>
+          <a:prstGeom prst="rect">
+            <a:avLst/>
+          </a:prstGeom>
+        </p:spPr>
         <p:txBody>
-          <a:bodyPr/>
+          <a:bodyPr spcFirstLastPara="1" wrap="square" lIns="92425" tIns="46200" rIns="92425" bIns="46200" anchor="t" anchorCtr="0">
+            <a:noAutofit/>
+          </a:bodyPr>
           <a:lstStyle/>
           <a:p>
-            <a:endParaRPr lang="en-US" dirty="0"/>
-          </a:p>
-          <a:p>
-            <a:r>
-              <a:rPr lang="en-US" sz="2200" b="0" i="0" u="none" strike="noStrike" cap="none" dirty="0">
-                <a:solidFill>
-                  <a:srgbClr val="000000"/>
-                </a:solidFill>
-                <a:effectLst/>
-                <a:latin typeface="Merriweather Sans"/>
-                <a:ea typeface="Merriweather Sans"/>
-                <a:cs typeface="Merriweather Sans"/>
-                <a:sym typeface="Merriweather Sans"/>
-              </a:rPr>
-              <a:t>DO NOT require agency-specific certifications, technologies, etc. that aren’t common in the private sector. </a:t>
-            </a:r>
-          </a:p>
-          <a:p>
-            <a:endParaRPr lang="en-US" sz="2200" b="0" i="0" u="none" strike="noStrike" cap="none" dirty="0">
-              <a:solidFill>
+            <a:pPr marL="0" marR="0" lvl="0" indent="0" algn="l" defTabSz="914400" rtl="0" eaLnBrk="1" fontAlgn="auto" latinLnBrk="0" hangingPunct="1">
+              <a:lnSpc>
+                <a:spcPct val="100000"/>
+              </a:lnSpc>
+              <a:spcBef>
+                <a:spcPts val="0"/>
+              </a:spcBef>
+              <a:spcAft>
+                <a:spcPts val="0"/>
+              </a:spcAft>
+              <a:buClr>
                 <a:srgbClr val="000000"/>
-              </a:solidFill>
-              <a:effectLst/>
-              <a:latin typeface="Merriweather Sans"/>
-              <a:ea typeface="Merriweather Sans"/>
-              <a:cs typeface="Merriweather Sans"/>
-              <a:sym typeface="Merriweather Sans"/>
-            </a:endParaRPr>
-          </a:p>
-          <a:p>
-            <a:r>
-              <a:rPr lang="en-US" sz="2200" b="0" i="0" u="none" strike="noStrike" cap="none" dirty="0">
-                <a:solidFill>
-                  <a:srgbClr val="000000"/>
-                </a:solidFill>
-                <a:effectLst/>
-                <a:latin typeface="Merriweather Sans"/>
-                <a:sym typeface="Merriweather Sans"/>
-              </a:rPr>
-              <a:t>DO NOT require experience with government-only tech, this may exclude private sector applicants who could do the job well</a:t>
-            </a:r>
-            <a:endParaRPr lang="en-US" dirty="0"/>
-          </a:p>
-          <a:p>
-            <a:endParaRPr lang="en-US" dirty="0"/>
+              </a:buClr>
+              <a:buSzPts val="1400"/>
+              <a:buFont typeface="Arial"/>
+              <a:buNone/>
+              <a:tabLst/>
+              <a:defRPr/>
+            </a:pPr>
+            <a:endParaRPr lang="en-US" sz="1600" dirty="0"/>
           </a:p>
         </p:txBody>
       </p:sp>
     </p:spTree>
     <p:extLst>
       <p:ext uri="{BB962C8B-B14F-4D97-AF65-F5344CB8AC3E}">
-        <p14:creationId xmlns:p14="http://schemas.microsoft.com/office/powerpoint/2010/main" val="4230347775"/>
+        <p14:creationId xmlns:p14="http://schemas.microsoft.com/office/powerpoint/2010/main" val="3311435134"/>
       </p:ext>
     </p:extLst>
   </p:cSld>
@@ -7360,6 +7602,268 @@
   <p:cSld>
     <p:spTree>
       <p:nvGrpSpPr>
+        <p:cNvPr id="1" name="Shape 164"/>
+        <p:cNvGrpSpPr/>
+        <p:nvPr/>
+      </p:nvGrpSpPr>
+      <p:grpSpPr>
+        <a:xfrm>
+          <a:off x="0" y="0"/>
+          <a:ext cx="0" cy="0"/>
+          <a:chOff x="0" y="0"/>
+          <a:chExt cx="0" cy="0"/>
+        </a:xfrm>
+      </p:grpSpPr>
+      <p:sp>
+        <p:nvSpPr>
+          <p:cNvPr id="165" name="Google Shape;165;p33"/>
+          <p:cNvSpPr txBox="1">
+            <a:spLocks noGrp="1"/>
+          </p:cNvSpPr>
+          <p:nvPr>
+            <p:ph type="title"/>
+          </p:nvPr>
+        </p:nvSpPr>
+        <p:spPr/>
+        <p:txBody>
+          <a:bodyPr/>
+          <a:lstStyle/>
+          <a:p>
+            <a:pPr lvl="0"/>
+            <a:r>
+              <a:rPr lang="en-US" dirty="0"/>
+              <a:t>Example Groupings from Past Workshops</a:t>
+            </a:r>
+          </a:p>
+        </p:txBody>
+      </p:sp>
+      <p:sp>
+        <p:nvSpPr>
+          <p:cNvPr id="4" name="TextBox 3">
+            <a:extLst>
+              <a:ext uri="{FF2B5EF4-FFF2-40B4-BE49-F238E27FC236}">
+                <a16:creationId xmlns:a16="http://schemas.microsoft.com/office/drawing/2014/main" id="{A58307FC-FEC4-AD4D-98B3-926DA76B3493}"/>
+              </a:ext>
+            </a:extLst>
+          </p:cNvPr>
+          <p:cNvSpPr txBox="1"/>
+          <p:nvPr/>
+        </p:nvSpPr>
+        <p:spPr>
+          <a:xfrm>
+            <a:off x="17322800" y="762000"/>
+            <a:ext cx="184731" cy="307777"/>
+          </a:xfrm>
+          <a:prstGeom prst="rect">
+            <a:avLst/>
+          </a:prstGeom>
+          <a:noFill/>
+        </p:spPr>
+        <p:txBody>
+          <a:bodyPr wrap="none" rtlCol="0">
+            <a:spAutoFit/>
+          </a:bodyPr>
+          <a:lstStyle/>
+          <a:p>
+            <a:endParaRPr lang="en-US" dirty="0"/>
+          </a:p>
+        </p:txBody>
+      </p:sp>
+      <p:pic>
+        <p:nvPicPr>
+          <p:cNvPr id="6" name="Picture 5">
+            <a:extLst>
+              <a:ext uri="{FF2B5EF4-FFF2-40B4-BE49-F238E27FC236}">
+                <a16:creationId xmlns:a16="http://schemas.microsoft.com/office/drawing/2014/main" id="{C1AF7104-023E-9B42-B871-2CCD77CB194A}"/>
+              </a:ext>
+            </a:extLst>
+          </p:cNvPr>
+          <p:cNvPicPr>
+            <a:picLocks noChangeAspect="1"/>
+          </p:cNvPicPr>
+          <p:nvPr/>
+        </p:nvPicPr>
+        <p:blipFill>
+          <a:blip r:embed="rId3"/>
+          <a:stretch>
+            <a:fillRect/>
+          </a:stretch>
+        </p:blipFill>
+        <p:spPr>
+          <a:xfrm>
+            <a:off x="311886" y="1270000"/>
+            <a:ext cx="7797800" cy="8483600"/>
+          </a:xfrm>
+          <a:prstGeom prst="rect">
+            <a:avLst/>
+          </a:prstGeom>
+          <a:ln>
+            <a:solidFill>
+              <a:schemeClr val="tx2"/>
+            </a:solidFill>
+          </a:ln>
+        </p:spPr>
+      </p:pic>
+      <p:pic>
+        <p:nvPicPr>
+          <p:cNvPr id="10" name="Picture 9">
+            <a:extLst>
+              <a:ext uri="{FF2B5EF4-FFF2-40B4-BE49-F238E27FC236}">
+                <a16:creationId xmlns:a16="http://schemas.microsoft.com/office/drawing/2014/main" id="{2B2EAE93-3963-2F47-BE11-A9341DAA2B28}"/>
+              </a:ext>
+            </a:extLst>
+          </p:cNvPr>
+          <p:cNvPicPr>
+            <a:picLocks noChangeAspect="1"/>
+          </p:cNvPicPr>
+          <p:nvPr/>
+        </p:nvPicPr>
+        <p:blipFill>
+          <a:blip r:embed="rId4"/>
+          <a:stretch>
+            <a:fillRect/>
+          </a:stretch>
+        </p:blipFill>
+        <p:spPr>
+          <a:xfrm>
+            <a:off x="8989943" y="1270000"/>
+            <a:ext cx="8038514" cy="8483600"/>
+          </a:xfrm>
+          <a:prstGeom prst="rect">
+            <a:avLst/>
+          </a:prstGeom>
+          <a:ln>
+            <a:solidFill>
+              <a:schemeClr val="tx2"/>
+            </a:solidFill>
+          </a:ln>
+        </p:spPr>
+      </p:pic>
+    </p:spTree>
+    <p:extLst>
+      <p:ext uri="{BB962C8B-B14F-4D97-AF65-F5344CB8AC3E}">
+        <p14:creationId xmlns:p14="http://schemas.microsoft.com/office/powerpoint/2010/main" val="2056118188"/>
+      </p:ext>
+    </p:extLst>
+  </p:cSld>
+  <p:clrMapOvr>
+    <a:masterClrMapping/>
+  </p:clrMapOvr>
+</p:sld>
+</file>
+
+<file path=ppt/slides/slide11.xml><?xml version="1.0" encoding="utf-8"?>
+<p:sld xmlns:a="http://schemas.openxmlformats.org/drawingml/2006/main" xmlns:r="http://schemas.openxmlformats.org/officeDocument/2006/relationships" xmlns:p="http://schemas.openxmlformats.org/presentationml/2006/main">
+  <p:cSld>
+    <p:spTree>
+      <p:nvGrpSpPr>
+        <p:cNvPr id="1" name=""/>
+        <p:cNvGrpSpPr/>
+        <p:nvPr/>
+      </p:nvGrpSpPr>
+      <p:grpSpPr>
+        <a:xfrm>
+          <a:off x="0" y="0"/>
+          <a:ext cx="0" cy="0"/>
+          <a:chOff x="0" y="0"/>
+          <a:chExt cx="0" cy="0"/>
+        </a:xfrm>
+      </p:grpSpPr>
+      <p:sp>
+        <p:nvSpPr>
+          <p:cNvPr id="2" name="Title 1">
+            <a:extLst>
+              <a:ext uri="{FF2B5EF4-FFF2-40B4-BE49-F238E27FC236}">
+                <a16:creationId xmlns:a16="http://schemas.microsoft.com/office/drawing/2014/main" id="{9BFF689B-CB37-F045-890E-1702F6255CD6}"/>
+              </a:ext>
+            </a:extLst>
+          </p:cNvPr>
+          <p:cNvSpPr>
+            <a:spLocks noGrp="1"/>
+          </p:cNvSpPr>
+          <p:nvPr>
+            <p:ph type="title"/>
+          </p:nvPr>
+        </p:nvSpPr>
+        <p:spPr/>
+        <p:txBody>
+          <a:bodyPr/>
+          <a:lstStyle/>
+          <a:p>
+            <a:r>
+              <a:rPr lang="en-US" dirty="0"/>
+              <a:t>Dot Voting and discussion</a:t>
+            </a:r>
+          </a:p>
+        </p:txBody>
+      </p:sp>
+      <p:sp>
+        <p:nvSpPr>
+          <p:cNvPr id="3" name="Text Placeholder 2">
+            <a:extLst>
+              <a:ext uri="{FF2B5EF4-FFF2-40B4-BE49-F238E27FC236}">
+                <a16:creationId xmlns:a16="http://schemas.microsoft.com/office/drawing/2014/main" id="{9C73CD77-D3DE-854F-9047-B671C3713E10}"/>
+              </a:ext>
+            </a:extLst>
+          </p:cNvPr>
+          <p:cNvSpPr>
+            <a:spLocks noGrp="1"/>
+          </p:cNvSpPr>
+          <p:nvPr>
+            <p:ph type="body" idx="1"/>
+          </p:nvPr>
+        </p:nvSpPr>
+        <p:spPr/>
+        <p:txBody>
+          <a:bodyPr/>
+          <a:lstStyle/>
+          <a:p>
+            <a:r>
+              <a:rPr lang="en-US" dirty="0"/>
+              <a:t>Use dots to vote for most critical competencies for this position.</a:t>
+            </a:r>
+          </a:p>
+          <a:p>
+            <a:r>
+              <a:rPr lang="en-US" dirty="0"/>
+              <a:t>Limited number of dots so we can prioritize.</a:t>
+            </a:r>
+          </a:p>
+          <a:p>
+            <a:r>
+              <a:rPr lang="en-US" dirty="0"/>
+              <a:t>Goal is to select 4–6 critical competencies.</a:t>
+            </a:r>
+          </a:p>
+          <a:p>
+            <a:r>
+              <a:rPr lang="en-US" dirty="0"/>
+              <a:t>During this exercise, limit the number of tasks to just 4-5 under each competency.</a:t>
+            </a:r>
+          </a:p>
+          <a:p>
+            <a:endParaRPr lang="en-US" dirty="0"/>
+          </a:p>
+        </p:txBody>
+      </p:sp>
+    </p:spTree>
+    <p:extLst>
+      <p:ext uri="{BB962C8B-B14F-4D97-AF65-F5344CB8AC3E}">
+        <p14:creationId xmlns:p14="http://schemas.microsoft.com/office/powerpoint/2010/main" val="2342716868"/>
+      </p:ext>
+    </p:extLst>
+  </p:cSld>
+  <p:clrMapOvr>
+    <a:masterClrMapping/>
+  </p:clrMapOvr>
+</p:sld>
+</file>
+
+<file path=ppt/slides/slide12.xml><?xml version="1.0" encoding="utf-8"?>
+<p:sld xmlns:a="http://schemas.openxmlformats.org/drawingml/2006/main" xmlns:r="http://schemas.openxmlformats.org/officeDocument/2006/relationships" xmlns:p="http://schemas.openxmlformats.org/presentationml/2006/main">
+  <p:cSld>
+    <p:spTree>
+      <p:nvGrpSpPr>
         <p:cNvPr id="1" name=""/>
         <p:cNvGrpSpPr/>
         <p:nvPr/>
@@ -7478,7 +7982,7 @@
 </p:sld>
 </file>
 
-<file path=ppt/slides/slide11.xml><?xml version="1.0" encoding="utf-8"?>
+<file path=ppt/slides/slide13.xml><?xml version="1.0" encoding="utf-8"?>
 <p:sld xmlns:a="http://schemas.openxmlformats.org/drawingml/2006/main" xmlns:r="http://schemas.openxmlformats.org/officeDocument/2006/relationships" xmlns:p="http://schemas.openxmlformats.org/presentationml/2006/main">
   <p:cSld>
     <p:spTree>
@@ -7633,7 +8137,7 @@
 </p:sld>
 </file>
 
-<file path=ppt/slides/slide12.xml><?xml version="1.0" encoding="utf-8"?>
+<file path=ppt/slides/slide14.xml><?xml version="1.0" encoding="utf-8"?>
 <p:sld xmlns:a="http://schemas.openxmlformats.org/drawingml/2006/main" xmlns:r="http://schemas.openxmlformats.org/officeDocument/2006/relationships" xmlns:p="http://schemas.openxmlformats.org/presentationml/2006/main">
   <p:cSld>
     <p:spTree>
@@ -7807,7 +8311,7 @@
 </p:sld>
 </file>
 
-<file path=ppt/slides/slide13.xml><?xml version="1.0" encoding="utf-8"?>
+<file path=ppt/slides/slide15.xml><?xml version="1.0" encoding="utf-8"?>
 <p:sld xmlns:a="http://schemas.openxmlformats.org/drawingml/2006/main" xmlns:r="http://schemas.openxmlformats.org/officeDocument/2006/relationships" xmlns:p="http://schemas.openxmlformats.org/presentationml/2006/main">
   <p:cSld>
     <p:spTree>
@@ -7890,228 +8394,6 @@
     <p:extLst>
       <p:ext uri="{BB962C8B-B14F-4D97-AF65-F5344CB8AC3E}">
         <p14:creationId xmlns:p14="http://schemas.microsoft.com/office/powerpoint/2010/main" val="3689359389"/>
-      </p:ext>
-    </p:extLst>
-  </p:cSld>
-  <p:clrMapOvr>
-    <a:masterClrMapping/>
-  </p:clrMapOvr>
-</p:sld>
-</file>
-
-<file path=ppt/slides/slide14.xml><?xml version="1.0" encoding="utf-8"?>
-<p:sld xmlns:a="http://schemas.openxmlformats.org/drawingml/2006/main" xmlns:r="http://schemas.openxmlformats.org/officeDocument/2006/relationships" xmlns:p="http://schemas.openxmlformats.org/presentationml/2006/main">
-  <p:cSld>
-    <p:spTree>
-      <p:nvGrpSpPr>
-        <p:cNvPr id="1" name="Shape 307"/>
-        <p:cNvGrpSpPr/>
-        <p:nvPr/>
-      </p:nvGrpSpPr>
-      <p:grpSpPr>
-        <a:xfrm>
-          <a:off x="0" y="0"/>
-          <a:ext cx="0" cy="0"/>
-          <a:chOff x="0" y="0"/>
-          <a:chExt cx="0" cy="0"/>
-        </a:xfrm>
-      </p:grpSpPr>
-      <p:sp>
-        <p:nvSpPr>
-          <p:cNvPr id="4" name="Google Shape;68;p20">
-            <a:extLst>
-              <a:ext uri="{FF2B5EF4-FFF2-40B4-BE49-F238E27FC236}">
-                <a16:creationId xmlns:a16="http://schemas.microsoft.com/office/drawing/2014/main" id="{FF013F16-4A52-9A45-B7A8-5DE84E4CEFE2}"/>
-              </a:ext>
-            </a:extLst>
-          </p:cNvPr>
-          <p:cNvSpPr txBox="1">
-            <a:spLocks noGrp="1"/>
-          </p:cNvSpPr>
-          <p:nvPr>
-            <p:ph type="body" idx="1"/>
-          </p:nvPr>
-        </p:nvSpPr>
-        <p:spPr>
-          <a:xfrm>
-            <a:off x="2308393" y="4027713"/>
-            <a:ext cx="12723989" cy="2893800"/>
-          </a:xfrm>
-        </p:spPr>
-        <p:txBody>
-          <a:bodyPr>
-            <a:normAutofit/>
-          </a:bodyPr>
-          <a:lstStyle/>
-          <a:p>
-            <a:pPr lvl="0"/>
-            <a:r>
-              <a:rPr lang="en-US" dirty="0">
-                <a:sym typeface="Cambria"/>
-              </a:rPr>
-              <a:t>End of Day 1 Presentation</a:t>
-            </a:r>
-            <a:endParaRPr lang="en-US" dirty="0"/>
-          </a:p>
-        </p:txBody>
-      </p:sp>
-    </p:spTree>
-  </p:cSld>
-  <p:clrMapOvr>
-    <a:masterClrMapping/>
-  </p:clrMapOvr>
-</p:sld>
-</file>
-
-<file path=ppt/slides/slide15.xml><?xml version="1.0" encoding="utf-8"?>
-<p:sld xmlns:a="http://schemas.openxmlformats.org/drawingml/2006/main" xmlns:r="http://schemas.openxmlformats.org/officeDocument/2006/relationships" xmlns:p="http://schemas.openxmlformats.org/presentationml/2006/main">
-  <p:cSld>
-    <p:bg>
-      <p:bgPr>
-        <a:solidFill>
-          <a:srgbClr val="FFFF00"/>
-        </a:solidFill>
-        <a:effectLst/>
-      </p:bgPr>
-    </p:bg>
-    <p:spTree>
-      <p:nvGrpSpPr>
-        <p:cNvPr id="1" name=""/>
-        <p:cNvGrpSpPr/>
-        <p:nvPr/>
-      </p:nvGrpSpPr>
-      <p:grpSpPr>
-        <a:xfrm>
-          <a:off x="0" y="0"/>
-          <a:ext cx="0" cy="0"/>
-          <a:chOff x="0" y="0"/>
-          <a:chExt cx="0" cy="0"/>
-        </a:xfrm>
-      </p:grpSpPr>
-      <p:sp>
-        <p:nvSpPr>
-          <p:cNvPr id="2" name="Title 1">
-            <a:extLst>
-              <a:ext uri="{FF2B5EF4-FFF2-40B4-BE49-F238E27FC236}">
-                <a16:creationId xmlns:a16="http://schemas.microsoft.com/office/drawing/2014/main" id="{A4932B72-DF93-D54D-850F-12928960533A}"/>
-              </a:ext>
-            </a:extLst>
-          </p:cNvPr>
-          <p:cNvSpPr>
-            <a:spLocks noGrp="1"/>
-          </p:cNvSpPr>
-          <p:nvPr>
-            <p:ph type="title"/>
-          </p:nvPr>
-        </p:nvSpPr>
-        <p:spPr/>
-        <p:txBody>
-          <a:bodyPr/>
-          <a:lstStyle/>
-          <a:p>
-            <a:r>
-              <a:rPr lang="en-US" dirty="0"/>
-              <a:t>&lt;Delete THIS SLIDE BEFORE PRESENTING&gt;</a:t>
-            </a:r>
-          </a:p>
-        </p:txBody>
-      </p:sp>
-      <p:sp>
-        <p:nvSpPr>
-          <p:cNvPr id="3" name="Text Placeholder 2">
-            <a:extLst>
-              <a:ext uri="{FF2B5EF4-FFF2-40B4-BE49-F238E27FC236}">
-                <a16:creationId xmlns:a16="http://schemas.microsoft.com/office/drawing/2014/main" id="{DD0C6529-1517-6D4F-B2C1-4578D2693A9A}"/>
-              </a:ext>
-            </a:extLst>
-          </p:cNvPr>
-          <p:cNvSpPr>
-            <a:spLocks noGrp="1"/>
-          </p:cNvSpPr>
-          <p:nvPr>
-            <p:ph type="body" idx="13"/>
-          </p:nvPr>
-        </p:nvSpPr>
-        <p:spPr/>
-        <p:txBody>
-          <a:bodyPr>
-            <a:normAutofit/>
-          </a:bodyPr>
-          <a:lstStyle/>
-          <a:p>
-            <a:r>
-              <a:rPr lang="en-US" b="1" dirty="0"/>
-              <a:t>PREPARE THE FOLLOWING BEFORE DAY 2</a:t>
-            </a:r>
-          </a:p>
-          <a:p>
-            <a:pPr marL="742967" indent="-571500">
-              <a:buClr>
-                <a:schemeClr val="tx2"/>
-              </a:buClr>
-              <a:buFont typeface="Arial" panose="020B0604020202020204" pitchFamily="34" charset="0"/>
-              <a:buChar char="•"/>
-            </a:pPr>
-            <a:r>
-              <a:rPr lang="en-US" dirty="0"/>
-              <a:t>HR drafts JOA with competency names and definitions, the most critical job tasks from the job task exercise, and a few sentences from the PD that describes the position in the context of the agency – will be reviewed as a team on Day 2</a:t>
-            </a:r>
-          </a:p>
-          <a:p>
-            <a:pPr marL="742967" indent="-571500">
-              <a:buClr>
-                <a:schemeClr val="tx2"/>
-              </a:buClr>
-              <a:buFont typeface="Arial" panose="020B0604020202020204" pitchFamily="34" charset="0"/>
-              <a:buChar char="•"/>
-            </a:pPr>
-            <a:r>
-              <a:rPr lang="en-US" dirty="0"/>
-              <a:t>Competencies and proficiencies in a single doc for use on Day 2</a:t>
-            </a:r>
-          </a:p>
-          <a:p>
-            <a:pPr marL="742967" indent="-571500">
-              <a:buClr>
-                <a:schemeClr val="tx2"/>
-              </a:buClr>
-              <a:buFont typeface="Arial" panose="020B0604020202020204" pitchFamily="34" charset="0"/>
-              <a:buChar char="•"/>
-            </a:pPr>
-            <a:r>
-              <a:rPr lang="en-US" dirty="0"/>
-              <a:t>Reminder: Resumes (4-5) related to this job for practice resume review (Agency Talent Portal, LinkedIn, etc.)</a:t>
-            </a:r>
-          </a:p>
-          <a:p>
-            <a:pPr marL="742967" indent="-571500">
-              <a:buClr>
-                <a:schemeClr val="tx2"/>
-              </a:buClr>
-              <a:buFont typeface="Arial" panose="020B0604020202020204" pitchFamily="34" charset="0"/>
-              <a:buChar char="•"/>
-            </a:pPr>
-            <a:endParaRPr lang="en-US" dirty="0"/>
-          </a:p>
-          <a:p>
-            <a:pPr marL="742967" indent="-571500">
-              <a:buClr>
-                <a:schemeClr val="tx2"/>
-              </a:buClr>
-              <a:buFont typeface="Arial" panose="020B0604020202020204" pitchFamily="34" charset="0"/>
-              <a:buChar char="•"/>
-            </a:pPr>
-            <a:endParaRPr lang="en-US" dirty="0"/>
-          </a:p>
-          <a:p>
-            <a:endParaRPr lang="en-US" dirty="0"/>
-          </a:p>
-        </p:txBody>
-      </p:sp>
-    </p:spTree>
-    <p:extLst>
-      <p:ext uri="{BB962C8B-B14F-4D97-AF65-F5344CB8AC3E}">
-        <p14:creationId xmlns:p14="http://schemas.microsoft.com/office/powerpoint/2010/main" val="2239205312"/>
       </p:ext>
     </p:extLst>
   </p:cSld>
@@ -8171,6 +8453,228 @@
               <a:rPr lang="en-US" dirty="0">
                 <a:sym typeface="Cambria"/>
               </a:rPr>
+              <a:t>End of Day 1 Presentation</a:t>
+            </a:r>
+            <a:endParaRPr lang="en-US" dirty="0"/>
+          </a:p>
+        </p:txBody>
+      </p:sp>
+    </p:spTree>
+  </p:cSld>
+  <p:clrMapOvr>
+    <a:masterClrMapping/>
+  </p:clrMapOvr>
+</p:sld>
+</file>
+
+<file path=ppt/slides/slide17.xml><?xml version="1.0" encoding="utf-8"?>
+<p:sld xmlns:a="http://schemas.openxmlformats.org/drawingml/2006/main" xmlns:r="http://schemas.openxmlformats.org/officeDocument/2006/relationships" xmlns:p="http://schemas.openxmlformats.org/presentationml/2006/main">
+  <p:cSld>
+    <p:bg>
+      <p:bgPr>
+        <a:solidFill>
+          <a:srgbClr val="FFFF00"/>
+        </a:solidFill>
+        <a:effectLst/>
+      </p:bgPr>
+    </p:bg>
+    <p:spTree>
+      <p:nvGrpSpPr>
+        <p:cNvPr id="1" name=""/>
+        <p:cNvGrpSpPr/>
+        <p:nvPr/>
+      </p:nvGrpSpPr>
+      <p:grpSpPr>
+        <a:xfrm>
+          <a:off x="0" y="0"/>
+          <a:ext cx="0" cy="0"/>
+          <a:chOff x="0" y="0"/>
+          <a:chExt cx="0" cy="0"/>
+        </a:xfrm>
+      </p:grpSpPr>
+      <p:sp>
+        <p:nvSpPr>
+          <p:cNvPr id="2" name="Title 1">
+            <a:extLst>
+              <a:ext uri="{FF2B5EF4-FFF2-40B4-BE49-F238E27FC236}">
+                <a16:creationId xmlns:a16="http://schemas.microsoft.com/office/drawing/2014/main" id="{A4932B72-DF93-D54D-850F-12928960533A}"/>
+              </a:ext>
+            </a:extLst>
+          </p:cNvPr>
+          <p:cNvSpPr>
+            <a:spLocks noGrp="1"/>
+          </p:cNvSpPr>
+          <p:nvPr>
+            <p:ph type="title"/>
+          </p:nvPr>
+        </p:nvSpPr>
+        <p:spPr/>
+        <p:txBody>
+          <a:bodyPr/>
+          <a:lstStyle/>
+          <a:p>
+            <a:r>
+              <a:rPr lang="en-US" dirty="0"/>
+              <a:t>&lt;Delete THIS SLIDE BEFORE PRESENTING&gt;</a:t>
+            </a:r>
+          </a:p>
+        </p:txBody>
+      </p:sp>
+      <p:sp>
+        <p:nvSpPr>
+          <p:cNvPr id="3" name="Text Placeholder 2">
+            <a:extLst>
+              <a:ext uri="{FF2B5EF4-FFF2-40B4-BE49-F238E27FC236}">
+                <a16:creationId xmlns:a16="http://schemas.microsoft.com/office/drawing/2014/main" id="{DD0C6529-1517-6D4F-B2C1-4578D2693A9A}"/>
+              </a:ext>
+            </a:extLst>
+          </p:cNvPr>
+          <p:cNvSpPr>
+            <a:spLocks noGrp="1"/>
+          </p:cNvSpPr>
+          <p:nvPr>
+            <p:ph type="body" idx="13"/>
+          </p:nvPr>
+        </p:nvSpPr>
+        <p:spPr/>
+        <p:txBody>
+          <a:bodyPr>
+            <a:normAutofit/>
+          </a:bodyPr>
+          <a:lstStyle/>
+          <a:p>
+            <a:r>
+              <a:rPr lang="en-US" b="1" dirty="0"/>
+              <a:t>PREPARE THE FOLLOWING BEFORE DAY 2</a:t>
+            </a:r>
+          </a:p>
+          <a:p>
+            <a:pPr marL="742967" indent="-571500">
+              <a:buClr>
+                <a:schemeClr val="tx2"/>
+              </a:buClr>
+              <a:buFont typeface="Arial" panose="020B0604020202020204" pitchFamily="34" charset="0"/>
+              <a:buChar char="•"/>
+            </a:pPr>
+            <a:r>
+              <a:rPr lang="en-US" dirty="0"/>
+              <a:t>HR drafts JOA with competency names and definitions, the most critical job tasks from the job task exercise, and a few sentences from the PD that describes the position in the context of the agency – will be reviewed as a team on Day 2</a:t>
+            </a:r>
+          </a:p>
+          <a:p>
+            <a:pPr marL="742967" indent="-571500">
+              <a:buClr>
+                <a:schemeClr val="tx2"/>
+              </a:buClr>
+              <a:buFont typeface="Arial" panose="020B0604020202020204" pitchFamily="34" charset="0"/>
+              <a:buChar char="•"/>
+            </a:pPr>
+            <a:r>
+              <a:rPr lang="en-US" dirty="0"/>
+              <a:t>Competencies and proficiencies in a single doc for use on Day 2</a:t>
+            </a:r>
+          </a:p>
+          <a:p>
+            <a:pPr marL="742967" indent="-571500">
+              <a:buClr>
+                <a:schemeClr val="tx2"/>
+              </a:buClr>
+              <a:buFont typeface="Arial" panose="020B0604020202020204" pitchFamily="34" charset="0"/>
+              <a:buChar char="•"/>
+            </a:pPr>
+            <a:r>
+              <a:rPr lang="en-US" dirty="0"/>
+              <a:t>Reminder: Resumes (4-5) related to this job for practice resume review (Agency Talent Portal, LinkedIn, etc.)</a:t>
+            </a:r>
+          </a:p>
+          <a:p>
+            <a:pPr marL="742967" indent="-571500">
+              <a:buClr>
+                <a:schemeClr val="tx2"/>
+              </a:buClr>
+              <a:buFont typeface="Arial" panose="020B0604020202020204" pitchFamily="34" charset="0"/>
+              <a:buChar char="•"/>
+            </a:pPr>
+            <a:endParaRPr lang="en-US" dirty="0"/>
+          </a:p>
+          <a:p>
+            <a:pPr marL="742967" indent="-571500">
+              <a:buClr>
+                <a:schemeClr val="tx2"/>
+              </a:buClr>
+              <a:buFont typeface="Arial" panose="020B0604020202020204" pitchFamily="34" charset="0"/>
+              <a:buChar char="•"/>
+            </a:pPr>
+            <a:endParaRPr lang="en-US" dirty="0"/>
+          </a:p>
+          <a:p>
+            <a:endParaRPr lang="en-US" dirty="0"/>
+          </a:p>
+        </p:txBody>
+      </p:sp>
+    </p:spTree>
+    <p:extLst>
+      <p:ext uri="{BB962C8B-B14F-4D97-AF65-F5344CB8AC3E}">
+        <p14:creationId xmlns:p14="http://schemas.microsoft.com/office/powerpoint/2010/main" val="2239205312"/>
+      </p:ext>
+    </p:extLst>
+  </p:cSld>
+  <p:clrMapOvr>
+    <a:masterClrMapping/>
+  </p:clrMapOvr>
+</p:sld>
+</file>
+
+<file path=ppt/slides/slide18.xml><?xml version="1.0" encoding="utf-8"?>
+<p:sld xmlns:a="http://schemas.openxmlformats.org/drawingml/2006/main" xmlns:r="http://schemas.openxmlformats.org/officeDocument/2006/relationships" xmlns:p="http://schemas.openxmlformats.org/presentationml/2006/main">
+  <p:cSld>
+    <p:spTree>
+      <p:nvGrpSpPr>
+        <p:cNvPr id="1" name="Shape 307"/>
+        <p:cNvGrpSpPr/>
+        <p:nvPr/>
+      </p:nvGrpSpPr>
+      <p:grpSpPr>
+        <a:xfrm>
+          <a:off x="0" y="0"/>
+          <a:ext cx="0" cy="0"/>
+          <a:chOff x="0" y="0"/>
+          <a:chExt cx="0" cy="0"/>
+        </a:xfrm>
+      </p:grpSpPr>
+      <p:sp>
+        <p:nvSpPr>
+          <p:cNvPr id="4" name="Google Shape;68;p20">
+            <a:extLst>
+              <a:ext uri="{FF2B5EF4-FFF2-40B4-BE49-F238E27FC236}">
+                <a16:creationId xmlns:a16="http://schemas.microsoft.com/office/drawing/2014/main" id="{FF013F16-4A52-9A45-B7A8-5DE84E4CEFE2}"/>
+              </a:ext>
+            </a:extLst>
+          </p:cNvPr>
+          <p:cNvSpPr txBox="1">
+            <a:spLocks noGrp="1"/>
+          </p:cNvSpPr>
+          <p:nvPr>
+            <p:ph type="body" idx="1"/>
+          </p:nvPr>
+        </p:nvSpPr>
+        <p:spPr>
+          <a:xfrm>
+            <a:off x="2308393" y="4027713"/>
+            <a:ext cx="12723989" cy="2893800"/>
+          </a:xfrm>
+        </p:spPr>
+        <p:txBody>
+          <a:bodyPr>
+            <a:normAutofit/>
+          </a:bodyPr>
+          <a:lstStyle/>
+          <a:p>
+            <a:pPr lvl="0"/>
+            <a:r>
+              <a:rPr lang="en-US" dirty="0">
+                <a:sym typeface="Cambria"/>
+              </a:rPr>
               <a:t>Start of Day 2 Presentation</a:t>
             </a:r>
             <a:endParaRPr lang="en-US" dirty="0"/>
@@ -8190,7 +8694,7 @@
 </p:sld>
 </file>
 
-<file path=ppt/slides/slide17.xml><?xml version="1.0" encoding="utf-8"?>
+<file path=ppt/slides/slide19.xml><?xml version="1.0" encoding="utf-8"?>
 <p:sld xmlns:a="http://schemas.openxmlformats.org/drawingml/2006/main" xmlns:r="http://schemas.openxmlformats.org/officeDocument/2006/relationships" xmlns:p="http://schemas.openxmlformats.org/presentationml/2006/main">
   <p:cSld>
     <p:spTree>
@@ -8240,251 +8744,6 @@
     <p:extLst>
       <p:ext uri="{BB962C8B-B14F-4D97-AF65-F5344CB8AC3E}">
         <p14:creationId xmlns:p14="http://schemas.microsoft.com/office/powerpoint/2010/main" val="1311351790"/>
-      </p:ext>
-    </p:extLst>
-  </p:cSld>
-  <p:clrMapOvr>
-    <a:masterClrMapping/>
-  </p:clrMapOvr>
-</p:sld>
-</file>
-
-<file path=ppt/slides/slide18.xml><?xml version="1.0" encoding="utf-8"?>
-<p:sld xmlns:a="http://schemas.openxmlformats.org/drawingml/2006/main" xmlns:r="http://schemas.openxmlformats.org/officeDocument/2006/relationships" xmlns:p="http://schemas.openxmlformats.org/presentationml/2006/main">
-  <p:cSld>
-    <p:spTree>
-      <p:nvGrpSpPr>
-        <p:cNvPr id="1" name="Shape 73"/>
-        <p:cNvGrpSpPr/>
-        <p:nvPr/>
-      </p:nvGrpSpPr>
-      <p:grpSpPr>
-        <a:xfrm>
-          <a:off x="0" y="0"/>
-          <a:ext cx="0" cy="0"/>
-          <a:chOff x="0" y="0"/>
-          <a:chExt cx="0" cy="0"/>
-        </a:xfrm>
-      </p:grpSpPr>
-      <p:sp>
-        <p:nvSpPr>
-          <p:cNvPr id="74" name="Google Shape;74;p21"/>
-          <p:cNvSpPr txBox="1">
-            <a:spLocks noGrp="1"/>
-          </p:cNvSpPr>
-          <p:nvPr>
-            <p:ph type="title"/>
-          </p:nvPr>
-        </p:nvSpPr>
-        <p:spPr>
-          <a:xfrm>
-            <a:off x="1192143" y="519298"/>
-            <a:ext cx="16148120" cy="1290459"/>
-          </a:xfrm>
-        </p:spPr>
-        <p:txBody>
-          <a:bodyPr/>
-          <a:lstStyle/>
-          <a:p>
-            <a:pPr lvl="0"/>
-            <a:r>
-              <a:rPr lang="en-US" sz="3400" dirty="0"/>
-              <a:t>Agenda for Today: REVIEW JOA        Write questions</a:t>
-            </a:r>
-          </a:p>
-        </p:txBody>
-      </p:sp>
-      <p:sp>
-        <p:nvSpPr>
-          <p:cNvPr id="2" name="Text Placeholder 1">
-            <a:extLst>
-              <a:ext uri="{FF2B5EF4-FFF2-40B4-BE49-F238E27FC236}">
-                <a16:creationId xmlns:a16="http://schemas.microsoft.com/office/drawing/2014/main" id="{F7672C36-486C-0348-B94D-9EE828C96310}"/>
-              </a:ext>
-            </a:extLst>
-          </p:cNvPr>
-          <p:cNvSpPr>
-            <a:spLocks noGrp="1"/>
-          </p:cNvSpPr>
-          <p:nvPr>
-            <p:ph type="body" idx="1"/>
-          </p:nvPr>
-        </p:nvSpPr>
-        <p:spPr>
-          <a:xfrm>
-            <a:off x="1192143" y="1841500"/>
-            <a:ext cx="14956057" cy="7392802"/>
-          </a:xfrm>
-          <a:noFill/>
-          <a:ln>
-            <a:noFill/>
-          </a:ln>
-        </p:spPr>
-        <p:txBody>
-          <a:bodyPr spcFirstLastPara="1" wrap="square" lIns="0" tIns="0" rIns="0" bIns="0" anchor="t" anchorCtr="0">
-            <a:normAutofit fontScale="92500"/>
-          </a:bodyPr>
-          <a:lstStyle/>
-          <a:p>
-            <a:r>
-              <a:rPr lang="en-US" dirty="0"/>
-              <a:t>See new USAJOBS format, review the draft JOA (30 min)</a:t>
-            </a:r>
-          </a:p>
-          <a:p>
-            <a:r>
-              <a:rPr lang="en-US" dirty="0"/>
-              <a:t>Refine competencies and proficiency levels through resume review (1 hr)</a:t>
-            </a:r>
-          </a:p>
-          <a:p>
-            <a:r>
-              <a:rPr lang="en-US" dirty="0"/>
-              <a:t>Learn about and write structured interview questions (2 </a:t>
-            </a:r>
-            <a:r>
-              <a:rPr lang="en-US" dirty="0" err="1"/>
-              <a:t>hrs</a:t>
-            </a:r>
-            <a:r>
-              <a:rPr lang="en-US" dirty="0"/>
-              <a:t>)</a:t>
-            </a:r>
-          </a:p>
-          <a:p>
-            <a:r>
-              <a:rPr lang="en-US" dirty="0"/>
-              <a:t>Present breadth and depth questions and answers for refinement and feedback (2 hr)</a:t>
-            </a:r>
-          </a:p>
-          <a:p>
-            <a:r>
-              <a:rPr lang="en-US" dirty="0"/>
-              <a:t>Plan schedule of SME training, resume reviews, and interviews (15 min)</a:t>
-            </a:r>
-          </a:p>
-          <a:p>
-            <a:r>
-              <a:rPr lang="en-US" dirty="0"/>
-              <a:t>Day 3 preview: refine questions via mock interviews</a:t>
-            </a:r>
-          </a:p>
-        </p:txBody>
-      </p:sp>
-      <p:sp>
-        <p:nvSpPr>
-          <p:cNvPr id="3" name="Right Arrow 2">
-            <a:extLst>
-              <a:ext uri="{FF2B5EF4-FFF2-40B4-BE49-F238E27FC236}">
-                <a16:creationId xmlns:a16="http://schemas.microsoft.com/office/drawing/2014/main" id="{08E65AE0-39F9-FC41-BD3B-48B7CC96635D}"/>
-              </a:ext>
-            </a:extLst>
-          </p:cNvPr>
-          <p:cNvSpPr/>
-          <p:nvPr/>
-        </p:nvSpPr>
-        <p:spPr>
-          <a:xfrm>
-            <a:off x="9113905" y="641453"/>
-            <a:ext cx="368808" cy="367855"/>
-          </a:xfrm>
-          <a:prstGeom prst="rightArrow">
-            <a:avLst/>
-          </a:prstGeom>
-          <a:solidFill>
-            <a:schemeClr val="tx2"/>
-          </a:solidFill>
-          <a:ln>
-            <a:noFill/>
-          </a:ln>
-        </p:spPr>
-        <p:style>
-          <a:lnRef idx="2">
-            <a:schemeClr val="accent1">
-              <a:shade val="50000"/>
-            </a:schemeClr>
-          </a:lnRef>
-          <a:fillRef idx="1">
-            <a:schemeClr val="accent1"/>
-          </a:fillRef>
-          <a:effectRef idx="0">
-            <a:schemeClr val="accent1"/>
-          </a:effectRef>
-          <a:fontRef idx="minor">
-            <a:schemeClr val="lt1"/>
-          </a:fontRef>
-        </p:style>
-        <p:txBody>
-          <a:bodyPr rtlCol="0" anchor="ctr"/>
-          <a:lstStyle/>
-          <a:p>
-            <a:pPr algn="ctr"/>
-            <a:endParaRPr lang="en-US"/>
-          </a:p>
-        </p:txBody>
-      </p:sp>
-    </p:spTree>
-    <p:extLst>
-      <p:ext uri="{BB962C8B-B14F-4D97-AF65-F5344CB8AC3E}">
-        <p14:creationId xmlns:p14="http://schemas.microsoft.com/office/powerpoint/2010/main" val="3969998700"/>
-      </p:ext>
-    </p:extLst>
-  </p:cSld>
-  <p:clrMapOvr>
-    <a:masterClrMapping/>
-  </p:clrMapOvr>
-</p:sld>
-</file>
-
-<file path=ppt/slides/slide19.xml><?xml version="1.0" encoding="utf-8"?>
-<p:sld xmlns:a="http://schemas.openxmlformats.org/drawingml/2006/main" xmlns:r="http://schemas.openxmlformats.org/officeDocument/2006/relationships" xmlns:p="http://schemas.openxmlformats.org/presentationml/2006/main">
-  <p:cSld>
-    <p:spTree>
-      <p:nvGrpSpPr>
-        <p:cNvPr id="1" name=""/>
-        <p:cNvGrpSpPr/>
-        <p:nvPr/>
-      </p:nvGrpSpPr>
-      <p:grpSpPr>
-        <a:xfrm>
-          <a:off x="0" y="0"/>
-          <a:ext cx="0" cy="0"/>
-          <a:chOff x="0" y="0"/>
-          <a:chExt cx="0" cy="0"/>
-        </a:xfrm>
-      </p:grpSpPr>
-      <p:sp>
-        <p:nvSpPr>
-          <p:cNvPr id="2" name="Title 1">
-            <a:extLst>
-              <a:ext uri="{FF2B5EF4-FFF2-40B4-BE49-F238E27FC236}">
-                <a16:creationId xmlns:a16="http://schemas.microsoft.com/office/drawing/2014/main" id="{E0E56BF6-C2AA-1542-B427-9F99DA225EFE}"/>
-              </a:ext>
-            </a:extLst>
-          </p:cNvPr>
-          <p:cNvSpPr>
-            <a:spLocks noGrp="1"/>
-          </p:cNvSpPr>
-          <p:nvPr>
-            <p:ph type="title"/>
-          </p:nvPr>
-        </p:nvSpPr>
-        <p:spPr/>
-        <p:txBody>
-          <a:bodyPr/>
-          <a:lstStyle/>
-          <a:p>
-            <a:r>
-              <a:rPr lang="en-US" dirty="0"/>
-              <a:t>Practice resume review with the competencies</a:t>
-            </a:r>
-          </a:p>
-        </p:txBody>
-      </p:sp>
-    </p:spTree>
-    <p:extLst>
-      <p:ext uri="{BB962C8B-B14F-4D97-AF65-F5344CB8AC3E}">
-        <p14:creationId xmlns:p14="http://schemas.microsoft.com/office/powerpoint/2010/main" val="3440917198"/>
       </p:ext>
     </p:extLst>
   </p:cSld>
@@ -8637,6 +8896,251 @@
   <p:cSld>
     <p:spTree>
       <p:nvGrpSpPr>
+        <p:cNvPr id="1" name="Shape 73"/>
+        <p:cNvGrpSpPr/>
+        <p:nvPr/>
+      </p:nvGrpSpPr>
+      <p:grpSpPr>
+        <a:xfrm>
+          <a:off x="0" y="0"/>
+          <a:ext cx="0" cy="0"/>
+          <a:chOff x="0" y="0"/>
+          <a:chExt cx="0" cy="0"/>
+        </a:xfrm>
+      </p:grpSpPr>
+      <p:sp>
+        <p:nvSpPr>
+          <p:cNvPr id="74" name="Google Shape;74;p21"/>
+          <p:cNvSpPr txBox="1">
+            <a:spLocks noGrp="1"/>
+          </p:cNvSpPr>
+          <p:nvPr>
+            <p:ph type="title"/>
+          </p:nvPr>
+        </p:nvSpPr>
+        <p:spPr>
+          <a:xfrm>
+            <a:off x="1192143" y="519298"/>
+            <a:ext cx="16148120" cy="1290459"/>
+          </a:xfrm>
+        </p:spPr>
+        <p:txBody>
+          <a:bodyPr/>
+          <a:lstStyle/>
+          <a:p>
+            <a:pPr lvl="0"/>
+            <a:r>
+              <a:rPr lang="en-US" sz="3400" dirty="0"/>
+              <a:t>Agenda for Today: REVIEW JOA        Write questions</a:t>
+            </a:r>
+          </a:p>
+        </p:txBody>
+      </p:sp>
+      <p:sp>
+        <p:nvSpPr>
+          <p:cNvPr id="2" name="Text Placeholder 1">
+            <a:extLst>
+              <a:ext uri="{FF2B5EF4-FFF2-40B4-BE49-F238E27FC236}">
+                <a16:creationId xmlns:a16="http://schemas.microsoft.com/office/drawing/2014/main" id="{F7672C36-486C-0348-B94D-9EE828C96310}"/>
+              </a:ext>
+            </a:extLst>
+          </p:cNvPr>
+          <p:cNvSpPr>
+            <a:spLocks noGrp="1"/>
+          </p:cNvSpPr>
+          <p:nvPr>
+            <p:ph type="body" idx="1"/>
+          </p:nvPr>
+        </p:nvSpPr>
+        <p:spPr>
+          <a:xfrm>
+            <a:off x="1192143" y="1841500"/>
+            <a:ext cx="14956057" cy="7392802"/>
+          </a:xfrm>
+          <a:noFill/>
+          <a:ln>
+            <a:noFill/>
+          </a:ln>
+        </p:spPr>
+        <p:txBody>
+          <a:bodyPr spcFirstLastPara="1" wrap="square" lIns="0" tIns="0" rIns="0" bIns="0" anchor="t" anchorCtr="0">
+            <a:normAutofit fontScale="92500"/>
+          </a:bodyPr>
+          <a:lstStyle/>
+          <a:p>
+            <a:r>
+              <a:rPr lang="en-US" dirty="0"/>
+              <a:t>See new USAJOBS format, review the draft JOA (30 min)</a:t>
+            </a:r>
+          </a:p>
+          <a:p>
+            <a:r>
+              <a:rPr lang="en-US" dirty="0"/>
+              <a:t>Refine competencies and proficiency levels through resume review (1 hr)</a:t>
+            </a:r>
+          </a:p>
+          <a:p>
+            <a:r>
+              <a:rPr lang="en-US" dirty="0"/>
+              <a:t>Learn about and write structured interview questions (2 </a:t>
+            </a:r>
+            <a:r>
+              <a:rPr lang="en-US" dirty="0" err="1"/>
+              <a:t>hrs</a:t>
+            </a:r>
+            <a:r>
+              <a:rPr lang="en-US" dirty="0"/>
+              <a:t>)</a:t>
+            </a:r>
+          </a:p>
+          <a:p>
+            <a:r>
+              <a:rPr lang="en-US" dirty="0"/>
+              <a:t>Present breadth and depth questions and answers for refinement and feedback (2 hr)</a:t>
+            </a:r>
+          </a:p>
+          <a:p>
+            <a:r>
+              <a:rPr lang="en-US" dirty="0"/>
+              <a:t>Plan schedule of SME training, resume reviews, and interviews (15 min)</a:t>
+            </a:r>
+          </a:p>
+          <a:p>
+            <a:r>
+              <a:rPr lang="en-US" dirty="0"/>
+              <a:t>Day 3 preview: refine questions via mock interviews</a:t>
+            </a:r>
+          </a:p>
+        </p:txBody>
+      </p:sp>
+      <p:sp>
+        <p:nvSpPr>
+          <p:cNvPr id="3" name="Right Arrow 2">
+            <a:extLst>
+              <a:ext uri="{FF2B5EF4-FFF2-40B4-BE49-F238E27FC236}">
+                <a16:creationId xmlns:a16="http://schemas.microsoft.com/office/drawing/2014/main" id="{08E65AE0-39F9-FC41-BD3B-48B7CC96635D}"/>
+              </a:ext>
+            </a:extLst>
+          </p:cNvPr>
+          <p:cNvSpPr/>
+          <p:nvPr/>
+        </p:nvSpPr>
+        <p:spPr>
+          <a:xfrm>
+            <a:off x="9113905" y="641453"/>
+            <a:ext cx="368808" cy="367855"/>
+          </a:xfrm>
+          <a:prstGeom prst="rightArrow">
+            <a:avLst/>
+          </a:prstGeom>
+          <a:solidFill>
+            <a:schemeClr val="tx2"/>
+          </a:solidFill>
+          <a:ln>
+            <a:noFill/>
+          </a:ln>
+        </p:spPr>
+        <p:style>
+          <a:lnRef idx="2">
+            <a:schemeClr val="accent1">
+              <a:shade val="50000"/>
+            </a:schemeClr>
+          </a:lnRef>
+          <a:fillRef idx="1">
+            <a:schemeClr val="accent1"/>
+          </a:fillRef>
+          <a:effectRef idx="0">
+            <a:schemeClr val="accent1"/>
+          </a:effectRef>
+          <a:fontRef idx="minor">
+            <a:schemeClr val="lt1"/>
+          </a:fontRef>
+        </p:style>
+        <p:txBody>
+          <a:bodyPr rtlCol="0" anchor="ctr"/>
+          <a:lstStyle/>
+          <a:p>
+            <a:pPr algn="ctr"/>
+            <a:endParaRPr lang="en-US"/>
+          </a:p>
+        </p:txBody>
+      </p:sp>
+    </p:spTree>
+    <p:extLst>
+      <p:ext uri="{BB962C8B-B14F-4D97-AF65-F5344CB8AC3E}">
+        <p14:creationId xmlns:p14="http://schemas.microsoft.com/office/powerpoint/2010/main" val="3969998700"/>
+      </p:ext>
+    </p:extLst>
+  </p:cSld>
+  <p:clrMapOvr>
+    <a:masterClrMapping/>
+  </p:clrMapOvr>
+</p:sld>
+</file>
+
+<file path=ppt/slides/slide21.xml><?xml version="1.0" encoding="utf-8"?>
+<p:sld xmlns:a="http://schemas.openxmlformats.org/drawingml/2006/main" xmlns:r="http://schemas.openxmlformats.org/officeDocument/2006/relationships" xmlns:p="http://schemas.openxmlformats.org/presentationml/2006/main">
+  <p:cSld>
+    <p:spTree>
+      <p:nvGrpSpPr>
+        <p:cNvPr id="1" name=""/>
+        <p:cNvGrpSpPr/>
+        <p:nvPr/>
+      </p:nvGrpSpPr>
+      <p:grpSpPr>
+        <a:xfrm>
+          <a:off x="0" y="0"/>
+          <a:ext cx="0" cy="0"/>
+          <a:chOff x="0" y="0"/>
+          <a:chExt cx="0" cy="0"/>
+        </a:xfrm>
+      </p:grpSpPr>
+      <p:sp>
+        <p:nvSpPr>
+          <p:cNvPr id="2" name="Title 1">
+            <a:extLst>
+              <a:ext uri="{FF2B5EF4-FFF2-40B4-BE49-F238E27FC236}">
+                <a16:creationId xmlns:a16="http://schemas.microsoft.com/office/drawing/2014/main" id="{E0E56BF6-C2AA-1542-B427-9F99DA225EFE}"/>
+              </a:ext>
+            </a:extLst>
+          </p:cNvPr>
+          <p:cNvSpPr>
+            <a:spLocks noGrp="1"/>
+          </p:cNvSpPr>
+          <p:nvPr>
+            <p:ph type="title"/>
+          </p:nvPr>
+        </p:nvSpPr>
+        <p:spPr/>
+        <p:txBody>
+          <a:bodyPr/>
+          <a:lstStyle/>
+          <a:p>
+            <a:r>
+              <a:rPr lang="en-US" dirty="0"/>
+              <a:t>Practice resume review with the competencies</a:t>
+            </a:r>
+          </a:p>
+        </p:txBody>
+      </p:sp>
+    </p:spTree>
+    <p:extLst>
+      <p:ext uri="{BB962C8B-B14F-4D97-AF65-F5344CB8AC3E}">
+        <p14:creationId xmlns:p14="http://schemas.microsoft.com/office/powerpoint/2010/main" val="3440917198"/>
+      </p:ext>
+    </p:extLst>
+  </p:cSld>
+  <p:clrMapOvr>
+    <a:masterClrMapping/>
+  </p:clrMapOvr>
+</p:sld>
+</file>
+
+<file path=ppt/slides/slide22.xml><?xml version="1.0" encoding="utf-8"?>
+<p:sld xmlns:a="http://schemas.openxmlformats.org/drawingml/2006/main" xmlns:r="http://schemas.openxmlformats.org/officeDocument/2006/relationships" xmlns:p="http://schemas.openxmlformats.org/presentationml/2006/main">
+  <p:cSld>
+    <p:spTree>
+      <p:nvGrpSpPr>
         <p:cNvPr id="1" name=""/>
         <p:cNvGrpSpPr/>
         <p:nvPr/>
@@ -8737,7 +9241,7 @@
 </p:sld>
 </file>
 
-<file path=ppt/slides/slide21.xml><?xml version="1.0" encoding="utf-8"?>
+<file path=ppt/slides/slide23.xml><?xml version="1.0" encoding="utf-8"?>
 <p:sld xmlns:a="http://schemas.openxmlformats.org/drawingml/2006/main" xmlns:r="http://schemas.openxmlformats.org/officeDocument/2006/relationships" xmlns:p="http://schemas.openxmlformats.org/presentationml/2006/main">
   <p:cSld>
     <p:spTree>
@@ -8841,7 +9345,7 @@
 </p:sld>
 </file>
 
-<file path=ppt/slides/slide22.xml><?xml version="1.0" encoding="utf-8"?>
+<file path=ppt/slides/slide24.xml><?xml version="1.0" encoding="utf-8"?>
 <p:sld xmlns:a="http://schemas.openxmlformats.org/drawingml/2006/main" xmlns:r="http://schemas.openxmlformats.org/officeDocument/2006/relationships" xmlns:p="http://schemas.openxmlformats.org/presentationml/2006/main">
   <p:cSld>
     <p:spTree>
@@ -9963,7 +10467,7 @@
 </p:sld>
 </file>
 
-<file path=ppt/slides/slide23.xml><?xml version="1.0" encoding="utf-8"?>
+<file path=ppt/slides/slide25.xml><?xml version="1.0" encoding="utf-8"?>
 <p:sld xmlns:a="http://schemas.openxmlformats.org/drawingml/2006/main" xmlns:r="http://schemas.openxmlformats.org/officeDocument/2006/relationships" xmlns:p="http://schemas.openxmlformats.org/presentationml/2006/main">
   <p:cSld>
     <p:spTree>
@@ -10096,7 +10600,7 @@
 </p:sld>
 </file>
 
-<file path=ppt/slides/slide24.xml><?xml version="1.0" encoding="utf-8"?>
+<file path=ppt/slides/slide26.xml><?xml version="1.0" encoding="utf-8"?>
 <p:sld xmlns:a="http://schemas.openxmlformats.org/drawingml/2006/main" xmlns:r="http://schemas.openxmlformats.org/officeDocument/2006/relationships" xmlns:p="http://schemas.openxmlformats.org/presentationml/2006/main">
   <p:cSld>
     <p:spTree>
@@ -10223,7 +10727,7 @@
 </p:sld>
 </file>
 
-<file path=ppt/slides/slide25.xml><?xml version="1.0" encoding="utf-8"?>
+<file path=ppt/slides/slide27.xml><?xml version="1.0" encoding="utf-8"?>
 <p:sld xmlns:a="http://schemas.openxmlformats.org/drawingml/2006/main" xmlns:r="http://schemas.openxmlformats.org/officeDocument/2006/relationships" xmlns:p="http://schemas.openxmlformats.org/presentationml/2006/main">
   <p:cSld>
     <p:spTree>
@@ -10327,7 +10831,7 @@
 </p:sld>
 </file>
 
-<file path=ppt/slides/slide26.xml><?xml version="1.0" encoding="utf-8"?>
+<file path=ppt/slides/slide28.xml><?xml version="1.0" encoding="utf-8"?>
 <p:sld xmlns:a="http://schemas.openxmlformats.org/drawingml/2006/main" xmlns:r="http://schemas.openxmlformats.org/officeDocument/2006/relationships" xmlns:p="http://schemas.openxmlformats.org/presentationml/2006/main">
   <p:cSld>
     <p:spTree>
@@ -10467,7 +10971,7 @@
 </p:sld>
 </file>
 
-<file path=ppt/slides/slide27.xml><?xml version="1.0" encoding="utf-8"?>
+<file path=ppt/slides/slide29.xml><?xml version="1.0" encoding="utf-8"?>
 <p:sld xmlns:a="http://schemas.openxmlformats.org/drawingml/2006/main" xmlns:r="http://schemas.openxmlformats.org/officeDocument/2006/relationships" xmlns:p="http://schemas.openxmlformats.org/presentationml/2006/main">
   <p:cSld>
     <p:spTree>
@@ -10580,64 +11084,6 @@
     <p:extLst>
       <p:ext uri="{BB962C8B-B14F-4D97-AF65-F5344CB8AC3E}">
         <p14:creationId xmlns:p14="http://schemas.microsoft.com/office/powerpoint/2010/main" val="3229110467"/>
-      </p:ext>
-    </p:extLst>
-  </p:cSld>
-  <p:clrMapOvr>
-    <a:masterClrMapping/>
-  </p:clrMapOvr>
-</p:sld>
-</file>
-
-<file path=ppt/slides/slide28.xml><?xml version="1.0" encoding="utf-8"?>
-<p:sld xmlns:a="http://schemas.openxmlformats.org/drawingml/2006/main" xmlns:r="http://schemas.openxmlformats.org/officeDocument/2006/relationships" xmlns:p="http://schemas.openxmlformats.org/presentationml/2006/main">
-  <p:cSld>
-    <p:spTree>
-      <p:nvGrpSpPr>
-        <p:cNvPr id="1" name="Shape 307"/>
-        <p:cNvGrpSpPr/>
-        <p:nvPr/>
-      </p:nvGrpSpPr>
-      <p:grpSpPr>
-        <a:xfrm>
-          <a:off x="0" y="0"/>
-          <a:ext cx="0" cy="0"/>
-          <a:chOff x="0" y="0"/>
-          <a:chExt cx="0" cy="0"/>
-        </a:xfrm>
-      </p:grpSpPr>
-      <p:sp>
-        <p:nvSpPr>
-          <p:cNvPr id="2" name="Text Placeholder 1">
-            <a:extLst>
-              <a:ext uri="{FF2B5EF4-FFF2-40B4-BE49-F238E27FC236}">
-                <a16:creationId xmlns:a16="http://schemas.microsoft.com/office/drawing/2014/main" id="{869287C3-7579-1A46-84D5-F80BC36BAECA}"/>
-              </a:ext>
-            </a:extLst>
-          </p:cNvPr>
-          <p:cNvSpPr>
-            <a:spLocks noGrp="1"/>
-          </p:cNvSpPr>
-          <p:nvPr>
-            <p:ph type="body" idx="1"/>
-          </p:nvPr>
-        </p:nvSpPr>
-        <p:spPr/>
-        <p:txBody>
-          <a:bodyPr/>
-          <a:lstStyle/>
-          <a:p>
-            <a:r>
-              <a:rPr lang="en-US" dirty="0"/>
-              <a:t>The End</a:t>
-            </a:r>
-          </a:p>
-        </p:txBody>
-      </p:sp>
-    </p:spTree>
-    <p:extLst>
-      <p:ext uri="{BB962C8B-B14F-4D97-AF65-F5344CB8AC3E}">
-        <p14:creationId xmlns:p14="http://schemas.microsoft.com/office/powerpoint/2010/main" val="1713396560"/>
       </p:ext>
     </p:extLst>
   </p:cSld>
@@ -10697,6 +11143,64 @@
     <p:extLst>
       <p:ext uri="{BB962C8B-B14F-4D97-AF65-F5344CB8AC3E}">
         <p14:creationId xmlns:p14="http://schemas.microsoft.com/office/powerpoint/2010/main" val="1452944171"/>
+      </p:ext>
+    </p:extLst>
+  </p:cSld>
+  <p:clrMapOvr>
+    <a:masterClrMapping/>
+  </p:clrMapOvr>
+</p:sld>
+</file>
+
+<file path=ppt/slides/slide30.xml><?xml version="1.0" encoding="utf-8"?>
+<p:sld xmlns:a="http://schemas.openxmlformats.org/drawingml/2006/main" xmlns:r="http://schemas.openxmlformats.org/officeDocument/2006/relationships" xmlns:p="http://schemas.openxmlformats.org/presentationml/2006/main">
+  <p:cSld>
+    <p:spTree>
+      <p:nvGrpSpPr>
+        <p:cNvPr id="1" name="Shape 307"/>
+        <p:cNvGrpSpPr/>
+        <p:nvPr/>
+      </p:nvGrpSpPr>
+      <p:grpSpPr>
+        <a:xfrm>
+          <a:off x="0" y="0"/>
+          <a:ext cx="0" cy="0"/>
+          <a:chOff x="0" y="0"/>
+          <a:chExt cx="0" cy="0"/>
+        </a:xfrm>
+      </p:grpSpPr>
+      <p:sp>
+        <p:nvSpPr>
+          <p:cNvPr id="2" name="Text Placeholder 1">
+            <a:extLst>
+              <a:ext uri="{FF2B5EF4-FFF2-40B4-BE49-F238E27FC236}">
+                <a16:creationId xmlns:a16="http://schemas.microsoft.com/office/drawing/2014/main" id="{869287C3-7579-1A46-84D5-F80BC36BAECA}"/>
+              </a:ext>
+            </a:extLst>
+          </p:cNvPr>
+          <p:cNvSpPr>
+            <a:spLocks noGrp="1"/>
+          </p:cNvSpPr>
+          <p:nvPr>
+            <p:ph type="body" idx="1"/>
+          </p:nvPr>
+        </p:nvSpPr>
+        <p:spPr/>
+        <p:txBody>
+          <a:bodyPr/>
+          <a:lstStyle/>
+          <a:p>
+            <a:r>
+              <a:rPr lang="en-US" dirty="0"/>
+              <a:t>The End</a:t>
+            </a:r>
+          </a:p>
+        </p:txBody>
+      </p:sp>
+    </p:spTree>
+    <p:extLst>
+      <p:ext uri="{BB962C8B-B14F-4D97-AF65-F5344CB8AC3E}">
+        <p14:creationId xmlns:p14="http://schemas.microsoft.com/office/powerpoint/2010/main" val="1713396560"/>
       </p:ext>
     </p:extLst>
   </p:cSld>
@@ -11050,7 +11554,7 @@
             <a:pPr lvl="0"/>
             <a:r>
               <a:rPr lang="en-US" dirty="0"/>
-              <a:t>Job Task Exercise</a:t>
+              <a:t>Caveats</a:t>
             </a:r>
           </a:p>
         </p:txBody>
@@ -11074,31 +11578,14 @@
           <a:p>
             <a:r>
               <a:rPr lang="en-US" dirty="0"/>
-              <a:t>Be specific—actual tasks performed in the past month.</a:t>
+              <a:t>If you’re here, you can’t apply for the job</a:t>
             </a:r>
           </a:p>
           <a:p>
             <a:r>
               <a:rPr lang="en-US" dirty="0"/>
-              <a:t>The tasks should begin with a verb, indicating that they’re an action a person in that position would actively and </a:t>
-            </a:r>
-            <a:r>
-              <a:rPr lang="en-US" dirty="0" err="1"/>
-              <a:t>regularily</a:t>
-            </a:r>
-            <a:r>
-              <a:rPr lang="en-US" dirty="0"/>
-              <a:t> take.</a:t>
-            </a:r>
-          </a:p>
-          <a:p>
-            <a:r>
-              <a:rPr lang="en-US" dirty="0"/>
-              <a:t>Write one task per sticky note. Aim to write 10-15 tasks.</a:t>
-            </a:r>
-          </a:p>
-          <a:p>
-            <a:endParaRPr lang="en-US" dirty="0"/>
+              <a:t>Once the workshop moves into proficiencies, assessments, and any other subjects not published on the job announcement, all materials and discussion must be kept confidential.</a:t>
+            </a:r>
           </a:p>
         </p:txBody>
       </p:sp>
@@ -11150,7 +11637,7 @@
             <a:pPr lvl="0"/>
             <a:r>
               <a:rPr lang="en-US" dirty="0"/>
-              <a:t>Collection and Grouping Exercise</a:t>
+              <a:t>Job Task Exercise</a:t>
             </a:r>
           </a:p>
         </p:txBody>
@@ -11174,13 +11661,31 @@
           <a:p>
             <a:r>
               <a:rPr lang="en-US" dirty="0"/>
-              <a:t>We will group similar tasks, then give each group a title.</a:t>
+              <a:t>As a group, write down job tasks done by this position.</a:t>
             </a:r>
           </a:p>
           <a:p>
             <a:r>
               <a:rPr lang="en-US" dirty="0"/>
-              <a:t>These titles are the competencies for this job.</a:t>
+              <a:t>The tasks should begin with a verb, indicating that they’re an action a person in that position would actively and regularly take.</a:t>
+            </a:r>
+          </a:p>
+          <a:p>
+            <a:r>
+              <a:rPr lang="en-US" dirty="0"/>
+              <a:t>Be specific—actual tasks performed in the past month.</a:t>
+            </a:r>
+          </a:p>
+          <a:p>
+            <a:r>
+              <a:rPr lang="en-US" dirty="0"/>
+              <a:t>Write one task per sticky note. Aim to write at least 10-15 tasks.</a:t>
+            </a:r>
+          </a:p>
+          <a:p>
+            <a:r>
+              <a:rPr lang="en-US" dirty="0"/>
+              <a:t>We will analyze the tasks as a group – please work individually</a:t>
             </a:r>
           </a:p>
         </p:txBody>
@@ -11188,7 +11693,7 @@
     </p:spTree>
     <p:extLst>
       <p:ext uri="{BB962C8B-B14F-4D97-AF65-F5344CB8AC3E}">
-        <p14:creationId xmlns:p14="http://schemas.microsoft.com/office/powerpoint/2010/main" val="1407673860"/>
+        <p14:creationId xmlns:p14="http://schemas.microsoft.com/office/powerpoint/2010/main" val="1962334738"/>
       </p:ext>
     </p:extLst>
   </p:cSld>
@@ -11315,7 +11820,7 @@
   <p:cSld>
     <p:spTree>
       <p:nvGrpSpPr>
-        <p:cNvPr id="1" name=""/>
+        <p:cNvPr id="1" name="Shape 164"/>
         <p:cNvGrpSpPr/>
         <p:nvPr/>
       </p:nvGrpSpPr>
@@ -11329,14 +11834,8 @@
       </p:grpSpPr>
       <p:sp>
         <p:nvSpPr>
-          <p:cNvPr id="2" name="Title 1">
-            <a:extLst>
-              <a:ext uri="{FF2B5EF4-FFF2-40B4-BE49-F238E27FC236}">
-                <a16:creationId xmlns:a16="http://schemas.microsoft.com/office/drawing/2014/main" id="{9BFF689B-CB37-F045-890E-1702F6255CD6}"/>
-              </a:ext>
-            </a:extLst>
-          </p:cNvPr>
-          <p:cNvSpPr>
+          <p:cNvPr id="165" name="Google Shape;165;p33"/>
+          <p:cNvSpPr txBox="1">
             <a:spLocks noGrp="1"/>
           </p:cNvSpPr>
           <p:nvPr>
@@ -11348,23 +11847,18 @@
           <a:bodyPr/>
           <a:lstStyle/>
           <a:p>
+            <a:pPr lvl="0"/>
             <a:r>
               <a:rPr lang="en-US" dirty="0"/>
-              <a:t>Dot Voting and discussion</a:t>
+              <a:t>Collection and Grouping Exercise</a:t>
             </a:r>
           </a:p>
         </p:txBody>
       </p:sp>
       <p:sp>
         <p:nvSpPr>
-          <p:cNvPr id="3" name="Text Placeholder 2">
-            <a:extLst>
-              <a:ext uri="{FF2B5EF4-FFF2-40B4-BE49-F238E27FC236}">
-                <a16:creationId xmlns:a16="http://schemas.microsoft.com/office/drawing/2014/main" id="{9C73CD77-D3DE-854F-9047-B671C3713E10}"/>
-              </a:ext>
-            </a:extLst>
-          </p:cNvPr>
-          <p:cNvSpPr>
+          <p:cNvPr id="166" name="Google Shape;166;p33"/>
+          <p:cNvSpPr txBox="1">
             <a:spLocks noGrp="1"/>
           </p:cNvSpPr>
           <p:nvPr>
@@ -11373,30 +11867,43 @@
         </p:nvSpPr>
         <p:spPr/>
         <p:txBody>
-          <a:bodyPr/>
+          <a:bodyPr>
+            <a:normAutofit/>
+          </a:bodyPr>
           <a:lstStyle/>
           <a:p>
             <a:r>
               <a:rPr lang="en-US" dirty="0"/>
-              <a:t>Use dots to vote for most critical competencies for this position.</a:t>
+              <a:t>We’ll go through the tasks we created and group similar tasks together.</a:t>
             </a:r>
           </a:p>
           <a:p>
             <a:r>
               <a:rPr lang="en-US" dirty="0"/>
-              <a:t>Limited number of dots so we can prioritize.</a:t>
+              <a:t>As we group similar tasks, we’ll give each grouping a title.</a:t>
             </a:r>
           </a:p>
           <a:p>
             <a:r>
               <a:rPr lang="en-US" dirty="0"/>
-              <a:t>Goal is to select 4–6 critical competencies.</a:t>
+              <a:t>These titles are the competencies for this job.</a:t>
             </a:r>
           </a:p>
           <a:p>
             <a:r>
               <a:rPr lang="en-US" dirty="0"/>
-              <a:t>During this exercise, limit the number of tasks to just 4-5 under each competency.</a:t>
+              <a:t>Some groupings may involve multiple competencies</a:t>
+            </a:r>
+          </a:p>
+          <a:p>
+            <a:pPr lvl="1">
+              <a:spcBef>
+                <a:spcPts val="0"/>
+              </a:spcBef>
+            </a:pPr>
+            <a:r>
+              <a:rPr lang="en-US" dirty="0"/>
+              <a:t>For example, a grouping called “writing expert economic analysis” could require both “written communication” and specialized knowledge/experience in economics.</a:t>
             </a:r>
           </a:p>
           <a:p>
@@ -11407,7 +11914,7 @@
     </p:spTree>
     <p:extLst>
       <p:ext uri="{BB962C8B-B14F-4D97-AF65-F5344CB8AC3E}">
-        <p14:creationId xmlns:p14="http://schemas.microsoft.com/office/powerpoint/2010/main" val="2342716868"/>
+        <p14:creationId xmlns:p14="http://schemas.microsoft.com/office/powerpoint/2010/main" val="1407673860"/>
       </p:ext>
     </p:extLst>
   </p:cSld>

</xml_diff>

<commit_message>
edit job analysis presso to align with website
</commit_message>
<xml_diff>
--- a/toolkit/job-analysis/job-analysis-presentation.pptx
+++ b/toolkit/job-analysis/job-analysis-presentation.pptx
@@ -5,10 +5,10 @@
     <p:sldMasterId id="2147483666" r:id="rId1"/>
   </p:sldMasterIdLst>
   <p:notesMasterIdLst>
-    <p:notesMasterId r:id="rId38"/>
+    <p:notesMasterId r:id="rId37"/>
   </p:notesMasterIdLst>
   <p:handoutMasterIdLst>
-    <p:handoutMasterId r:id="rId39"/>
+    <p:handoutMasterId r:id="rId38"/>
   </p:handoutMasterIdLst>
   <p:sldIdLst>
     <p:sldId id="256" r:id="rId2"/>
@@ -27,74 +27,73 @@
     <p:sldId id="369" r:id="rId15"/>
     <p:sldId id="329" r:id="rId16"/>
     <p:sldId id="348" r:id="rId17"/>
-    <p:sldId id="371" r:id="rId18"/>
-    <p:sldId id="331" r:id="rId19"/>
-    <p:sldId id="291" r:id="rId20"/>
-    <p:sldId id="349" r:id="rId21"/>
-    <p:sldId id="350" r:id="rId22"/>
-    <p:sldId id="353" r:id="rId23"/>
-    <p:sldId id="372" r:id="rId24"/>
-    <p:sldId id="354" r:id="rId25"/>
-    <p:sldId id="374" r:id="rId26"/>
-    <p:sldId id="356" r:id="rId27"/>
-    <p:sldId id="357" r:id="rId28"/>
-    <p:sldId id="358" r:id="rId29"/>
-    <p:sldId id="375" r:id="rId30"/>
-    <p:sldId id="359" r:id="rId31"/>
-    <p:sldId id="345" r:id="rId32"/>
-    <p:sldId id="355" r:id="rId33"/>
-    <p:sldId id="341" r:id="rId34"/>
-    <p:sldId id="362" r:id="rId35"/>
-    <p:sldId id="360" r:id="rId36"/>
-    <p:sldId id="361" r:id="rId37"/>
+    <p:sldId id="331" r:id="rId18"/>
+    <p:sldId id="291" r:id="rId19"/>
+    <p:sldId id="349" r:id="rId20"/>
+    <p:sldId id="350" r:id="rId21"/>
+    <p:sldId id="353" r:id="rId22"/>
+    <p:sldId id="372" r:id="rId23"/>
+    <p:sldId id="354" r:id="rId24"/>
+    <p:sldId id="374" r:id="rId25"/>
+    <p:sldId id="356" r:id="rId26"/>
+    <p:sldId id="357" r:id="rId27"/>
+    <p:sldId id="358" r:id="rId28"/>
+    <p:sldId id="375" r:id="rId29"/>
+    <p:sldId id="359" r:id="rId30"/>
+    <p:sldId id="345" r:id="rId31"/>
+    <p:sldId id="355" r:id="rId32"/>
+    <p:sldId id="341" r:id="rId33"/>
+    <p:sldId id="362" r:id="rId34"/>
+    <p:sldId id="360" r:id="rId35"/>
+    <p:sldId id="361" r:id="rId36"/>
   </p:sldIdLst>
   <p:sldSz cx="17340263" cy="9753600"/>
   <p:notesSz cx="6881813" cy="9296400"/>
   <p:embeddedFontLst>
     <p:embeddedFont>
       <p:font typeface="Avenir" panose="02000503020000020003" pitchFamily="2" charset="0"/>
-      <p:regular r:id="rId40"/>
-      <p:italic r:id="rId41"/>
+      <p:regular r:id="rId39"/>
+      <p:italic r:id="rId40"/>
     </p:embeddedFont>
     <p:embeddedFont>
       <p:font typeface="Cambria" panose="02040503050406030204" pitchFamily="18" charset="0"/>
-      <p:regular r:id="rId42"/>
-      <p:bold r:id="rId43"/>
-      <p:italic r:id="rId44"/>
-      <p:boldItalic r:id="rId45"/>
+      <p:regular r:id="rId41"/>
+      <p:bold r:id="rId42"/>
+      <p:italic r:id="rId43"/>
+      <p:boldItalic r:id="rId44"/>
     </p:embeddedFont>
     <p:embeddedFont>
       <p:font typeface="Merriweather" pitchFamily="2" charset="77"/>
-      <p:regular r:id="rId46"/>
-      <p:bold r:id="rId47"/>
-      <p:italic r:id="rId48"/>
-      <p:boldItalic r:id="rId49"/>
+      <p:regular r:id="rId45"/>
+      <p:bold r:id="rId46"/>
+      <p:italic r:id="rId47"/>
+      <p:boldItalic r:id="rId48"/>
     </p:embeddedFont>
     <p:embeddedFont>
       <p:font typeface="Merriweather Sans" pitchFamily="2" charset="77"/>
-      <p:regular r:id="rId50"/>
-      <p:bold r:id="rId51"/>
-      <p:italic r:id="rId52"/>
-      <p:boldItalic r:id="rId53"/>
+      <p:regular r:id="rId49"/>
+      <p:bold r:id="rId50"/>
+      <p:italic r:id="rId51"/>
+      <p:boldItalic r:id="rId52"/>
     </p:embeddedFont>
     <p:embeddedFont>
       <p:font typeface="Rockwell" panose="02060603020205020403" pitchFamily="18" charset="77"/>
-      <p:regular r:id="rId54"/>
-      <p:bold r:id="rId55"/>
-      <p:italic r:id="rId56"/>
-      <p:boldItalic r:id="rId57"/>
+      <p:regular r:id="rId53"/>
+      <p:bold r:id="rId54"/>
+      <p:italic r:id="rId55"/>
+      <p:boldItalic r:id="rId56"/>
     </p:embeddedFont>
     <p:embeddedFont>
       <p:font typeface="Source Sans Pro" panose="020B0503030403020204" pitchFamily="34" charset="0"/>
-      <p:regular r:id="rId58"/>
-      <p:bold r:id="rId59"/>
-      <p:italic r:id="rId60"/>
-      <p:boldItalic r:id="rId61"/>
+      <p:regular r:id="rId57"/>
+      <p:bold r:id="rId58"/>
+      <p:italic r:id="rId59"/>
+      <p:boldItalic r:id="rId60"/>
     </p:embeddedFont>
     <p:embeddedFont>
       <p:font typeface="Source Sans Pro SemiBold" panose="020B0603030403020204" pitchFamily="34" charset="0"/>
-      <p:bold r:id="rId62"/>
-      <p:boldItalic r:id="rId63"/>
+      <p:bold r:id="rId61"/>
+      <p:boldItalic r:id="rId62"/>
     </p:embeddedFont>
   </p:embeddedFontLst>
   <p:defaultTextStyle>
@@ -454,7 +453,7 @@
           <a:p>
             <a:fld id="{5F1244B9-655E-9143-8F11-143B7EBD7CDE}" type="datetimeFigureOut">
               <a:rPr lang="en-US" smtClean="0"/>
-              <a:t>8/12/20</a:t>
+              <a:t>5/28/21</a:t>
             </a:fld>
             <a:endParaRPr lang="en-US"/>
           </a:p>
@@ -1694,104 +1693,6 @@
 </file>
 
 <file path=ppt/notesSlides/notesSlide15.xml><?xml version="1.0" encoding="utf-8"?>
-<p:notes xmlns:a="http://schemas.openxmlformats.org/drawingml/2006/main" xmlns:r="http://schemas.openxmlformats.org/officeDocument/2006/relationships" xmlns:p="http://schemas.openxmlformats.org/presentationml/2006/main">
-  <p:cSld>
-    <p:spTree>
-      <p:nvGrpSpPr>
-        <p:cNvPr id="1" name=""/>
-        <p:cNvGrpSpPr/>
-        <p:nvPr/>
-      </p:nvGrpSpPr>
-      <p:grpSpPr>
-        <a:xfrm>
-          <a:off x="0" y="0"/>
-          <a:ext cx="0" cy="0"/>
-          <a:chOff x="0" y="0"/>
-          <a:chExt cx="0" cy="0"/>
-        </a:xfrm>
-      </p:grpSpPr>
-      <p:sp>
-        <p:nvSpPr>
-          <p:cNvPr id="2" name="Slide Image Placeholder 1"/>
-          <p:cNvSpPr>
-            <a:spLocks noGrp="1" noRot="1" noChangeAspect="1"/>
-          </p:cNvSpPr>
-          <p:nvPr>
-            <p:ph type="sldImg"/>
-          </p:nvPr>
-        </p:nvSpPr>
-        <p:spPr/>
-      </p:sp>
-      <p:sp>
-        <p:nvSpPr>
-          <p:cNvPr id="3" name="Notes Placeholder 2"/>
-          <p:cNvSpPr>
-            <a:spLocks noGrp="1"/>
-          </p:cNvSpPr>
-          <p:nvPr>
-            <p:ph type="body" idx="1"/>
-          </p:nvPr>
-        </p:nvSpPr>
-        <p:spPr/>
-        <p:txBody>
-          <a:bodyPr/>
-          <a:lstStyle/>
-          <a:p>
-            <a:r>
-              <a:rPr lang="en-US" dirty="0"/>
-              <a:t>Note to facilitator:</a:t>
-            </a:r>
-            <a:r>
-              <a:rPr lang="en-US" baseline="0" dirty="0"/>
-              <a:t> To save time, divide the room in half and have half the participants do half the competencies per group. The levels should built upon each other. They should be as succinct as possible.</a:t>
-            </a:r>
-          </a:p>
-          <a:p>
-            <a:endParaRPr lang="en-US" baseline="0" dirty="0"/>
-          </a:p>
-          <a:p>
-            <a:endParaRPr lang="en-US" baseline="0" dirty="0"/>
-          </a:p>
-          <a:p>
-            <a:r>
-              <a:rPr lang="en-US" dirty="0"/>
-              <a:t>- Unfamiliar: Has no experience, or cannot articulate how, building alliances or managing communications with stakeholders is integral to project success. </a:t>
-            </a:r>
-          </a:p>
-          <a:p>
-            <a:r>
-              <a:rPr lang="en-US" dirty="0"/>
-              <a:t>• Familiar: Understands that strategic stakeholder alliances and communication is important, but cannot provide an example of these actions from their career. </a:t>
-            </a:r>
-          </a:p>
-          <a:p>
-            <a:r>
-              <a:rPr lang="en-US" dirty="0"/>
-              <a:t>• Experienced: Provides examples and demonstrates the ability to identify a key stakeholder and a strategy for effective engagement. </a:t>
-            </a:r>
-          </a:p>
-          <a:p>
-            <a:r>
-              <a:rPr lang="en-US" dirty="0"/>
-              <a:t>• Master: Provides examples and demonstrates the ability to manage multiple key stakeholders, including executives, with varying levels of influence during a project or across multiple projects.</a:t>
-            </a:r>
-          </a:p>
-        </p:txBody>
-      </p:sp>
-    </p:spTree>
-    <p:extLst>
-      <p:ext uri="{BB962C8B-B14F-4D97-AF65-F5344CB8AC3E}">
-        <p14:creationId xmlns:p14="http://schemas.microsoft.com/office/powerpoint/2010/main" val="3409298584"/>
-      </p:ext>
-    </p:extLst>
-  </p:cSld>
-  <p:clrMapOvr>
-    <a:masterClrMapping/>
-  </p:clrMapOvr>
-</p:notes>
-</file>
-
-<file path=ppt/notesSlides/notesSlide16.xml><?xml version="1.0" encoding="utf-8"?>
 <p:notes xmlns:a="http://schemas.openxmlformats.org/drawingml/2006/main" xmlns:r="http://schemas.openxmlformats.org/officeDocument/2006/relationships" xmlns:p="http://schemas.openxmlformats.org/presentationml/2006/main" showMasterSp="0" showMasterPhAnim="0">
   <p:cSld>
     <p:spTree>
@@ -1907,7 +1808,7 @@
 </p:notes>
 </file>
 
-<file path=ppt/notesSlides/notesSlide17.xml><?xml version="1.0" encoding="utf-8"?>
+<file path=ppt/notesSlides/notesSlide16.xml><?xml version="1.0" encoding="utf-8"?>
 <p:notes xmlns:a="http://schemas.openxmlformats.org/drawingml/2006/main" xmlns:r="http://schemas.openxmlformats.org/officeDocument/2006/relationships" xmlns:p="http://schemas.openxmlformats.org/presentationml/2006/main">
   <p:cSld>
     <p:spTree>
@@ -1968,7 +1869,7 @@
 </p:notes>
 </file>
 
-<file path=ppt/notesSlides/notesSlide18.xml><?xml version="1.0" encoding="utf-8"?>
+<file path=ppt/notesSlides/notesSlide17.xml><?xml version="1.0" encoding="utf-8"?>
 <p:notes xmlns:a="http://schemas.openxmlformats.org/drawingml/2006/main" xmlns:r="http://schemas.openxmlformats.org/officeDocument/2006/relationships" xmlns:p="http://schemas.openxmlformats.org/presentationml/2006/main" showMasterSp="0" showMasterPhAnim="0">
   <p:cSld>
     <p:spTree>
@@ -2089,7 +1990,7 @@
 </p:notes>
 </file>
 
-<file path=ppt/notesSlides/notesSlide19.xml><?xml version="1.0" encoding="utf-8"?>
+<file path=ppt/notesSlides/notesSlide18.xml><?xml version="1.0" encoding="utf-8"?>
 <p:notes xmlns:a="http://schemas.openxmlformats.org/drawingml/2006/main" xmlns:r="http://schemas.openxmlformats.org/officeDocument/2006/relationships" xmlns:p="http://schemas.openxmlformats.org/presentationml/2006/main" showMasterSp="0" showMasterPhAnim="0">
   <p:cSld>
     <p:spTree>
@@ -2264,77 +2165,7 @@
 </p:notes>
 </file>
 
-<file path=ppt/notesSlides/notesSlide2.xml><?xml version="1.0" encoding="utf-8"?>
-<p:notes xmlns:a="http://schemas.openxmlformats.org/drawingml/2006/main" xmlns:r="http://schemas.openxmlformats.org/officeDocument/2006/relationships" xmlns:p="http://schemas.openxmlformats.org/presentationml/2006/main">
-  <p:cSld>
-    <p:spTree>
-      <p:nvGrpSpPr>
-        <p:cNvPr id="1" name=""/>
-        <p:cNvGrpSpPr/>
-        <p:nvPr/>
-      </p:nvGrpSpPr>
-      <p:grpSpPr>
-        <a:xfrm>
-          <a:off x="0" y="0"/>
-          <a:ext cx="0" cy="0"/>
-          <a:chOff x="0" y="0"/>
-          <a:chExt cx="0" cy="0"/>
-        </a:xfrm>
-      </p:grpSpPr>
-      <p:sp>
-        <p:nvSpPr>
-          <p:cNvPr id="2" name="Slide Image Placeholder 1"/>
-          <p:cNvSpPr>
-            <a:spLocks noGrp="1" noRot="1" noChangeAspect="1"/>
-          </p:cNvSpPr>
-          <p:nvPr>
-            <p:ph type="sldImg"/>
-          </p:nvPr>
-        </p:nvSpPr>
-        <p:spPr/>
-      </p:sp>
-      <p:sp>
-        <p:nvSpPr>
-          <p:cNvPr id="3" name="Notes Placeholder 2"/>
-          <p:cNvSpPr>
-            <a:spLocks noGrp="1"/>
-          </p:cNvSpPr>
-          <p:nvPr>
-            <p:ph type="body" idx="1"/>
-          </p:nvPr>
-        </p:nvSpPr>
-        <p:spPr/>
-        <p:txBody>
-          <a:bodyPr/>
-          <a:lstStyle/>
-          <a:p>
-            <a:r>
-              <a:rPr lang="en-US" dirty="0"/>
-              <a:t>Don’t share the competencies until the team has already come up with their competencies</a:t>
-            </a:r>
-          </a:p>
-          <a:p>
-            <a:r>
-              <a:rPr lang="en-US" dirty="0"/>
-              <a:t>If the workshop is remote, you will need different tools</a:t>
-            </a:r>
-          </a:p>
-        </p:txBody>
-      </p:sp>
-    </p:spTree>
-    <p:extLst>
-      <p:ext uri="{BB962C8B-B14F-4D97-AF65-F5344CB8AC3E}">
-        <p14:creationId xmlns:p14="http://schemas.microsoft.com/office/powerpoint/2010/main" val="501840269"/>
-      </p:ext>
-    </p:extLst>
-  </p:cSld>
-  <p:clrMapOvr>
-    <a:masterClrMapping/>
-  </p:clrMapOvr>
-</p:notes>
-</file>
-
-<file path=ppt/notesSlides/notesSlide20.xml><?xml version="1.0" encoding="utf-8"?>
+<file path=ppt/notesSlides/notesSlide19.xml><?xml version="1.0" encoding="utf-8"?>
 <p:notes xmlns:a="http://schemas.openxmlformats.org/drawingml/2006/main" xmlns:r="http://schemas.openxmlformats.org/officeDocument/2006/relationships" xmlns:p="http://schemas.openxmlformats.org/presentationml/2006/main" showMasterSp="0" showMasterPhAnim="0">
   <p:cSld>
     <p:spTree>
@@ -2455,6 +2286,149 @@
 </p:notes>
 </file>
 
+<file path=ppt/notesSlides/notesSlide2.xml><?xml version="1.0" encoding="utf-8"?>
+<p:notes xmlns:a="http://schemas.openxmlformats.org/drawingml/2006/main" xmlns:r="http://schemas.openxmlformats.org/officeDocument/2006/relationships" xmlns:p="http://schemas.openxmlformats.org/presentationml/2006/main">
+  <p:cSld>
+    <p:spTree>
+      <p:nvGrpSpPr>
+        <p:cNvPr id="1" name=""/>
+        <p:cNvGrpSpPr/>
+        <p:nvPr/>
+      </p:nvGrpSpPr>
+      <p:grpSpPr>
+        <a:xfrm>
+          <a:off x="0" y="0"/>
+          <a:ext cx="0" cy="0"/>
+          <a:chOff x="0" y="0"/>
+          <a:chExt cx="0" cy="0"/>
+        </a:xfrm>
+      </p:grpSpPr>
+      <p:sp>
+        <p:nvSpPr>
+          <p:cNvPr id="2" name="Slide Image Placeholder 1"/>
+          <p:cNvSpPr>
+            <a:spLocks noGrp="1" noRot="1" noChangeAspect="1"/>
+          </p:cNvSpPr>
+          <p:nvPr>
+            <p:ph type="sldImg"/>
+          </p:nvPr>
+        </p:nvSpPr>
+        <p:spPr/>
+      </p:sp>
+      <p:sp>
+        <p:nvSpPr>
+          <p:cNvPr id="3" name="Notes Placeholder 2"/>
+          <p:cNvSpPr>
+            <a:spLocks noGrp="1"/>
+          </p:cNvSpPr>
+          <p:nvPr>
+            <p:ph type="body" idx="1"/>
+          </p:nvPr>
+        </p:nvSpPr>
+        <p:spPr/>
+        <p:txBody>
+          <a:bodyPr/>
+          <a:lstStyle/>
+          <a:p>
+            <a:r>
+              <a:rPr lang="en-US" dirty="0"/>
+              <a:t>Don’t share the competencies until the team has already come up with their competencies</a:t>
+            </a:r>
+          </a:p>
+          <a:p>
+            <a:r>
+              <a:rPr lang="en-US" dirty="0"/>
+              <a:t>If the workshop is remote, you will need different tools</a:t>
+            </a:r>
+          </a:p>
+        </p:txBody>
+      </p:sp>
+    </p:spTree>
+    <p:extLst>
+      <p:ext uri="{BB962C8B-B14F-4D97-AF65-F5344CB8AC3E}">
+        <p14:creationId xmlns:p14="http://schemas.microsoft.com/office/powerpoint/2010/main" val="501840269"/>
+      </p:ext>
+    </p:extLst>
+  </p:cSld>
+  <p:clrMapOvr>
+    <a:masterClrMapping/>
+  </p:clrMapOvr>
+</p:notes>
+</file>
+
+<file path=ppt/notesSlides/notesSlide20.xml><?xml version="1.0" encoding="utf-8"?>
+<p:notes xmlns:a="http://schemas.openxmlformats.org/drawingml/2006/main" xmlns:r="http://schemas.openxmlformats.org/officeDocument/2006/relationships" xmlns:p="http://schemas.openxmlformats.org/presentationml/2006/main">
+  <p:cSld>
+    <p:spTree>
+      <p:nvGrpSpPr>
+        <p:cNvPr id="1" name=""/>
+        <p:cNvGrpSpPr/>
+        <p:nvPr/>
+      </p:nvGrpSpPr>
+      <p:grpSpPr>
+        <a:xfrm>
+          <a:off x="0" y="0"/>
+          <a:ext cx="0" cy="0"/>
+          <a:chOff x="0" y="0"/>
+          <a:chExt cx="0" cy="0"/>
+        </a:xfrm>
+      </p:grpSpPr>
+      <p:sp>
+        <p:nvSpPr>
+          <p:cNvPr id="2" name="Slide Image Placeholder 1"/>
+          <p:cNvSpPr>
+            <a:spLocks noGrp="1" noRot="1" noChangeAspect="1"/>
+          </p:cNvSpPr>
+          <p:nvPr>
+            <p:ph type="sldImg"/>
+          </p:nvPr>
+        </p:nvSpPr>
+        <p:spPr/>
+      </p:sp>
+      <p:sp>
+        <p:nvSpPr>
+          <p:cNvPr id="3" name="Notes Placeholder 2"/>
+          <p:cNvSpPr>
+            <a:spLocks noGrp="1"/>
+          </p:cNvSpPr>
+          <p:nvPr>
+            <p:ph type="body" idx="1"/>
+          </p:nvPr>
+        </p:nvSpPr>
+        <p:spPr/>
+        <p:txBody>
+          <a:bodyPr/>
+          <a:lstStyle/>
+          <a:p>
+            <a:r>
+              <a:rPr lang="en-US" dirty="0"/>
+              <a:t>Skip if this isn’t prepared! </a:t>
+            </a:r>
+          </a:p>
+          <a:p>
+            <a:endParaRPr lang="en-US" dirty="0"/>
+          </a:p>
+          <a:p>
+            <a:r>
+              <a:rPr lang="en-US" dirty="0"/>
+              <a:t>SMEs should verify job tasks and summary section.</a:t>
+            </a:r>
+          </a:p>
+        </p:txBody>
+      </p:sp>
+    </p:spTree>
+    <p:extLst>
+      <p:ext uri="{BB962C8B-B14F-4D97-AF65-F5344CB8AC3E}">
+        <p14:creationId xmlns:p14="http://schemas.microsoft.com/office/powerpoint/2010/main" val="160981160"/>
+      </p:ext>
+    </p:extLst>
+  </p:cSld>
+  <p:clrMapOvr>
+    <a:masterClrMapping/>
+  </p:clrMapOvr>
+</p:notes>
+</file>
+
 <file path=ppt/notesSlides/notesSlide21.xml><?xml version="1.0" encoding="utf-8"?>
 <p:notes xmlns:a="http://schemas.openxmlformats.org/drawingml/2006/main" xmlns:r="http://schemas.openxmlformats.org/officeDocument/2006/relationships" xmlns:p="http://schemas.openxmlformats.org/presentationml/2006/main">
   <p:cSld>
@@ -2499,26 +2473,210 @@
           <a:bodyPr/>
           <a:lstStyle/>
           <a:p>
-            <a:r>
-              <a:rPr lang="en-US" dirty="0"/>
-              <a:t>Skip if this isn’t prepared! </a:t>
-            </a:r>
-          </a:p>
-          <a:p>
+            <a:pPr marL="457200" marR="0" lvl="0" indent="-228600" algn="l" defTabSz="914400" rtl="0" eaLnBrk="1" fontAlgn="auto" latinLnBrk="0" hangingPunct="1">
+              <a:lnSpc>
+                <a:spcPct val="100000"/>
+              </a:lnSpc>
+              <a:spcBef>
+                <a:spcPts val="0"/>
+              </a:spcBef>
+              <a:spcAft>
+                <a:spcPts val="0"/>
+              </a:spcAft>
+              <a:buClr>
+                <a:srgbClr val="000000"/>
+              </a:buClr>
+              <a:buSzPts val="1400"/>
+              <a:buFont typeface="Arial"/>
+              <a:buNone/>
+              <a:tabLst/>
+              <a:defRPr/>
+            </a:pPr>
+            <a:r>
+              <a:rPr lang="en-US" b="0" i="0" dirty="0">
+                <a:solidFill>
+                  <a:srgbClr val="1B1B1B"/>
+                </a:solidFill>
+                <a:effectLst/>
+                <a:latin typeface="Source Sans Pro Web"/>
+              </a:rPr>
+              <a:t>The group will check its work to date</a:t>
+            </a:r>
+          </a:p>
+          <a:p>
+            <a:pPr marL="457200" marR="0" lvl="0" indent="-228600" algn="l" defTabSz="914400" rtl="0" eaLnBrk="1" fontAlgn="auto" latinLnBrk="0" hangingPunct="1">
+              <a:lnSpc>
+                <a:spcPct val="100000"/>
+              </a:lnSpc>
+              <a:spcBef>
+                <a:spcPts val="0"/>
+              </a:spcBef>
+              <a:spcAft>
+                <a:spcPts val="0"/>
+              </a:spcAft>
+              <a:buClr>
+                <a:srgbClr val="000000"/>
+              </a:buClr>
+              <a:buSzPts val="1400"/>
+              <a:buFont typeface="Arial"/>
+              <a:buNone/>
+              <a:tabLst/>
+              <a:defRPr/>
+            </a:pPr>
+            <a:r>
+              <a:rPr lang="en-US" dirty="0"/>
+              <a:t>Use 4-5 sample resumes you prepared ahead of time, but timebox to 1 hour and expect to only get through 2-3 resumes.</a:t>
+            </a:r>
+          </a:p>
+          <a:p>
+            <a:pPr marL="457200" marR="0" lvl="0" indent="-228600" algn="l" defTabSz="914400" rtl="0" eaLnBrk="1" fontAlgn="auto" latinLnBrk="0" hangingPunct="1">
+              <a:lnSpc>
+                <a:spcPct val="100000"/>
+              </a:lnSpc>
+              <a:spcBef>
+                <a:spcPts val="0"/>
+              </a:spcBef>
+              <a:spcAft>
+                <a:spcPts val="0"/>
+              </a:spcAft>
+              <a:buClr>
+                <a:srgbClr val="000000"/>
+              </a:buClr>
+              <a:buSzPts val="1400"/>
+              <a:buFont typeface="Arial"/>
+              <a:buNone/>
+              <a:tabLst/>
+              <a:defRPr/>
+            </a:pPr>
+            <a:endParaRPr lang="en-US" b="0" i="0" dirty="0">
+              <a:solidFill>
+                <a:srgbClr val="1B1B1B"/>
+              </a:solidFill>
+              <a:effectLst/>
+              <a:latin typeface="Source Sans Pro Web"/>
+            </a:endParaRPr>
+          </a:p>
+          <a:p>
+            <a:r>
+              <a:rPr lang="en-US" sz="2200" b="0" i="0" u="none" strike="noStrike" cap="none" dirty="0">
+                <a:solidFill>
+                  <a:srgbClr val="000000"/>
+                </a:solidFill>
+                <a:effectLst/>
+                <a:latin typeface="Merriweather Sans"/>
+                <a:ea typeface="Merriweather Sans"/>
+                <a:cs typeface="Merriweather Sans"/>
+                <a:sym typeface="Merriweather Sans"/>
+              </a:rPr>
+              <a:t>Goals: </a:t>
+            </a:r>
+          </a:p>
+          <a:p>
+            <a:pPr marL="685800" indent="-457200">
+              <a:buAutoNum type="arabicParenR"/>
+            </a:pPr>
+            <a:r>
+              <a:rPr lang="en-US" sz="2200" b="0" i="0" u="none" strike="noStrike" cap="none" dirty="0">
+                <a:solidFill>
+                  <a:srgbClr val="000000"/>
+                </a:solidFill>
+                <a:effectLst/>
+                <a:latin typeface="Merriweather Sans"/>
+                <a:ea typeface="Merriweather Sans"/>
+                <a:cs typeface="Merriweather Sans"/>
+                <a:sym typeface="Merriweather Sans"/>
+              </a:rPr>
+              <a:t>Give SMEs 10 minutes to look at the first resume and then have them write down if they think it's a pass or fail against the required proficiencies and why. </a:t>
+            </a:r>
+          </a:p>
+          <a:p>
+            <a:pPr marL="685800" indent="-457200">
+              <a:buAutoNum type="arabicParenR"/>
+            </a:pPr>
+            <a:r>
+              <a:rPr lang="en-US" sz="2200" b="0" i="0" u="none" strike="noStrike" cap="none" dirty="0">
+                <a:solidFill>
+                  <a:srgbClr val="000000"/>
+                </a:solidFill>
+                <a:effectLst/>
+                <a:latin typeface="Merriweather Sans"/>
+                <a:ea typeface="Merriweather Sans"/>
+                <a:cs typeface="Merriweather Sans"/>
+                <a:sym typeface="Merriweather Sans"/>
+              </a:rPr>
+              <a:t>Give them 5 minutes to discuss the differences, </a:t>
+            </a:r>
+          </a:p>
+          <a:p>
+            <a:pPr marL="685800" indent="-457200">
+              <a:buAutoNum type="arabicParenR"/>
+            </a:pPr>
+            <a:r>
+              <a:rPr lang="en-US" sz="2200" b="0" i="0" u="none" strike="noStrike" cap="none" dirty="0">
+                <a:solidFill>
+                  <a:srgbClr val="000000"/>
+                </a:solidFill>
+                <a:effectLst/>
+                <a:latin typeface="Merriweather Sans"/>
+                <a:ea typeface="Merriweather Sans"/>
+                <a:cs typeface="Merriweather Sans"/>
+                <a:sym typeface="Merriweather Sans"/>
+              </a:rPr>
+              <a:t>Ask them if they want to change the proficiency level or tweak the wording of the levels based on this practice. </a:t>
+            </a:r>
+          </a:p>
+          <a:p>
+            <a:pPr marL="685800" indent="-457200">
+              <a:buAutoNum type="arabicParenR"/>
+            </a:pPr>
+            <a:r>
+              <a:rPr lang="en-US" sz="2200" b="0" i="0" u="none" strike="noStrike" cap="none" dirty="0">
+                <a:solidFill>
+                  <a:srgbClr val="000000"/>
+                </a:solidFill>
+                <a:effectLst/>
+                <a:latin typeface="Merriweather Sans"/>
+                <a:ea typeface="Merriweather Sans"/>
+                <a:cs typeface="Merriweather Sans"/>
+                <a:sym typeface="Merriweather Sans"/>
+              </a:rPr>
+              <a:t>Repeat for all required proficiencies</a:t>
+            </a:r>
+          </a:p>
+          <a:p>
+            <a:endParaRPr lang="en-US" sz="2200" b="0" i="0" u="none" strike="noStrike" cap="none" dirty="0">
+              <a:solidFill>
+                <a:srgbClr val="000000"/>
+              </a:solidFill>
+              <a:effectLst/>
+              <a:latin typeface="Merriweather Sans"/>
+              <a:ea typeface="Merriweather Sans"/>
+              <a:cs typeface="Merriweather Sans"/>
+              <a:sym typeface="Merriweather Sans"/>
+            </a:endParaRPr>
+          </a:p>
+          <a:p>
+            <a:r>
+              <a:rPr lang="en-US" sz="2200" b="0" i="0" u="none" strike="noStrike" cap="none" dirty="0">
+                <a:solidFill>
+                  <a:srgbClr val="000000"/>
+                </a:solidFill>
+                <a:effectLst/>
+                <a:latin typeface="Merriweather Sans"/>
+                <a:ea typeface="Merriweather Sans"/>
+                <a:cs typeface="Merriweather Sans"/>
+                <a:sym typeface="Merriweather Sans"/>
+              </a:rPr>
+              <a:t>This goal is not to calibrate SMEs (though this will help with calibration) but to refine the competencies and proficiency levels.</a:t>
+            </a:r>
             <a:endParaRPr lang="en-US" dirty="0"/>
-          </a:p>
-          <a:p>
-            <a:r>
-              <a:rPr lang="en-US" dirty="0"/>
-              <a:t>SMEs should verify job tasks and summary section.</a:t>
-            </a:r>
           </a:p>
         </p:txBody>
       </p:sp>
     </p:spTree>
     <p:extLst>
       <p:ext uri="{BB962C8B-B14F-4D97-AF65-F5344CB8AC3E}">
-        <p14:creationId xmlns:p14="http://schemas.microsoft.com/office/powerpoint/2010/main" val="160981160"/>
+        <p14:creationId xmlns:p14="http://schemas.microsoft.com/office/powerpoint/2010/main" val="3624751010"/>
       </p:ext>
     </p:extLst>
   </p:cSld>
@@ -2592,15 +2750,12 @@
               <a:defRPr/>
             </a:pPr>
             <a:r>
-              <a:rPr lang="en-US" b="0" i="0" dirty="0">
-                <a:solidFill>
-                  <a:srgbClr val="1B1B1B"/>
-                </a:solidFill>
-                <a:effectLst/>
-                <a:latin typeface="Source Sans Pro Web"/>
-              </a:rPr>
-              <a:t>The group will check its work to date</a:t>
-            </a:r>
+              <a:rPr lang="en-US" dirty="0"/>
+              <a:t>Recency requirements are only allowed for job series where standards change frequently (such as IT).</a:t>
+            </a:r>
+          </a:p>
+          <a:p>
+            <a:endParaRPr lang="en-US" dirty="0"/>
           </a:p>
           <a:p>
             <a:pPr marL="457200" marR="0" lvl="0" indent="-228600" algn="l" defTabSz="914400" rtl="0" eaLnBrk="1" fontAlgn="auto" latinLnBrk="0" hangingPunct="1">
@@ -2624,150 +2779,28 @@
             </a:pPr>
             <a:r>
               <a:rPr lang="en-US" dirty="0"/>
-              <a:t>Use 4-5 sample resumes you prepared ahead of time, but timebox to 1 hour and expect to only get through 2-3 resumes.</a:t>
-            </a:r>
-          </a:p>
-          <a:p>
-            <a:pPr marL="457200" marR="0" lvl="0" indent="-228600" algn="l" defTabSz="914400" rtl="0" eaLnBrk="1" fontAlgn="auto" latinLnBrk="0" hangingPunct="1">
-              <a:lnSpc>
-                <a:spcPct val="100000"/>
-              </a:lnSpc>
-              <a:spcBef>
-                <a:spcPts val="0"/>
-              </a:spcBef>
-              <a:spcAft>
-                <a:spcPts val="0"/>
-              </a:spcAft>
-              <a:buClr>
-                <a:srgbClr val="000000"/>
-              </a:buClr>
-              <a:buSzPts val="1400"/>
-              <a:buFont typeface="Arial"/>
-              <a:buNone/>
-              <a:tabLst/>
-              <a:defRPr/>
-            </a:pPr>
-            <a:endParaRPr lang="en-US" b="0" i="0" dirty="0">
-              <a:solidFill>
-                <a:srgbClr val="1B1B1B"/>
-              </a:solidFill>
-              <a:effectLst/>
-              <a:latin typeface="Source Sans Pro Web"/>
-            </a:endParaRPr>
-          </a:p>
-          <a:p>
-            <a:r>
-              <a:rPr lang="en-US" sz="2200" b="0" i="0" u="none" strike="noStrike" cap="none" dirty="0">
-                <a:solidFill>
-                  <a:srgbClr val="000000"/>
-                </a:solidFill>
-                <a:effectLst/>
-                <a:latin typeface="Merriweather Sans"/>
-                <a:ea typeface="Merriweather Sans"/>
-                <a:cs typeface="Merriweather Sans"/>
-                <a:sym typeface="Merriweather Sans"/>
-              </a:rPr>
-              <a:t>Goals: </a:t>
-            </a:r>
-          </a:p>
-          <a:p>
-            <a:pPr marL="685800" indent="-457200">
-              <a:buAutoNum type="arabicParenR"/>
-            </a:pPr>
-            <a:r>
-              <a:rPr lang="en-US" sz="2200" b="0" i="0" u="none" strike="noStrike" cap="none" dirty="0">
-                <a:solidFill>
-                  <a:srgbClr val="000000"/>
-                </a:solidFill>
-                <a:effectLst/>
-                <a:latin typeface="Merriweather Sans"/>
-                <a:ea typeface="Merriweather Sans"/>
-                <a:cs typeface="Merriweather Sans"/>
-                <a:sym typeface="Merriweather Sans"/>
-              </a:rPr>
-              <a:t>Give SMEs 10 minutes to look at the first resume and then have them write down if they think it's a pass or fail against the required proficiencies and why. </a:t>
-            </a:r>
-          </a:p>
-          <a:p>
-            <a:pPr marL="685800" indent="-457200">
-              <a:buAutoNum type="arabicParenR"/>
-            </a:pPr>
-            <a:r>
-              <a:rPr lang="en-US" sz="2200" b="0" i="0" u="none" strike="noStrike" cap="none" dirty="0">
-                <a:solidFill>
-                  <a:srgbClr val="000000"/>
-                </a:solidFill>
-                <a:effectLst/>
-                <a:latin typeface="Merriweather Sans"/>
-                <a:ea typeface="Merriweather Sans"/>
-                <a:cs typeface="Merriweather Sans"/>
-                <a:sym typeface="Merriweather Sans"/>
-              </a:rPr>
-              <a:t>Give them 5 minutes to discuss the differences, </a:t>
-            </a:r>
-          </a:p>
-          <a:p>
-            <a:pPr marL="685800" indent="-457200">
-              <a:buAutoNum type="arabicParenR"/>
-            </a:pPr>
-            <a:r>
-              <a:rPr lang="en-US" sz="2200" b="0" i="0" u="none" strike="noStrike" cap="none" dirty="0">
-                <a:solidFill>
-                  <a:srgbClr val="000000"/>
-                </a:solidFill>
-                <a:effectLst/>
-                <a:latin typeface="Merriweather Sans"/>
-                <a:ea typeface="Merriweather Sans"/>
-                <a:cs typeface="Merriweather Sans"/>
-                <a:sym typeface="Merriweather Sans"/>
-              </a:rPr>
-              <a:t>Ask them if they want to change the proficiency level or tweak the wording of the levels based on this practice. </a:t>
-            </a:r>
-          </a:p>
-          <a:p>
-            <a:pPr marL="685800" indent="-457200">
-              <a:buAutoNum type="arabicParenR"/>
-            </a:pPr>
-            <a:r>
-              <a:rPr lang="en-US" sz="2200" b="0" i="0" u="none" strike="noStrike" cap="none" dirty="0">
-                <a:solidFill>
-                  <a:srgbClr val="000000"/>
-                </a:solidFill>
-                <a:effectLst/>
-                <a:latin typeface="Merriweather Sans"/>
-                <a:ea typeface="Merriweather Sans"/>
-                <a:cs typeface="Merriweather Sans"/>
-                <a:sym typeface="Merriweather Sans"/>
-              </a:rPr>
-              <a:t>Repeat for all required proficiencies</a:t>
-            </a:r>
-          </a:p>
-          <a:p>
-            <a:endParaRPr lang="en-US" sz="2200" b="0" i="0" u="none" strike="noStrike" cap="none" dirty="0">
-              <a:solidFill>
-                <a:srgbClr val="000000"/>
-              </a:solidFill>
-              <a:effectLst/>
-              <a:latin typeface="Merriweather Sans"/>
-              <a:ea typeface="Merriweather Sans"/>
-              <a:cs typeface="Merriweather Sans"/>
-              <a:sym typeface="Merriweather Sans"/>
-            </a:endParaRPr>
-          </a:p>
-          <a:p>
-            <a:r>
-              <a:rPr lang="en-US" sz="2200" b="0" i="0" u="none" strike="noStrike" cap="none" dirty="0">
-                <a:solidFill>
-                  <a:srgbClr val="000000"/>
-                </a:solidFill>
-                <a:effectLst/>
-                <a:latin typeface="Merriweather Sans"/>
-                <a:ea typeface="Merriweather Sans"/>
-                <a:cs typeface="Merriweather Sans"/>
-                <a:sym typeface="Merriweather Sans"/>
-              </a:rPr>
-              <a:t>This goal is not to calibrate SMEs (though this will help with calibration) but to refine the competencies and proficiency levels.</a:t>
-            </a:r>
+              <a:t>Figure out how many pages of job experience is sufficient to make a determination</a:t>
+            </a:r>
+          </a:p>
+          <a:p>
+            <a:endParaRPr lang="en-US" dirty="0"/>
+          </a:p>
+          <a:p>
+            <a:r>
+              <a:rPr lang="en-US" dirty="0"/>
+              <a:t>It’s OK to decide not all competencies are required to appear in a resume, but this must be decided ahead of time in the assessment strategy</a:t>
+            </a:r>
+          </a:p>
+          <a:p>
+            <a:endParaRPr lang="en-US" dirty="0"/>
+          </a:p>
+          <a:p>
+            <a:r>
+              <a:rPr lang="en-US" dirty="0"/>
+              <a:t>Requiring a work sample or portfolio helps to ensure that applicants are responsive to the job announcement. You may only request a work sample or portfolio at the time of application if applicants can be reasonably expected to already have one relevant to this role.</a:t>
+            </a:r>
+          </a:p>
+          <a:p>
             <a:endParaRPr lang="en-US" dirty="0"/>
           </a:p>
         </p:txBody>
@@ -2775,7 +2808,7 @@
     </p:spTree>
     <p:extLst>
       <p:ext uri="{BB962C8B-B14F-4D97-AF65-F5344CB8AC3E}">
-        <p14:creationId xmlns:p14="http://schemas.microsoft.com/office/powerpoint/2010/main" val="3624751010"/>
+        <p14:creationId xmlns:p14="http://schemas.microsoft.com/office/powerpoint/2010/main" val="18592764"/>
       </p:ext>
     </p:extLst>
   </p:cSld>
@@ -2829,6 +2862,128 @@
           <a:bodyPr/>
           <a:lstStyle/>
           <a:p>
+            <a:pPr lvl="0"/>
+            <a:r>
+              <a:rPr lang="en-US" sz="2200" b="0" i="0" u="none" strike="noStrike" cap="none" dirty="0">
+                <a:solidFill>
+                  <a:srgbClr val="000000"/>
+                </a:solidFill>
+                <a:effectLst/>
+                <a:latin typeface="Merriweather Sans"/>
+                <a:ea typeface="Merriweather Sans"/>
+                <a:cs typeface="Merriweather Sans"/>
+                <a:sym typeface="Merriweather Sans"/>
+              </a:rPr>
+              <a:t>Trying to discover applicant’s ability to apply their experience in a new situation</a:t>
+            </a:r>
+          </a:p>
+          <a:p>
+            <a:pPr lvl="0"/>
+            <a:r>
+              <a:rPr lang="en-US" sz="2200" b="0" i="0" u="none" strike="noStrike" cap="none" dirty="0">
+                <a:solidFill>
+                  <a:srgbClr val="000000"/>
+                </a:solidFill>
+                <a:effectLst/>
+                <a:latin typeface="Merriweather Sans"/>
+                <a:ea typeface="Merriweather Sans"/>
+                <a:cs typeface="Merriweather Sans"/>
+                <a:sym typeface="Merriweather Sans"/>
+              </a:rPr>
+              <a:t>“and can you give an example of when you did this in the past”</a:t>
+            </a:r>
+          </a:p>
+          <a:p>
+            <a:pPr lvl="0"/>
+            <a:endParaRPr lang="en-US" sz="2200" b="0" i="0" u="none" strike="noStrike" cap="none" dirty="0">
+              <a:solidFill>
+                <a:srgbClr val="000000"/>
+              </a:solidFill>
+              <a:effectLst/>
+              <a:latin typeface="Merriweather Sans"/>
+              <a:ea typeface="Merriweather Sans"/>
+              <a:cs typeface="Merriweather Sans"/>
+              <a:sym typeface="Merriweather Sans"/>
+            </a:endParaRPr>
+          </a:p>
+          <a:p>
+            <a:pPr lvl="0"/>
+            <a:r>
+              <a:rPr lang="en-US" sz="2200" b="0" i="0" u="none" strike="noStrike" cap="none" dirty="0">
+                <a:solidFill>
+                  <a:srgbClr val="000000"/>
+                </a:solidFill>
+                <a:effectLst/>
+                <a:latin typeface="Merriweather Sans"/>
+                <a:ea typeface="Merriweather Sans"/>
+                <a:cs typeface="Merriweather Sans"/>
+                <a:sym typeface="Merriweather Sans"/>
+              </a:rPr>
+              <a:t>Be intentional about the kinds of questions there can be</a:t>
+            </a:r>
+          </a:p>
+          <a:p>
+            <a:pPr lvl="0"/>
+            <a:endParaRPr lang="en-US" sz="2200" b="0" i="0" u="none" strike="noStrike" cap="none" dirty="0">
+              <a:solidFill>
+                <a:srgbClr val="000000"/>
+              </a:solidFill>
+              <a:effectLst/>
+              <a:latin typeface="Merriweather Sans"/>
+              <a:ea typeface="Merriweather Sans"/>
+              <a:cs typeface="Merriweather Sans"/>
+              <a:sym typeface="Merriweather Sans"/>
+            </a:endParaRPr>
+          </a:p>
+          <a:p>
+            <a:pPr lvl="0"/>
+            <a:r>
+              <a:rPr lang="en-US" sz="2200" b="0" i="0" u="none" strike="noStrike" cap="none" dirty="0">
+                <a:solidFill>
+                  <a:srgbClr val="000000"/>
+                </a:solidFill>
+                <a:effectLst/>
+                <a:latin typeface="Merriweather Sans"/>
+                <a:ea typeface="Merriweather Sans"/>
+                <a:cs typeface="Merriweather Sans"/>
+                <a:sym typeface="Merriweather Sans"/>
+              </a:rPr>
+              <a:t>Wording of the hypothetical questions is very tricky – it can be confusing to the applicants, difficult to “set the scene” so it makes sense for them</a:t>
+            </a:r>
+          </a:p>
+          <a:p>
+            <a:pPr lvl="0"/>
+            <a:endParaRPr lang="en-US" sz="2200" b="0" i="0" u="none" strike="noStrike" cap="none" dirty="0">
+              <a:solidFill>
+                <a:srgbClr val="000000"/>
+              </a:solidFill>
+              <a:effectLst/>
+              <a:latin typeface="Merriweather Sans"/>
+              <a:ea typeface="Merriweather Sans"/>
+              <a:cs typeface="Merriweather Sans"/>
+              <a:sym typeface="Merriweather Sans"/>
+            </a:endParaRPr>
+          </a:p>
+          <a:p>
+            <a:pPr lvl="0"/>
+            <a:r>
+              <a:rPr lang="en-US" sz="2200" b="0" i="0" u="none" strike="noStrike" cap="none" dirty="0">
+                <a:solidFill>
+                  <a:srgbClr val="000000"/>
+                </a:solidFill>
+                <a:effectLst/>
+                <a:latin typeface="Merriweather Sans"/>
+                <a:ea typeface="Merriweather Sans"/>
+                <a:cs typeface="Merriweather Sans"/>
+                <a:sym typeface="Merriweather Sans"/>
+              </a:rPr>
+              <a:t>Strike the balance between the two question types</a:t>
+            </a:r>
+          </a:p>
+          <a:p>
+            <a:endParaRPr lang="en-US" dirty="0"/>
+          </a:p>
+          <a:p>
             <a:pPr marL="457200" marR="0" lvl="0" indent="-228600" algn="l" defTabSz="914400" rtl="0" eaLnBrk="1" fontAlgn="auto" latinLnBrk="0" hangingPunct="1">
               <a:lnSpc>
                 <a:spcPct val="100000"/>
@@ -2850,64 +3005,15 @@
             </a:pPr>
             <a:r>
               <a:rPr lang="en-US" dirty="0"/>
-              <a:t>Recency requirements are only allowed for job series where standards change frequently (such as IT).</a:t>
-            </a:r>
-          </a:p>
-          <a:p>
-            <a:endParaRPr lang="en-US" dirty="0"/>
-          </a:p>
-          <a:p>
-            <a:pPr marL="457200" marR="0" lvl="0" indent="-228600" algn="l" defTabSz="914400" rtl="0" eaLnBrk="1" fontAlgn="auto" latinLnBrk="0" hangingPunct="1">
-              <a:lnSpc>
-                <a:spcPct val="100000"/>
-              </a:lnSpc>
-              <a:spcBef>
-                <a:spcPts val="0"/>
-              </a:spcBef>
-              <a:spcAft>
-                <a:spcPts val="0"/>
-              </a:spcAft>
-              <a:buClr>
-                <a:srgbClr val="000000"/>
-              </a:buClr>
-              <a:buSzPts val="1400"/>
-              <a:buFont typeface="Arial"/>
-              <a:buNone/>
-              <a:tabLst/>
-              <a:defRPr/>
-            </a:pPr>
-            <a:r>
-              <a:rPr lang="en-US" dirty="0"/>
-              <a:t>Figure out how many pages of job experience is sufficient to make a determination</a:t>
-            </a:r>
-          </a:p>
-          <a:p>
-            <a:endParaRPr lang="en-US" dirty="0"/>
-          </a:p>
-          <a:p>
-            <a:r>
-              <a:rPr lang="en-US" dirty="0"/>
-              <a:t>It’s OK to decide not all competencies are required to appear in a resume, but this must be decided ahead of time in the assessment strategy</a:t>
-            </a:r>
-          </a:p>
-          <a:p>
-            <a:endParaRPr lang="en-US" dirty="0"/>
-          </a:p>
-          <a:p>
-            <a:r>
-              <a:rPr lang="en-US" dirty="0"/>
-              <a:t>Requiring a work sample or portfolio helps to ensure that applicants are responsive to the job announcement. You may only request a work sample or portfolio at the time of application if applicants can be reasonably expected to already have one relevant to this role.</a:t>
-            </a:r>
-          </a:p>
-          <a:p>
-            <a:endParaRPr lang="en-US" dirty="0"/>
+              <a:t>If you want to ask applicants to complete an assessment before resume review, you must ask applicants in the occupational questionnaire if they think they have the specialized experience.</a:t>
+            </a:r>
           </a:p>
         </p:txBody>
       </p:sp>
     </p:spTree>
     <p:extLst>
       <p:ext uri="{BB962C8B-B14F-4D97-AF65-F5344CB8AC3E}">
-        <p14:creationId xmlns:p14="http://schemas.microsoft.com/office/powerpoint/2010/main" val="18592764"/>
+        <p14:creationId xmlns:p14="http://schemas.microsoft.com/office/powerpoint/2010/main" val="63585316"/>
       </p:ext>
     </p:extLst>
   </p:cSld>
@@ -3082,37 +3188,12 @@
           <a:p>
             <a:endParaRPr lang="en-US" dirty="0"/>
           </a:p>
-          <a:p>
-            <a:pPr marL="457200" marR="0" lvl="0" indent="-228600" algn="l" defTabSz="914400" rtl="0" eaLnBrk="1" fontAlgn="auto" latinLnBrk="0" hangingPunct="1">
-              <a:lnSpc>
-                <a:spcPct val="100000"/>
-              </a:lnSpc>
-              <a:spcBef>
-                <a:spcPts val="0"/>
-              </a:spcBef>
-              <a:spcAft>
-                <a:spcPts val="0"/>
-              </a:spcAft>
-              <a:buClr>
-                <a:srgbClr val="000000"/>
-              </a:buClr>
-              <a:buSzPts val="1400"/>
-              <a:buFont typeface="Arial"/>
-              <a:buNone/>
-              <a:tabLst/>
-              <a:defRPr/>
-            </a:pPr>
-            <a:r>
-              <a:rPr lang="en-US" dirty="0"/>
-              <a:t>If you want to ask applicants to complete an assessment before resume review, you must ask applicants in the occupational questionnaire if they think they have the specialized experience.</a:t>
-            </a:r>
-          </a:p>
         </p:txBody>
       </p:sp>
     </p:spTree>
     <p:extLst>
       <p:ext uri="{BB962C8B-B14F-4D97-AF65-F5344CB8AC3E}">
-        <p14:creationId xmlns:p14="http://schemas.microsoft.com/office/powerpoint/2010/main" val="63585316"/>
+        <p14:creationId xmlns:p14="http://schemas.microsoft.com/office/powerpoint/2010/main" val="4234696993"/>
       </p:ext>
     </p:extLst>
   </p:cSld>
@@ -3166,186 +3247,6 @@
           <a:bodyPr/>
           <a:lstStyle/>
           <a:p>
-            <a:pPr lvl="0"/>
-            <a:r>
-              <a:rPr lang="en-US" sz="2200" b="0" i="0" u="none" strike="noStrike" cap="none" dirty="0">
-                <a:solidFill>
-                  <a:srgbClr val="000000"/>
-                </a:solidFill>
-                <a:effectLst/>
-                <a:latin typeface="Merriweather Sans"/>
-                <a:ea typeface="Merriweather Sans"/>
-                <a:cs typeface="Merriweather Sans"/>
-                <a:sym typeface="Merriweather Sans"/>
-              </a:rPr>
-              <a:t>Trying to discover applicant’s ability to apply their experience in a new situation</a:t>
-            </a:r>
-          </a:p>
-          <a:p>
-            <a:pPr lvl="0"/>
-            <a:r>
-              <a:rPr lang="en-US" sz="2200" b="0" i="0" u="none" strike="noStrike" cap="none" dirty="0">
-                <a:solidFill>
-                  <a:srgbClr val="000000"/>
-                </a:solidFill>
-                <a:effectLst/>
-                <a:latin typeface="Merriweather Sans"/>
-                <a:ea typeface="Merriweather Sans"/>
-                <a:cs typeface="Merriweather Sans"/>
-                <a:sym typeface="Merriweather Sans"/>
-              </a:rPr>
-              <a:t>“and can you give an example of when you did this in the past”</a:t>
-            </a:r>
-          </a:p>
-          <a:p>
-            <a:pPr lvl="0"/>
-            <a:endParaRPr lang="en-US" sz="2200" b="0" i="0" u="none" strike="noStrike" cap="none" dirty="0">
-              <a:solidFill>
-                <a:srgbClr val="000000"/>
-              </a:solidFill>
-              <a:effectLst/>
-              <a:latin typeface="Merriweather Sans"/>
-              <a:ea typeface="Merriweather Sans"/>
-              <a:cs typeface="Merriweather Sans"/>
-              <a:sym typeface="Merriweather Sans"/>
-            </a:endParaRPr>
-          </a:p>
-          <a:p>
-            <a:pPr lvl="0"/>
-            <a:r>
-              <a:rPr lang="en-US" sz="2200" b="0" i="0" u="none" strike="noStrike" cap="none" dirty="0">
-                <a:solidFill>
-                  <a:srgbClr val="000000"/>
-                </a:solidFill>
-                <a:effectLst/>
-                <a:latin typeface="Merriweather Sans"/>
-                <a:ea typeface="Merriweather Sans"/>
-                <a:cs typeface="Merriweather Sans"/>
-                <a:sym typeface="Merriweather Sans"/>
-              </a:rPr>
-              <a:t>Be intentional about the kinds of questions there can be</a:t>
-            </a:r>
-          </a:p>
-          <a:p>
-            <a:pPr lvl="0"/>
-            <a:endParaRPr lang="en-US" sz="2200" b="0" i="0" u="none" strike="noStrike" cap="none" dirty="0">
-              <a:solidFill>
-                <a:srgbClr val="000000"/>
-              </a:solidFill>
-              <a:effectLst/>
-              <a:latin typeface="Merriweather Sans"/>
-              <a:ea typeface="Merriweather Sans"/>
-              <a:cs typeface="Merriweather Sans"/>
-              <a:sym typeface="Merriweather Sans"/>
-            </a:endParaRPr>
-          </a:p>
-          <a:p>
-            <a:pPr lvl="0"/>
-            <a:r>
-              <a:rPr lang="en-US" sz="2200" b="0" i="0" u="none" strike="noStrike" cap="none" dirty="0">
-                <a:solidFill>
-                  <a:srgbClr val="000000"/>
-                </a:solidFill>
-                <a:effectLst/>
-                <a:latin typeface="Merriweather Sans"/>
-                <a:ea typeface="Merriweather Sans"/>
-                <a:cs typeface="Merriweather Sans"/>
-                <a:sym typeface="Merriweather Sans"/>
-              </a:rPr>
-              <a:t>Wording of the hypothetical questions is very tricky – it can be confusing to the applicants, difficult to “set the scene” so it makes sense for them</a:t>
-            </a:r>
-          </a:p>
-          <a:p>
-            <a:pPr lvl="0"/>
-            <a:endParaRPr lang="en-US" sz="2200" b="0" i="0" u="none" strike="noStrike" cap="none" dirty="0">
-              <a:solidFill>
-                <a:srgbClr val="000000"/>
-              </a:solidFill>
-              <a:effectLst/>
-              <a:latin typeface="Merriweather Sans"/>
-              <a:ea typeface="Merriweather Sans"/>
-              <a:cs typeface="Merriweather Sans"/>
-              <a:sym typeface="Merriweather Sans"/>
-            </a:endParaRPr>
-          </a:p>
-          <a:p>
-            <a:pPr lvl="0"/>
-            <a:r>
-              <a:rPr lang="en-US" sz="2200" b="0" i="0" u="none" strike="noStrike" cap="none" dirty="0">
-                <a:solidFill>
-                  <a:srgbClr val="000000"/>
-                </a:solidFill>
-                <a:effectLst/>
-                <a:latin typeface="Merriweather Sans"/>
-                <a:ea typeface="Merriweather Sans"/>
-                <a:cs typeface="Merriweather Sans"/>
-                <a:sym typeface="Merriweather Sans"/>
-              </a:rPr>
-              <a:t>Strike the balance between the two question types</a:t>
-            </a:r>
-          </a:p>
-          <a:p>
-            <a:endParaRPr lang="en-US" dirty="0"/>
-          </a:p>
-        </p:txBody>
-      </p:sp>
-    </p:spTree>
-    <p:extLst>
-      <p:ext uri="{BB962C8B-B14F-4D97-AF65-F5344CB8AC3E}">
-        <p14:creationId xmlns:p14="http://schemas.microsoft.com/office/powerpoint/2010/main" val="4234696993"/>
-      </p:ext>
-    </p:extLst>
-  </p:cSld>
-  <p:clrMapOvr>
-    <a:masterClrMapping/>
-  </p:clrMapOvr>
-</p:notes>
-</file>
-
-<file path=ppt/notesSlides/notesSlide26.xml><?xml version="1.0" encoding="utf-8"?>
-<p:notes xmlns:a="http://schemas.openxmlformats.org/drawingml/2006/main" xmlns:r="http://schemas.openxmlformats.org/officeDocument/2006/relationships" xmlns:p="http://schemas.openxmlformats.org/presentationml/2006/main">
-  <p:cSld>
-    <p:spTree>
-      <p:nvGrpSpPr>
-        <p:cNvPr id="1" name=""/>
-        <p:cNvGrpSpPr/>
-        <p:nvPr/>
-      </p:nvGrpSpPr>
-      <p:grpSpPr>
-        <a:xfrm>
-          <a:off x="0" y="0"/>
-          <a:ext cx="0" cy="0"/>
-          <a:chOff x="0" y="0"/>
-          <a:chExt cx="0" cy="0"/>
-        </a:xfrm>
-      </p:grpSpPr>
-      <p:sp>
-        <p:nvSpPr>
-          <p:cNvPr id="2" name="Slide Image Placeholder 1"/>
-          <p:cNvSpPr>
-            <a:spLocks noGrp="1" noRot="1" noChangeAspect="1"/>
-          </p:cNvSpPr>
-          <p:nvPr>
-            <p:ph type="sldImg"/>
-          </p:nvPr>
-        </p:nvSpPr>
-        <p:spPr/>
-      </p:sp>
-      <p:sp>
-        <p:nvSpPr>
-          <p:cNvPr id="3" name="Notes Placeholder 2"/>
-          <p:cNvSpPr>
-            <a:spLocks noGrp="1"/>
-          </p:cNvSpPr>
-          <p:nvPr>
-            <p:ph type="body" idx="1"/>
-          </p:nvPr>
-        </p:nvSpPr>
-        <p:spPr/>
-        <p:txBody>
-          <a:bodyPr/>
-          <a:lstStyle/>
-          <a:p>
             <a:r>
               <a:rPr lang="en-US" dirty="0"/>
               <a:t>Use this slide to explain how two structured interviews can be different (allowing applicants to be failed between </a:t>
@@ -3370,7 +3271,7 @@
 </p:notes>
 </file>
 
-<file path=ppt/notesSlides/notesSlide27.xml><?xml version="1.0" encoding="utf-8"?>
+<file path=ppt/notesSlides/notesSlide26.xml><?xml version="1.0" encoding="utf-8"?>
 <p:notes xmlns:a="http://schemas.openxmlformats.org/drawingml/2006/main" xmlns:r="http://schemas.openxmlformats.org/officeDocument/2006/relationships" xmlns:p="http://schemas.openxmlformats.org/presentationml/2006/main" showMasterSp="0" showMasterPhAnim="0">
   <p:cSld>
     <p:spTree>
@@ -3491,7 +3392,7 @@
 </p:notes>
 </file>
 
-<file path=ppt/notesSlides/notesSlide28.xml><?xml version="1.0" encoding="utf-8"?>
+<file path=ppt/notesSlides/notesSlide27.xml><?xml version="1.0" encoding="utf-8"?>
 <p:notes xmlns:a="http://schemas.openxmlformats.org/drawingml/2006/main" xmlns:r="http://schemas.openxmlformats.org/officeDocument/2006/relationships" xmlns:p="http://schemas.openxmlformats.org/presentationml/2006/main">
   <p:cSld>
     <p:spTree>
@@ -9439,7 +9340,7 @@
         </p:spPr>
         <p:txBody>
           <a:bodyPr>
-            <a:normAutofit lnSpcReduction="10000"/>
+            <a:normAutofit fontScale="85000" lnSpcReduction="20000"/>
           </a:bodyPr>
           <a:lstStyle/>
           <a:p>
@@ -9452,20 +9353,50 @@
             </a:r>
           </a:p>
           <a:p>
-            <a:pPr marL="171467" indent="0">
-              <a:buNone/>
-            </a:pPr>
+            <a:r>
+              <a:rPr lang="en-US" b="1" dirty="0"/>
+              <a:t>Complexity:</a:t>
+            </a:r>
+            <a:r>
+              <a:rPr lang="en-US" dirty="0"/>
+              <a:t> The applicant can manage straightforward workflows </a:t>
+            </a:r>
+            <a:r>
+              <a:rPr lang="en-US" i="1" dirty="0"/>
+              <a:t>-vs-</a:t>
+            </a:r>
+            <a:r>
+              <a:rPr lang="en-US" dirty="0"/>
+              <a:t> can manage highly complex workflows.</a:t>
+            </a:r>
+          </a:p>
+          <a:p>
+            <a:r>
+              <a:rPr lang="en-US" b="1" dirty="0"/>
+              <a:t>Level of detail:</a:t>
+            </a:r>
+            <a:r>
+              <a:rPr lang="en-US" dirty="0"/>
+              <a:t> The applicant can explain a general concept </a:t>
+            </a:r>
+            <a:r>
+              <a:rPr lang="en-US" i="1" dirty="0"/>
+              <a:t>-vs-</a:t>
+            </a:r>
+            <a:r>
+              <a:rPr lang="en-US" dirty="0"/>
+              <a:t> can discuss the concept in detail.</a:t>
+            </a:r>
+          </a:p>
+          <a:p>
             <a:r>
               <a:rPr lang="en-US" b="1" dirty="0"/>
               <a:t>Scale of activity:</a:t>
             </a:r>
             <a:r>
               <a:rPr lang="en-US" dirty="0"/>
-              <a:t> The applicant did something at a small organization </a:t>
-            </a:r>
-            <a:br>
-              <a:rPr lang="en-US" dirty="0"/>
-            </a:br>
+              <a:t> The applicant did something at a small organization </a:t>
+            </a:r>
             <a:r>
               <a:rPr lang="en-US" i="1" dirty="0"/>
               <a:t>-vs-</a:t>
@@ -9476,12 +9407,9 @@
             </a:r>
           </a:p>
           <a:p>
-            <a:pPr marL="171467" indent="0">
-              <a:buNone/>
-            </a:pPr>
             <a:r>
               <a:rPr lang="en-US" b="1" dirty="0"/>
-              <a:t>Seniority:</a:t>
+              <a:t>Seniority/independence:</a:t>
             </a:r>
             <a:r>
               <a:rPr lang="en-US" dirty="0"/>
@@ -9493,28 +9421,7 @@
             </a:r>
             <a:r>
               <a:rPr lang="en-US" dirty="0"/>
-              <a:t> lead the group that did something.</a:t>
-            </a:r>
-          </a:p>
-          <a:p>
-            <a:pPr marL="171467" indent="0">
-              <a:buNone/>
-            </a:pPr>
-            <a:r>
-              <a:rPr lang="en-US" b="1" dirty="0"/>
-              <a:t>Level of detail:</a:t>
-            </a:r>
-            <a:r>
-              <a:rPr lang="en-US" dirty="0"/>
-              <a:t> The applicant can explain a general concept </a:t>
-            </a:r>
-            <a:r>
-              <a:rPr lang="en-US" i="1" dirty="0"/>
-              <a:t>-vs-</a:t>
-            </a:r>
-            <a:r>
-              <a:rPr lang="en-US" dirty="0"/>
-              <a:t> can discuss the concept in detail.</a:t>
+              <a:t> led the group that did something.</a:t>
             </a:r>
           </a:p>
           <a:p>
@@ -9616,7 +9523,7 @@
         </p:spPr>
         <p:txBody>
           <a:bodyPr>
-            <a:normAutofit fontScale="92500" lnSpcReduction="10000"/>
+            <a:normAutofit fontScale="85000" lnSpcReduction="20000"/>
           </a:bodyPr>
           <a:lstStyle/>
           <a:p>
@@ -9636,55 +9543,43 @@
             </a:r>
           </a:p>
           <a:p>
-            <a:pPr marL="171467" indent="0">
-              <a:buNone/>
-            </a:pPr>
-            <a:r>
-              <a:rPr lang="en-US" sz="3200" b="1" i="1" dirty="0"/>
-              <a:t>Unfamiliar</a:t>
-            </a:r>
-            <a:r>
-              <a:rPr lang="en-US" sz="3200" dirty="0"/>
-              <a:t>: Talks through problems at a high level. May break down problems into smaller components but does not track them against key metrics to measure outcomes.</a:t>
-            </a:r>
-          </a:p>
-          <a:p>
-            <a:pPr marL="171467" indent="0">
-              <a:buNone/>
-            </a:pPr>
-            <a:r>
-              <a:rPr lang="en-US" sz="3200" b="1" i="1" dirty="0"/>
-              <a:t>Familiar</a:t>
-            </a:r>
-            <a:r>
-              <a:rPr lang="en-US" sz="3200" dirty="0"/>
-              <a:t>: Thinks critically through problems, breaking them down into smaller components and metrics. Limited experience connecting metrics to business or user results.</a:t>
-            </a:r>
-          </a:p>
-          <a:p>
-            <a:pPr marL="171467" indent="0">
-              <a:buNone/>
-            </a:pPr>
-            <a:r>
-              <a:rPr lang="en-US" sz="3200" b="1" i="1" dirty="0"/>
-              <a:t>Experienced</a:t>
-            </a:r>
-            <a:r>
-              <a:rPr lang="en-US" sz="3200" dirty="0"/>
-              <a:t>: Experienced in qualitative and quantitative analysis. Defines product or project metrics tied to business or user results and connects these metrics to decisions to influence major outcomes.</a:t>
-            </a:r>
-          </a:p>
-          <a:p>
-            <a:pPr marL="171467" indent="0">
-              <a:buNone/>
-            </a:pPr>
-            <a:r>
-              <a:rPr lang="en-US" sz="3200" b="1" i="1" dirty="0"/>
-              <a:t>Master</a:t>
-            </a:r>
-            <a:r>
-              <a:rPr lang="en-US" sz="3200" dirty="0"/>
-              <a:t>: Brings analytical thinking to everything they do, with a range and depth of experience. Anticipates the need for metrics and analysis early in the product and project discovery and design process, and iterates on metrics throughout the project.</a:t>
+            <a:r>
+              <a:rPr lang="en-US" b="1" dirty="0"/>
+              <a:t>Novice:</a:t>
+            </a:r>
+            <a:r>
+              <a:rPr lang="en-US" dirty="0"/>
+              <a:t> Unable to break down problems or only talks through problems at a high level. Does not make data-driven decisions. May have classroom education in analysis.</a:t>
+            </a:r>
+          </a:p>
+          <a:p>
+            <a:r>
+              <a:rPr lang="en-US" b="1" dirty="0"/>
+              <a:t>Competent:</a:t>
+            </a:r>
+            <a:r>
+              <a:rPr lang="en-US" dirty="0"/>
+              <a:t> Displays some critical thinking and problem-solving abilities. May start to break a problem down in component parts, but cannot do so completely without help in some situations. Able to identify basic product or project metrics but does not fully connect these to business or user value.</a:t>
+            </a:r>
+          </a:p>
+          <a:p>
+            <a:r>
+              <a:rPr lang="en-US" b="1" dirty="0"/>
+              <a:t>Advanced (minimum required for GS-13):</a:t>
+            </a:r>
+            <a:r>
+              <a:rPr lang="en-US" dirty="0"/>
+              <a:t> Breaks problems down into component parts. Displays repeated experience in qualitative and quantitative analysis. Defines product or project metrics beyond the basics and ties these metrics to decisions.</a:t>
+            </a:r>
+          </a:p>
+          <a:p>
+            <a:r>
+              <a:rPr lang="en-US" b="1" dirty="0"/>
+              <a:t>Expert:</a:t>
+            </a:r>
+            <a:r>
+              <a:rPr lang="en-US" dirty="0"/>
+              <a:t> Brings analytical thinking to everything they do, and has a range and depth of experience doing so. Anticipates the need for metrics and analysis early in the product and project discovery and design process, and carries metrics through iterations.</a:t>
             </a:r>
           </a:p>
         </p:txBody>
@@ -9703,161 +9598,6 @@
 </file>
 
 <file path=ppt/slides/slide17.xml><?xml version="1.0" encoding="utf-8"?>
-<p:sld xmlns:a="http://schemas.openxmlformats.org/drawingml/2006/main" xmlns:r="http://schemas.openxmlformats.org/officeDocument/2006/relationships" xmlns:p="http://schemas.openxmlformats.org/presentationml/2006/main" show="0">
-  <p:cSld>
-    <p:spTree>
-      <p:nvGrpSpPr>
-        <p:cNvPr id="1" name=""/>
-        <p:cNvGrpSpPr/>
-        <p:nvPr/>
-      </p:nvGrpSpPr>
-      <p:grpSpPr>
-        <a:xfrm>
-          <a:off x="0" y="0"/>
-          <a:ext cx="0" cy="0"/>
-          <a:chOff x="0" y="0"/>
-          <a:chExt cx="0" cy="0"/>
-        </a:xfrm>
-      </p:grpSpPr>
-      <p:sp>
-        <p:nvSpPr>
-          <p:cNvPr id="2" name="Title 1">
-            <a:extLst>
-              <a:ext uri="{FF2B5EF4-FFF2-40B4-BE49-F238E27FC236}">
-                <a16:creationId xmlns:a16="http://schemas.microsoft.com/office/drawing/2014/main" id="{DDE9DDD5-5CC9-FC40-9EED-5D61EE4977C9}"/>
-              </a:ext>
-            </a:extLst>
-          </p:cNvPr>
-          <p:cNvSpPr>
-            <a:spLocks noGrp="1"/>
-          </p:cNvSpPr>
-          <p:nvPr>
-            <p:ph type="title"/>
-          </p:nvPr>
-        </p:nvSpPr>
-        <p:spPr/>
-        <p:txBody>
-          <a:bodyPr/>
-          <a:lstStyle/>
-          <a:p>
-            <a:r>
-              <a:rPr lang="en-US" dirty="0"/>
-              <a:t>Create proficiency levels for EACH competency</a:t>
-            </a:r>
-          </a:p>
-        </p:txBody>
-      </p:sp>
-      <p:sp>
-        <p:nvSpPr>
-          <p:cNvPr id="3" name="Text Placeholder 2">
-            <a:extLst>
-              <a:ext uri="{FF2B5EF4-FFF2-40B4-BE49-F238E27FC236}">
-                <a16:creationId xmlns:a16="http://schemas.microsoft.com/office/drawing/2014/main" id="{8CD0B099-CC26-0341-8B45-9D95DB490FA8}"/>
-              </a:ext>
-            </a:extLst>
-          </p:cNvPr>
-          <p:cNvSpPr>
-            <a:spLocks noGrp="1"/>
-          </p:cNvSpPr>
-          <p:nvPr>
-            <p:ph type="body" idx="1"/>
-          </p:nvPr>
-        </p:nvSpPr>
-        <p:spPr>
-          <a:xfrm>
-            <a:off x="476250" y="1219200"/>
-            <a:ext cx="16344899" cy="8229600"/>
-          </a:xfrm>
-        </p:spPr>
-        <p:txBody>
-          <a:bodyPr>
-            <a:normAutofit/>
-          </a:bodyPr>
-          <a:lstStyle/>
-          <a:p>
-            <a:pPr marL="171467" indent="0">
-              <a:buNone/>
-            </a:pPr>
-            <a:r>
-              <a:rPr lang="en-US" sz="2400" b="1" dirty="0"/>
-              <a:t>Example Competency: Stakeholder Engagement</a:t>
-            </a:r>
-            <a:br>
-              <a:rPr lang="en-US" sz="2400" b="1" dirty="0"/>
-            </a:br>
-            <a:r>
-              <a:rPr lang="en-US" sz="2400" dirty="0"/>
-              <a:t>Cultivates relationships with key internal and external stakeholders. Uses negotiation skills to effectively communicate and cooperate.</a:t>
-            </a:r>
-          </a:p>
-          <a:p>
-            <a:pPr marL="171467" indent="0">
-              <a:buNone/>
-            </a:pPr>
-            <a:r>
-              <a:rPr lang="en-US" sz="2400" b="1" i="1" dirty="0"/>
-              <a:t>Unfamiliar</a:t>
-            </a:r>
-            <a:r>
-              <a:rPr lang="en-US" sz="2400" dirty="0"/>
-              <a:t>: Understands that strategic stakeholder alliances and communication is important, but has not developed these skills beyond communicated with extensive support from their manager.</a:t>
-            </a:r>
-          </a:p>
-          <a:p>
-            <a:pPr marL="171467" indent="0">
-              <a:buNone/>
-            </a:pPr>
-            <a:r>
-              <a:rPr lang="en-US" sz="2400" b="1" i="1" dirty="0"/>
-              <a:t>Familiar</a:t>
-            </a:r>
-            <a:r>
-              <a:rPr lang="en-US" sz="2400" dirty="0"/>
-              <a:t>: Can identify a key stakeholder and a strategies for effective engagement, but has limited experience working with stakeholders without managerial support.</a:t>
-            </a:r>
-          </a:p>
-          <a:p>
-            <a:pPr marL="171467" indent="0">
-              <a:buNone/>
-            </a:pPr>
-            <a:r>
-              <a:rPr lang="en-US" sz="2400" b="1" i="1" dirty="0"/>
-              <a:t>Experienced</a:t>
-            </a:r>
-            <a:r>
-              <a:rPr lang="en-US" sz="2400" dirty="0"/>
-              <a:t>: </a:t>
-            </a:r>
-          </a:p>
-          <a:p>
-            <a:pPr marL="171467" indent="0">
-              <a:buNone/>
-            </a:pPr>
-            <a:r>
-              <a:rPr lang="en-US" sz="2400" b="1" i="1" dirty="0"/>
-              <a:t>Master</a:t>
-            </a:r>
-            <a:r>
-              <a:rPr lang="en-US" sz="2400" dirty="0"/>
-              <a:t>: Provides examples and demonstrates the ability to manage multiple key stakeholders, including executives, with varying levels of influence during a project or across multiple projects.</a:t>
-            </a:r>
-          </a:p>
-        </p:txBody>
-      </p:sp>
-    </p:spTree>
-    <p:extLst>
-      <p:ext uri="{BB962C8B-B14F-4D97-AF65-F5344CB8AC3E}">
-        <p14:creationId xmlns:p14="http://schemas.microsoft.com/office/powerpoint/2010/main" val="699470064"/>
-      </p:ext>
-    </p:extLst>
-  </p:cSld>
-  <p:clrMapOvr>
-    <a:masterClrMapping/>
-  </p:clrMapOvr>
-</p:sld>
-</file>
-
-<file path=ppt/slides/slide18.xml><?xml version="1.0" encoding="utf-8"?>
 <p:sld xmlns:a="http://schemas.openxmlformats.org/drawingml/2006/main" xmlns:r="http://schemas.openxmlformats.org/officeDocument/2006/relationships" xmlns:p="http://schemas.openxmlformats.org/presentationml/2006/main">
   <p:cSld>
     <p:spTree>
@@ -9977,7 +9717,7 @@
 </p:sld>
 </file>
 
-<file path=ppt/slides/slide19.xml><?xml version="1.0" encoding="utf-8"?>
+<file path=ppt/slides/slide18.xml><?xml version="1.0" encoding="utf-8"?>
 <p:sld xmlns:a="http://schemas.openxmlformats.org/drawingml/2006/main" xmlns:r="http://schemas.openxmlformats.org/officeDocument/2006/relationships" xmlns:p="http://schemas.openxmlformats.org/presentationml/2006/main">
   <p:cSld>
     <p:spTree>
@@ -10034,6 +9774,144 @@
         </p:txBody>
       </p:sp>
     </p:spTree>
+  </p:cSld>
+  <p:clrMapOvr>
+    <a:masterClrMapping/>
+  </p:clrMapOvr>
+</p:sld>
+</file>
+
+<file path=ppt/slides/slide19.xml><?xml version="1.0" encoding="utf-8"?>
+<p:sld xmlns:a="http://schemas.openxmlformats.org/drawingml/2006/main" xmlns:r="http://schemas.openxmlformats.org/officeDocument/2006/relationships" xmlns:p="http://schemas.openxmlformats.org/presentationml/2006/main">
+  <p:cSld>
+    <p:bg>
+      <p:bgPr>
+        <a:solidFill>
+          <a:srgbClr val="FFFF00"/>
+        </a:solidFill>
+        <a:effectLst/>
+      </p:bgPr>
+    </p:bg>
+    <p:spTree>
+      <p:nvGrpSpPr>
+        <p:cNvPr id="1" name=""/>
+        <p:cNvGrpSpPr/>
+        <p:nvPr/>
+      </p:nvGrpSpPr>
+      <p:grpSpPr>
+        <a:xfrm>
+          <a:off x="0" y="0"/>
+          <a:ext cx="0" cy="0"/>
+          <a:chOff x="0" y="0"/>
+          <a:chExt cx="0" cy="0"/>
+        </a:xfrm>
+      </p:grpSpPr>
+      <p:sp>
+        <p:nvSpPr>
+          <p:cNvPr id="2" name="Title 1">
+            <a:extLst>
+              <a:ext uri="{FF2B5EF4-FFF2-40B4-BE49-F238E27FC236}">
+                <a16:creationId xmlns:a16="http://schemas.microsoft.com/office/drawing/2014/main" id="{A4932B72-DF93-D54D-850F-12928960533A}"/>
+              </a:ext>
+            </a:extLst>
+          </p:cNvPr>
+          <p:cNvSpPr>
+            <a:spLocks noGrp="1"/>
+          </p:cNvSpPr>
+          <p:nvPr>
+            <p:ph type="title"/>
+          </p:nvPr>
+        </p:nvSpPr>
+        <p:spPr/>
+        <p:txBody>
+          <a:bodyPr/>
+          <a:lstStyle/>
+          <a:p>
+            <a:r>
+              <a:rPr lang="en-US" dirty="0"/>
+              <a:t>&lt;Delete THIS SLIDE BEFORE PRESENTING&gt;</a:t>
+            </a:r>
+          </a:p>
+        </p:txBody>
+      </p:sp>
+      <p:sp>
+        <p:nvSpPr>
+          <p:cNvPr id="3" name="Text Placeholder 2">
+            <a:extLst>
+              <a:ext uri="{FF2B5EF4-FFF2-40B4-BE49-F238E27FC236}">
+                <a16:creationId xmlns:a16="http://schemas.microsoft.com/office/drawing/2014/main" id="{DD0C6529-1517-6D4F-B2C1-4578D2693A9A}"/>
+              </a:ext>
+            </a:extLst>
+          </p:cNvPr>
+          <p:cNvSpPr>
+            <a:spLocks noGrp="1"/>
+          </p:cNvSpPr>
+          <p:nvPr>
+            <p:ph type="body" idx="13"/>
+          </p:nvPr>
+        </p:nvSpPr>
+        <p:spPr/>
+        <p:txBody>
+          <a:bodyPr>
+            <a:normAutofit/>
+          </a:bodyPr>
+          <a:lstStyle/>
+          <a:p>
+            <a:r>
+              <a:rPr lang="en-US" b="1" dirty="0"/>
+              <a:t>PREPARE THE FOLLOWING BEFORE DAY 2</a:t>
+            </a:r>
+          </a:p>
+          <a:p>
+            <a:pPr marL="742967" indent="-571500">
+              <a:buClr>
+                <a:schemeClr val="tx2"/>
+              </a:buClr>
+              <a:buFont typeface="Arial" panose="020B0604020202020204" pitchFamily="34" charset="0"/>
+              <a:buChar char="•"/>
+            </a:pPr>
+            <a:r>
+              <a:rPr lang="en-US" dirty="0"/>
+              <a:t>Draft a JOA with competency names and definitions, the most critical job tasks from the job task exercise, and a few sentences from the PD that describes the position in the context of the agency. The team will review during day 2.</a:t>
+            </a:r>
+          </a:p>
+          <a:p>
+            <a:pPr marL="742967" indent="-571500">
+              <a:buClr>
+                <a:schemeClr val="tx2"/>
+              </a:buClr>
+              <a:buFont typeface="Arial" panose="020B0604020202020204" pitchFamily="34" charset="0"/>
+              <a:buChar char="•"/>
+            </a:pPr>
+            <a:r>
+              <a:rPr lang="en-US" dirty="0"/>
+              <a:t>Combine competencies and proficiencies into a single document.</a:t>
+            </a:r>
+          </a:p>
+          <a:p>
+            <a:pPr marL="742967" indent="-571500">
+              <a:buClr>
+                <a:schemeClr val="tx2"/>
+              </a:buClr>
+              <a:buFont typeface="Arial" panose="020B0604020202020204" pitchFamily="34" charset="0"/>
+              <a:buChar char="•"/>
+            </a:pPr>
+            <a:r>
+              <a:rPr lang="en-US" dirty="0"/>
+              <a:t>Reminder: Pull at least 2-3 resumes related to this job for practice resume review (Agency Talent Portal, LinkedIn, etc.) Aim to have 5 resumes so you have backup options.</a:t>
+            </a:r>
+          </a:p>
+          <a:p>
+            <a:endParaRPr lang="en-US" dirty="0"/>
+          </a:p>
+        </p:txBody>
+      </p:sp>
+    </p:spTree>
+    <p:extLst>
+      <p:ext uri="{BB962C8B-B14F-4D97-AF65-F5344CB8AC3E}">
+        <p14:creationId xmlns:p14="http://schemas.microsoft.com/office/powerpoint/2010/main" val="2239205312"/>
+      </p:ext>
+    </p:extLst>
   </p:cSld>
   <p:clrMapOvr>
     <a:masterClrMapping/>
@@ -10182,144 +10060,6 @@
 <file path=ppt/slides/slide20.xml><?xml version="1.0" encoding="utf-8"?>
 <p:sld xmlns:a="http://schemas.openxmlformats.org/drawingml/2006/main" xmlns:r="http://schemas.openxmlformats.org/officeDocument/2006/relationships" xmlns:p="http://schemas.openxmlformats.org/presentationml/2006/main">
   <p:cSld>
-    <p:bg>
-      <p:bgPr>
-        <a:solidFill>
-          <a:srgbClr val="FFFF00"/>
-        </a:solidFill>
-        <a:effectLst/>
-      </p:bgPr>
-    </p:bg>
-    <p:spTree>
-      <p:nvGrpSpPr>
-        <p:cNvPr id="1" name=""/>
-        <p:cNvGrpSpPr/>
-        <p:nvPr/>
-      </p:nvGrpSpPr>
-      <p:grpSpPr>
-        <a:xfrm>
-          <a:off x="0" y="0"/>
-          <a:ext cx="0" cy="0"/>
-          <a:chOff x="0" y="0"/>
-          <a:chExt cx="0" cy="0"/>
-        </a:xfrm>
-      </p:grpSpPr>
-      <p:sp>
-        <p:nvSpPr>
-          <p:cNvPr id="2" name="Title 1">
-            <a:extLst>
-              <a:ext uri="{FF2B5EF4-FFF2-40B4-BE49-F238E27FC236}">
-                <a16:creationId xmlns:a16="http://schemas.microsoft.com/office/drawing/2014/main" id="{A4932B72-DF93-D54D-850F-12928960533A}"/>
-              </a:ext>
-            </a:extLst>
-          </p:cNvPr>
-          <p:cNvSpPr>
-            <a:spLocks noGrp="1"/>
-          </p:cNvSpPr>
-          <p:nvPr>
-            <p:ph type="title"/>
-          </p:nvPr>
-        </p:nvSpPr>
-        <p:spPr/>
-        <p:txBody>
-          <a:bodyPr/>
-          <a:lstStyle/>
-          <a:p>
-            <a:r>
-              <a:rPr lang="en-US" dirty="0"/>
-              <a:t>&lt;Delete THIS SLIDE BEFORE PRESENTING&gt;</a:t>
-            </a:r>
-          </a:p>
-        </p:txBody>
-      </p:sp>
-      <p:sp>
-        <p:nvSpPr>
-          <p:cNvPr id="3" name="Text Placeholder 2">
-            <a:extLst>
-              <a:ext uri="{FF2B5EF4-FFF2-40B4-BE49-F238E27FC236}">
-                <a16:creationId xmlns:a16="http://schemas.microsoft.com/office/drawing/2014/main" id="{DD0C6529-1517-6D4F-B2C1-4578D2693A9A}"/>
-              </a:ext>
-            </a:extLst>
-          </p:cNvPr>
-          <p:cNvSpPr>
-            <a:spLocks noGrp="1"/>
-          </p:cNvSpPr>
-          <p:nvPr>
-            <p:ph type="body" idx="13"/>
-          </p:nvPr>
-        </p:nvSpPr>
-        <p:spPr/>
-        <p:txBody>
-          <a:bodyPr>
-            <a:normAutofit/>
-          </a:bodyPr>
-          <a:lstStyle/>
-          <a:p>
-            <a:r>
-              <a:rPr lang="en-US" b="1" dirty="0"/>
-              <a:t>PREPARE THE FOLLOWING BEFORE DAY 2</a:t>
-            </a:r>
-          </a:p>
-          <a:p>
-            <a:pPr marL="742967" indent="-571500">
-              <a:buClr>
-                <a:schemeClr val="tx2"/>
-              </a:buClr>
-              <a:buFont typeface="Arial" panose="020B0604020202020204" pitchFamily="34" charset="0"/>
-              <a:buChar char="•"/>
-            </a:pPr>
-            <a:r>
-              <a:rPr lang="en-US" dirty="0"/>
-              <a:t>Draft a JOA with competency names and definitions, the most critical job tasks from the job task exercise, and a few sentences from the PD that describes the position in the context of the agency. The team will review during day 2.</a:t>
-            </a:r>
-          </a:p>
-          <a:p>
-            <a:pPr marL="742967" indent="-571500">
-              <a:buClr>
-                <a:schemeClr val="tx2"/>
-              </a:buClr>
-              <a:buFont typeface="Arial" panose="020B0604020202020204" pitchFamily="34" charset="0"/>
-              <a:buChar char="•"/>
-            </a:pPr>
-            <a:r>
-              <a:rPr lang="en-US" dirty="0"/>
-              <a:t>Combine competencies and proficiencies into a single document.</a:t>
-            </a:r>
-          </a:p>
-          <a:p>
-            <a:pPr marL="742967" indent="-571500">
-              <a:buClr>
-                <a:schemeClr val="tx2"/>
-              </a:buClr>
-              <a:buFont typeface="Arial" panose="020B0604020202020204" pitchFamily="34" charset="0"/>
-              <a:buChar char="•"/>
-            </a:pPr>
-            <a:r>
-              <a:rPr lang="en-US" dirty="0"/>
-              <a:t>Reminder: Pull at least 2-3 resumes related to this job for practice resume review (Agency Talent Portal, LinkedIn, etc.) Aim to have 5 resumes so you have backup options.</a:t>
-            </a:r>
-          </a:p>
-          <a:p>
-            <a:endParaRPr lang="en-US" dirty="0"/>
-          </a:p>
-        </p:txBody>
-      </p:sp>
-    </p:spTree>
-    <p:extLst>
-      <p:ext uri="{BB962C8B-B14F-4D97-AF65-F5344CB8AC3E}">
-        <p14:creationId xmlns:p14="http://schemas.microsoft.com/office/powerpoint/2010/main" val="2239205312"/>
-      </p:ext>
-    </p:extLst>
-  </p:cSld>
-  <p:clrMapOvr>
-    <a:masterClrMapping/>
-  </p:clrMapOvr>
-</p:sld>
-</file>
-
-<file path=ppt/slides/slide21.xml><?xml version="1.0" encoding="utf-8"?>
-<p:sld xmlns:a="http://schemas.openxmlformats.org/drawingml/2006/main" xmlns:r="http://schemas.openxmlformats.org/officeDocument/2006/relationships" xmlns:p="http://schemas.openxmlformats.org/presentationml/2006/main">
-  <p:cSld>
     <p:spTree>
       <p:nvGrpSpPr>
         <p:cNvPr id="1" name="Shape 307"/>
@@ -10386,7 +10126,7 @@
 </p:sld>
 </file>
 
-<file path=ppt/slides/slide22.xml><?xml version="1.0" encoding="utf-8"?>
+<file path=ppt/slides/slide21.xml><?xml version="1.0" encoding="utf-8"?>
 <p:sld xmlns:a="http://schemas.openxmlformats.org/drawingml/2006/main" xmlns:r="http://schemas.openxmlformats.org/officeDocument/2006/relationships" xmlns:p="http://schemas.openxmlformats.org/presentationml/2006/main">
   <p:cSld>
     <p:spTree>
@@ -10450,7 +10190,7 @@
 </p:sld>
 </file>
 
-<file path=ppt/slides/slide23.xml><?xml version="1.0" encoding="utf-8"?>
+<file path=ppt/slides/slide22.xml><?xml version="1.0" encoding="utf-8"?>
 <p:sld xmlns:a="http://schemas.openxmlformats.org/drawingml/2006/main" xmlns:r="http://schemas.openxmlformats.org/officeDocument/2006/relationships" xmlns:p="http://schemas.openxmlformats.org/presentationml/2006/main">
   <p:cSld>
     <p:spTree>
@@ -10543,7 +10283,7 @@
 </p:sld>
 </file>
 
-<file path=ppt/slides/slide24.xml><?xml version="1.0" encoding="utf-8"?>
+<file path=ppt/slides/slide23.xml><?xml version="1.0" encoding="utf-8"?>
 <p:sld xmlns:a="http://schemas.openxmlformats.org/drawingml/2006/main" xmlns:r="http://schemas.openxmlformats.org/officeDocument/2006/relationships" xmlns:p="http://schemas.openxmlformats.org/presentationml/2006/main">
   <p:cSld>
     <p:spTree>
@@ -10686,7 +10426,7 @@
 </p:sld>
 </file>
 
-<file path=ppt/slides/slide25.xml><?xml version="1.0" encoding="utf-8"?>
+<file path=ppt/slides/slide24.xml><?xml version="1.0" encoding="utf-8"?>
 <p:sld xmlns:a="http://schemas.openxmlformats.org/drawingml/2006/main" xmlns:r="http://schemas.openxmlformats.org/officeDocument/2006/relationships" xmlns:p="http://schemas.openxmlformats.org/presentationml/2006/main">
   <p:cSld>
     <p:spTree>
@@ -10752,7 +10492,7 @@
 </p:sld>
 </file>
 
-<file path=ppt/slides/slide26.xml><?xml version="1.0" encoding="utf-8"?>
+<file path=ppt/slides/slide25.xml><?xml version="1.0" encoding="utf-8"?>
 <p:sld xmlns:a="http://schemas.openxmlformats.org/drawingml/2006/main" xmlns:r="http://schemas.openxmlformats.org/officeDocument/2006/relationships" xmlns:p="http://schemas.openxmlformats.org/presentationml/2006/main">
   <p:cSld>
     <p:spTree>
@@ -10829,7 +10569,7 @@
 </p:sld>
 </file>
 
-<file path=ppt/slides/slide27.xml><?xml version="1.0" encoding="utf-8"?>
+<file path=ppt/slides/slide26.xml><?xml version="1.0" encoding="utf-8"?>
 <p:sld xmlns:a="http://schemas.openxmlformats.org/drawingml/2006/main" xmlns:r="http://schemas.openxmlformats.org/officeDocument/2006/relationships" xmlns:p="http://schemas.openxmlformats.org/presentationml/2006/main">
   <p:cSld>
     <p:spTree>
@@ -10939,6 +10679,140 @@
     <p:extLst>
       <p:ext uri="{BB962C8B-B14F-4D97-AF65-F5344CB8AC3E}">
         <p14:creationId xmlns:p14="http://schemas.microsoft.com/office/powerpoint/2010/main" val="715038746"/>
+      </p:ext>
+    </p:extLst>
+  </p:cSld>
+  <p:clrMapOvr>
+    <a:masterClrMapping/>
+  </p:clrMapOvr>
+</p:sld>
+</file>
+
+<file path=ppt/slides/slide27.xml><?xml version="1.0" encoding="utf-8"?>
+<p:sld xmlns:a="http://schemas.openxmlformats.org/drawingml/2006/main" xmlns:r="http://schemas.openxmlformats.org/officeDocument/2006/relationships" xmlns:p="http://schemas.openxmlformats.org/presentationml/2006/main">
+  <p:cSld>
+    <p:spTree>
+      <p:nvGrpSpPr>
+        <p:cNvPr id="1" name=""/>
+        <p:cNvGrpSpPr/>
+        <p:nvPr/>
+      </p:nvGrpSpPr>
+      <p:grpSpPr>
+        <a:xfrm>
+          <a:off x="0" y="0"/>
+          <a:ext cx="0" cy="0"/>
+          <a:chOff x="0" y="0"/>
+          <a:chExt cx="0" cy="0"/>
+        </a:xfrm>
+      </p:grpSpPr>
+      <p:sp>
+        <p:nvSpPr>
+          <p:cNvPr id="2" name="Title 1">
+            <a:extLst>
+              <a:ext uri="{FF2B5EF4-FFF2-40B4-BE49-F238E27FC236}">
+                <a16:creationId xmlns:a16="http://schemas.microsoft.com/office/drawing/2014/main" id="{71EDF02E-0DE9-BF4E-A668-580998E2EC27}"/>
+              </a:ext>
+            </a:extLst>
+          </p:cNvPr>
+          <p:cNvSpPr>
+            <a:spLocks noGrp="1"/>
+          </p:cNvSpPr>
+          <p:nvPr>
+            <p:ph type="title"/>
+          </p:nvPr>
+        </p:nvSpPr>
+        <p:spPr/>
+        <p:txBody>
+          <a:bodyPr/>
+          <a:lstStyle/>
+          <a:p>
+            <a:r>
+              <a:rPr lang="en-US" dirty="0"/>
+              <a:t>Decide Assessment Types</a:t>
+            </a:r>
+          </a:p>
+        </p:txBody>
+      </p:sp>
+      <p:sp>
+        <p:nvSpPr>
+          <p:cNvPr id="3" name="Text Placeholder 2">
+            <a:extLst>
+              <a:ext uri="{FF2B5EF4-FFF2-40B4-BE49-F238E27FC236}">
+                <a16:creationId xmlns:a16="http://schemas.microsoft.com/office/drawing/2014/main" id="{B80BD65C-0B2C-FD43-BEFF-F5280438C64F}"/>
+              </a:ext>
+            </a:extLst>
+          </p:cNvPr>
+          <p:cNvSpPr>
+            <a:spLocks noGrp="1"/>
+          </p:cNvSpPr>
+          <p:nvPr>
+            <p:ph type="body" idx="1"/>
+          </p:nvPr>
+        </p:nvSpPr>
+        <p:spPr/>
+        <p:txBody>
+          <a:bodyPr>
+            <a:normAutofit fontScale="92500" lnSpcReduction="20000"/>
+          </a:bodyPr>
+          <a:lstStyle/>
+          <a:p>
+            <a:r>
+              <a:rPr lang="en-US" dirty="0"/>
+              <a:t>Based on your competencies, determine initial plan for assessments using one or more of the following. Options include:</a:t>
+            </a:r>
+          </a:p>
+          <a:p>
+            <a:pPr lvl="1"/>
+            <a:r>
+              <a:rPr lang="en-US" dirty="0"/>
+              <a:t>Structured phone interviews</a:t>
+            </a:r>
+          </a:p>
+          <a:p>
+            <a:pPr lvl="1"/>
+            <a:r>
+              <a:rPr lang="en-US" dirty="0"/>
+              <a:t>Written assessments</a:t>
+            </a:r>
+          </a:p>
+          <a:p>
+            <a:pPr lvl="1"/>
+            <a:r>
+              <a:rPr lang="en-US" dirty="0"/>
+              <a:t>Asynchronous recorded interviews</a:t>
+            </a:r>
+          </a:p>
+          <a:p>
+            <a:pPr lvl="1"/>
+            <a:r>
+              <a:rPr lang="en-US" dirty="0" err="1"/>
+              <a:t>USAHire</a:t>
+            </a:r>
+            <a:r>
+              <a:rPr lang="en-US" dirty="0"/>
+              <a:t> assessments</a:t>
+            </a:r>
+          </a:p>
+          <a:p>
+            <a:r>
+              <a:rPr lang="en-US" dirty="0"/>
+              <a:t>Assessment must test applicants in </a:t>
+            </a:r>
+            <a:r>
+              <a:rPr lang="en-US" u="sng" dirty="0"/>
+              <a:t>different</a:t>
+            </a:r>
+            <a:r>
+              <a:rPr lang="en-US" dirty="0"/>
+              <a:t> ways so you can legally eliminate unqualified applicants after each assessment round. Each assessment does not have to evaluate every competency.</a:t>
+            </a:r>
+          </a:p>
+        </p:txBody>
+      </p:sp>
+    </p:spTree>
+    <p:extLst>
+      <p:ext uri="{BB962C8B-B14F-4D97-AF65-F5344CB8AC3E}">
+        <p14:creationId xmlns:p14="http://schemas.microsoft.com/office/powerpoint/2010/main" val="234458494"/>
       </p:ext>
     </p:extLst>
   </p:cSld>
@@ -10988,7 +10862,7 @@
           <a:p>
             <a:r>
               <a:rPr lang="en-US" dirty="0"/>
-              <a:t>Decide Assessment Types</a:t>
+              <a:t>Brainstorm assessment questions</a:t>
             </a:r>
           </a:p>
         </p:txBody>
@@ -11012,59 +10886,34 @@
         <p:spPr/>
         <p:txBody>
           <a:bodyPr>
-            <a:normAutofit fontScale="92500" lnSpcReduction="20000"/>
+            <a:normAutofit/>
           </a:bodyPr>
           <a:lstStyle/>
           <a:p>
             <a:r>
               <a:rPr lang="en-US" dirty="0"/>
-              <a:t>Based on your competencies, determine initial plan for assessments using one or more of the following. Options include:</a:t>
+              <a:t>Next, we’ll create questions. Some example question types.</a:t>
             </a:r>
           </a:p>
           <a:p>
             <a:pPr lvl="1"/>
             <a:r>
               <a:rPr lang="en-US" dirty="0"/>
-              <a:t>Structured phone interviews</a:t>
+              <a:t>Past experience: “Tell me about a time…”</a:t>
             </a:r>
           </a:p>
           <a:p>
             <a:pPr lvl="1"/>
             <a:r>
               <a:rPr lang="en-US" dirty="0"/>
-              <a:t>Written assessments</a:t>
+              <a:t>Hypothetical situation: “Imagine we have a problem with…”</a:t>
             </a:r>
           </a:p>
           <a:p>
             <a:pPr lvl="1"/>
             <a:r>
               <a:rPr lang="en-US" dirty="0"/>
-              <a:t>Asynchronous recorded interviews</a:t>
-            </a:r>
-          </a:p>
-          <a:p>
-            <a:pPr lvl="1"/>
-            <a:r>
-              <a:rPr lang="en-US" dirty="0" err="1"/>
-              <a:t>USAHire</a:t>
-            </a:r>
-            <a:r>
-              <a:rPr lang="en-US" dirty="0"/>
-              <a:t> assessments</a:t>
-            </a:r>
-          </a:p>
-          <a:p>
-            <a:r>
-              <a:rPr lang="en-US" dirty="0"/>
-              <a:t>Assessment must test applicants in </a:t>
-            </a:r>
-            <a:r>
-              <a:rPr lang="en-US" u="sng" dirty="0"/>
-              <a:t>different</a:t>
-            </a:r>
-            <a:r>
-              <a:rPr lang="en-US" dirty="0"/>
-              <a:t> ways so you can legally eliminate unqualified applicants after each assessment round. Each assessment does not have to evaluate every competency.</a:t>
+              <a:t>Applicant’s viewpoint: “What do you think about…”</a:t>
             </a:r>
           </a:p>
         </p:txBody>
@@ -11072,7 +10921,7 @@
     </p:spTree>
     <p:extLst>
       <p:ext uri="{BB962C8B-B14F-4D97-AF65-F5344CB8AC3E}">
-        <p14:creationId xmlns:p14="http://schemas.microsoft.com/office/powerpoint/2010/main" val="234458494"/>
+        <p14:creationId xmlns:p14="http://schemas.microsoft.com/office/powerpoint/2010/main" val="3085537343"/>
       </p:ext>
     </p:extLst>
   </p:cSld>
@@ -11101,10 +10950,10 @@
       </p:grpSpPr>
       <p:sp>
         <p:nvSpPr>
-          <p:cNvPr id="2" name="Title 1">
+          <p:cNvPr id="4" name="Title 3">
             <a:extLst>
               <a:ext uri="{FF2B5EF4-FFF2-40B4-BE49-F238E27FC236}">
-                <a16:creationId xmlns:a16="http://schemas.microsoft.com/office/drawing/2014/main" id="{71EDF02E-0DE9-BF4E-A668-580998E2EC27}"/>
+                <a16:creationId xmlns:a16="http://schemas.microsoft.com/office/drawing/2014/main" id="{AE90C0D7-6A34-964F-8E33-5E36603A25C5}"/>
               </a:ext>
             </a:extLst>
           </p:cNvPr>
@@ -11115,73 +10964,1147 @@
             <p:ph type="title"/>
           </p:nvPr>
         </p:nvSpPr>
-        <p:spPr/>
+        <p:spPr>
+          <a:xfrm>
+            <a:off x="1268344" y="519298"/>
+            <a:ext cx="7039768" cy="1290459"/>
+          </a:xfrm>
+        </p:spPr>
         <p:txBody>
           <a:bodyPr/>
           <a:lstStyle/>
           <a:p>
             <a:r>
               <a:rPr lang="en-US" dirty="0"/>
-              <a:t>Brainstorm assessment questions</a:t>
+              <a:t>Breadth questions</a:t>
             </a:r>
           </a:p>
         </p:txBody>
       </p:sp>
       <p:sp>
         <p:nvSpPr>
-          <p:cNvPr id="3" name="Text Placeholder 2">
+          <p:cNvPr id="6" name="Text Placeholder 2">
             <a:extLst>
               <a:ext uri="{FF2B5EF4-FFF2-40B4-BE49-F238E27FC236}">
-                <a16:creationId xmlns:a16="http://schemas.microsoft.com/office/drawing/2014/main" id="{B80BD65C-0B2C-FD43-BEFF-F5280438C64F}"/>
+                <a16:creationId xmlns:a16="http://schemas.microsoft.com/office/drawing/2014/main" id="{CC2E7D81-A3D8-E140-B023-A4C267EF860A}"/>
               </a:ext>
             </a:extLst>
           </p:cNvPr>
-          <p:cNvSpPr>
-            <a:spLocks noGrp="1"/>
+          <p:cNvSpPr txBox="1">
+            <a:spLocks/>
           </p:cNvSpPr>
-          <p:nvPr>
-            <p:ph type="body" idx="1"/>
-          </p:nvPr>
+          <p:nvPr/>
         </p:nvSpPr>
-        <p:spPr/>
+        <p:spPr>
+          <a:xfrm>
+            <a:off x="1268344" y="1993900"/>
+            <a:ext cx="6887369" cy="7131050"/>
+          </a:xfrm>
+          <a:prstGeom prst="rect">
+            <a:avLst/>
+          </a:prstGeom>
+          <a:noFill/>
+          <a:ln>
+            <a:noFill/>
+          </a:ln>
+        </p:spPr>
         <p:txBody>
-          <a:bodyPr>
-            <a:normAutofit/>
+          <a:bodyPr spcFirstLastPara="1" wrap="square" lIns="0" tIns="0" rIns="0" bIns="0" anchor="t" anchorCtr="0">
+            <a:normAutofit fontScale="77500" lnSpcReduction="20000"/>
           </a:bodyPr>
+          <a:lstStyle>
+            <a:defPPr marR="0" lvl="0" algn="l" rtl="0">
+              <a:lnSpc>
+                <a:spcPct val="100000"/>
+              </a:lnSpc>
+              <a:spcBef>
+                <a:spcPts val="0"/>
+              </a:spcBef>
+              <a:spcAft>
+                <a:spcPts val="0"/>
+              </a:spcAft>
+            </a:defPPr>
+            <a:lvl1pPr marL="457246" marR="0" lvl="0" indent="-285779" algn="l" rtl="0">
+              <a:lnSpc>
+                <a:spcPct val="100000"/>
+              </a:lnSpc>
+              <a:spcBef>
+                <a:spcPts val="4200"/>
+              </a:spcBef>
+              <a:spcAft>
+                <a:spcPts val="0"/>
+              </a:spcAft>
+              <a:buClr>
+                <a:srgbClr val="0D71BC"/>
+              </a:buClr>
+              <a:buSzPct val="112000"/>
+              <a:buFont typeface="Arial" panose="020B0604020202020204" pitchFamily="34" charset="0"/>
+              <a:buChar char="•"/>
+              <a:defRPr sz="3600" b="0" i="0" u="none" strike="noStrike" cap="none">
+                <a:solidFill>
+                  <a:srgbClr val="0D71BC"/>
+                </a:solidFill>
+                <a:latin typeface="Source Sans Pro" panose="020B0503030403020204" pitchFamily="34" charset="0"/>
+                <a:ea typeface="Source Sans Pro" panose="020B0503030403020204" pitchFamily="34" charset="0"/>
+                <a:cs typeface="Avenir"/>
+                <a:sym typeface="Avenir"/>
+              </a:defRPr>
+            </a:lvl1pPr>
+            <a:lvl2pPr marL="914492" marR="0" lvl="1" indent="-285779" algn="l" rtl="0">
+              <a:lnSpc>
+                <a:spcPct val="100000"/>
+              </a:lnSpc>
+              <a:spcBef>
+                <a:spcPts val="4200"/>
+              </a:spcBef>
+              <a:spcAft>
+                <a:spcPts val="0"/>
+              </a:spcAft>
+              <a:buClr>
+                <a:srgbClr val="0D71BC"/>
+              </a:buClr>
+              <a:buSzPct val="112000"/>
+              <a:buFont typeface="Arial" panose="020B0604020202020204" pitchFamily="34" charset="0"/>
+              <a:buChar char="•"/>
+              <a:defRPr sz="3600" b="0" i="0" u="none" strike="noStrike" cap="none">
+                <a:solidFill>
+                  <a:srgbClr val="0D71BC"/>
+                </a:solidFill>
+                <a:latin typeface="Source Sans Pro" panose="020B0503030403020204" pitchFamily="34" charset="0"/>
+                <a:ea typeface="Source Sans Pro" panose="020B0503030403020204" pitchFamily="34" charset="0"/>
+                <a:cs typeface="Avenir"/>
+                <a:sym typeface="Avenir"/>
+              </a:defRPr>
+            </a:lvl2pPr>
+            <a:lvl3pPr marL="1371737" marR="0" lvl="2" indent="-314357" algn="l" rtl="0">
+              <a:lnSpc>
+                <a:spcPct val="100000"/>
+              </a:lnSpc>
+              <a:spcBef>
+                <a:spcPts val="4200"/>
+              </a:spcBef>
+              <a:spcAft>
+                <a:spcPts val="0"/>
+              </a:spcAft>
+              <a:buClr>
+                <a:srgbClr val="0D71BC"/>
+              </a:buClr>
+              <a:buSzPct val="112000"/>
+              <a:buFont typeface="Arial" panose="020B0604020202020204" pitchFamily="34" charset="0"/>
+              <a:buChar char="•"/>
+              <a:defRPr sz="3600" b="0" i="0" u="none" strike="noStrike" cap="none">
+                <a:solidFill>
+                  <a:srgbClr val="0D71BC"/>
+                </a:solidFill>
+                <a:latin typeface="Source Sans Pro" panose="020B0503030403020204" pitchFamily="34" charset="0"/>
+                <a:ea typeface="Source Sans Pro" panose="020B0503030403020204" pitchFamily="34" charset="0"/>
+                <a:cs typeface="Avenir"/>
+                <a:sym typeface="Avenir"/>
+              </a:defRPr>
+            </a:lvl3pPr>
+            <a:lvl4pPr marL="1828984" marR="0" lvl="3" indent="-314357" algn="l" rtl="0">
+              <a:lnSpc>
+                <a:spcPct val="100000"/>
+              </a:lnSpc>
+              <a:spcBef>
+                <a:spcPts val="4200"/>
+              </a:spcBef>
+              <a:spcAft>
+                <a:spcPts val="0"/>
+              </a:spcAft>
+              <a:buClr>
+                <a:srgbClr val="0D71BC"/>
+              </a:buClr>
+              <a:buSzPct val="112000"/>
+              <a:buFont typeface="Arial" panose="020B0604020202020204" pitchFamily="34" charset="0"/>
+              <a:buChar char="•"/>
+              <a:defRPr sz="3600" b="0" i="0" u="none" strike="noStrike" cap="none">
+                <a:solidFill>
+                  <a:srgbClr val="0D71BC"/>
+                </a:solidFill>
+                <a:latin typeface="Source Sans Pro" panose="020B0503030403020204" pitchFamily="34" charset="0"/>
+                <a:ea typeface="Source Sans Pro" panose="020B0503030403020204" pitchFamily="34" charset="0"/>
+                <a:cs typeface="Avenir"/>
+                <a:sym typeface="Avenir"/>
+              </a:defRPr>
+            </a:lvl4pPr>
+            <a:lvl5pPr marL="2286228" marR="0" lvl="4" indent="-314357" algn="l" rtl="0">
+              <a:lnSpc>
+                <a:spcPct val="100000"/>
+              </a:lnSpc>
+              <a:spcBef>
+                <a:spcPts val="4200"/>
+              </a:spcBef>
+              <a:spcAft>
+                <a:spcPts val="0"/>
+              </a:spcAft>
+              <a:buClr>
+                <a:srgbClr val="0D71BC"/>
+              </a:buClr>
+              <a:buSzPct val="112000"/>
+              <a:buFont typeface="Arial" panose="020B0604020202020204" pitchFamily="34" charset="0"/>
+              <a:buChar char="•"/>
+              <a:defRPr sz="3600" b="0" i="0" u="none" strike="noStrike" cap="none">
+                <a:solidFill>
+                  <a:srgbClr val="0D71BC"/>
+                </a:solidFill>
+                <a:latin typeface="Source Sans Pro" panose="020B0503030403020204" pitchFamily="34" charset="0"/>
+                <a:ea typeface="Source Sans Pro" panose="020B0503030403020204" pitchFamily="34" charset="0"/>
+                <a:cs typeface="Avenir"/>
+                <a:sym typeface="Avenir"/>
+              </a:defRPr>
+            </a:lvl5pPr>
+            <a:lvl6pPr marL="2743475" marR="0" lvl="5" indent="-314357" algn="l" rtl="0">
+              <a:lnSpc>
+                <a:spcPct val="100000"/>
+              </a:lnSpc>
+              <a:spcBef>
+                <a:spcPts val="4200"/>
+              </a:spcBef>
+              <a:spcAft>
+                <a:spcPts val="0"/>
+              </a:spcAft>
+              <a:buClr>
+                <a:srgbClr val="000000"/>
+              </a:buClr>
+              <a:buSzPts val="1350"/>
+              <a:buFont typeface="Rockwell"/>
+              <a:buChar char="•"/>
+              <a:defRPr sz="3600" b="0" i="0" u="none" strike="noStrike" cap="none">
+                <a:solidFill>
+                  <a:srgbClr val="000000"/>
+                </a:solidFill>
+                <a:latin typeface="Rockwell"/>
+                <a:ea typeface="Rockwell"/>
+                <a:cs typeface="Rockwell"/>
+                <a:sym typeface="Rockwell"/>
+              </a:defRPr>
+            </a:lvl6pPr>
+            <a:lvl7pPr marL="3200720" marR="0" lvl="6" indent="-314357" algn="l" rtl="0">
+              <a:lnSpc>
+                <a:spcPct val="100000"/>
+              </a:lnSpc>
+              <a:spcBef>
+                <a:spcPts val="4200"/>
+              </a:spcBef>
+              <a:spcAft>
+                <a:spcPts val="0"/>
+              </a:spcAft>
+              <a:buClr>
+                <a:srgbClr val="000000"/>
+              </a:buClr>
+              <a:buSzPts val="1350"/>
+              <a:buFont typeface="Rockwell"/>
+              <a:buChar char="•"/>
+              <a:defRPr sz="3600" b="0" i="0" u="none" strike="noStrike" cap="none">
+                <a:solidFill>
+                  <a:srgbClr val="000000"/>
+                </a:solidFill>
+                <a:latin typeface="Rockwell"/>
+                <a:ea typeface="Rockwell"/>
+                <a:cs typeface="Rockwell"/>
+                <a:sym typeface="Rockwell"/>
+              </a:defRPr>
+            </a:lvl7pPr>
+            <a:lvl8pPr marL="3657966" marR="0" lvl="7" indent="-314357" algn="l" rtl="0">
+              <a:lnSpc>
+                <a:spcPct val="100000"/>
+              </a:lnSpc>
+              <a:spcBef>
+                <a:spcPts val="4200"/>
+              </a:spcBef>
+              <a:spcAft>
+                <a:spcPts val="0"/>
+              </a:spcAft>
+              <a:buClr>
+                <a:srgbClr val="000000"/>
+              </a:buClr>
+              <a:buSzPts val="1350"/>
+              <a:buFont typeface="Rockwell"/>
+              <a:buChar char="•"/>
+              <a:defRPr sz="3600" b="0" i="0" u="none" strike="noStrike" cap="none">
+                <a:solidFill>
+                  <a:srgbClr val="000000"/>
+                </a:solidFill>
+                <a:latin typeface="Rockwell"/>
+                <a:ea typeface="Rockwell"/>
+                <a:cs typeface="Rockwell"/>
+                <a:sym typeface="Rockwell"/>
+              </a:defRPr>
+            </a:lvl8pPr>
+            <a:lvl9pPr marL="4115212" marR="0" lvl="8" indent="-314357" algn="l" rtl="0">
+              <a:lnSpc>
+                <a:spcPct val="100000"/>
+              </a:lnSpc>
+              <a:spcBef>
+                <a:spcPts val="4200"/>
+              </a:spcBef>
+              <a:spcAft>
+                <a:spcPts val="0"/>
+              </a:spcAft>
+              <a:buClr>
+                <a:srgbClr val="000000"/>
+              </a:buClr>
+              <a:buSzPts val="1350"/>
+              <a:buFont typeface="Rockwell"/>
+              <a:buChar char="•"/>
+              <a:defRPr sz="3600" b="0" i="0" u="none" strike="noStrike" cap="none">
+                <a:solidFill>
+                  <a:srgbClr val="000000"/>
+                </a:solidFill>
+                <a:latin typeface="Rockwell"/>
+                <a:ea typeface="Rockwell"/>
+                <a:cs typeface="Rockwell"/>
+                <a:sym typeface="Rockwell"/>
+              </a:defRPr>
+            </a:lvl9pPr>
+          </a:lstStyle>
+          <a:p>
+            <a:pPr>
+              <a:buClr>
+                <a:schemeClr val="tx2"/>
+              </a:buClr>
+            </a:pPr>
+            <a:r>
+              <a:rPr lang="en-US" dirty="0">
+                <a:solidFill>
+                  <a:schemeClr val="tx2"/>
+                </a:solidFill>
+                <a:latin typeface="Arial" panose="020B0604020202020204" pitchFamily="34" charset="0"/>
+                <a:cs typeface="Arial" panose="020B0604020202020204" pitchFamily="34" charset="0"/>
+              </a:rPr>
+              <a:t>The first interview tests the applicant’s </a:t>
+            </a:r>
+            <a:r>
+              <a:rPr lang="en-US" b="1" i="1" dirty="0">
+                <a:solidFill>
+                  <a:schemeClr val="tx2"/>
+                </a:solidFill>
+                <a:latin typeface="Arial" panose="020B0604020202020204" pitchFamily="34" charset="0"/>
+                <a:cs typeface="Arial" panose="020B0604020202020204" pitchFamily="34" charset="0"/>
+              </a:rPr>
+              <a:t>breadth of experience</a:t>
+            </a:r>
+            <a:r>
+              <a:rPr lang="en-US" b="1" dirty="0">
+                <a:solidFill>
+                  <a:schemeClr val="tx2"/>
+                </a:solidFill>
+                <a:latin typeface="Arial" panose="020B0604020202020204" pitchFamily="34" charset="0"/>
+                <a:cs typeface="Arial" panose="020B0604020202020204" pitchFamily="34" charset="0"/>
+              </a:rPr>
+              <a:t> </a:t>
+            </a:r>
+            <a:r>
+              <a:rPr lang="en-US" dirty="0">
+                <a:solidFill>
+                  <a:schemeClr val="tx2"/>
+                </a:solidFill>
+                <a:latin typeface="Arial" panose="020B0604020202020204" pitchFamily="34" charset="0"/>
+                <a:cs typeface="Arial" panose="020B0604020202020204" pitchFamily="34" charset="0"/>
+              </a:rPr>
+              <a:t>across the competencies.</a:t>
+            </a:r>
+          </a:p>
+          <a:p>
+            <a:pPr>
+              <a:buClr>
+                <a:schemeClr val="tx2"/>
+              </a:buClr>
+            </a:pPr>
+            <a:r>
+              <a:rPr lang="en-US" dirty="0">
+                <a:solidFill>
+                  <a:schemeClr val="tx2"/>
+                </a:solidFill>
+                <a:latin typeface="Arial" panose="020B0604020202020204" pitchFamily="34" charset="0"/>
+                <a:cs typeface="Arial" panose="020B0604020202020204" pitchFamily="34" charset="0"/>
+              </a:rPr>
+              <a:t>Breadth questions tend to take 5-10 minutes for an applicant to answer.</a:t>
+            </a:r>
+          </a:p>
+          <a:p>
+            <a:pPr>
+              <a:buClr>
+                <a:schemeClr val="tx2"/>
+              </a:buClr>
+            </a:pPr>
+            <a:r>
+              <a:rPr lang="en-US" dirty="0">
+                <a:solidFill>
+                  <a:schemeClr val="tx2"/>
+                </a:solidFill>
+                <a:latin typeface="Arial" panose="020B0604020202020204" pitchFamily="34" charset="0"/>
+                <a:cs typeface="Arial" panose="020B0604020202020204" pitchFamily="34" charset="0"/>
+              </a:rPr>
+              <a:t>Breadth questions test if an applicant has experience, knowledge, or exposure to a general topic.</a:t>
+            </a:r>
+          </a:p>
+          <a:p>
+            <a:pPr>
+              <a:buClr>
+                <a:schemeClr val="tx2"/>
+              </a:buClr>
+            </a:pPr>
+            <a:r>
+              <a:rPr lang="en-US" dirty="0">
+                <a:solidFill>
+                  <a:schemeClr val="tx2"/>
+                </a:solidFill>
+                <a:latin typeface="Arial" panose="020B0604020202020204" pitchFamily="34" charset="0"/>
+                <a:cs typeface="Arial" panose="020B0604020202020204" pitchFamily="34" charset="0"/>
+              </a:rPr>
+              <a:t>Breadth: Limit follow up questions to basic probe questions (i.e., “What was your role?” or  “Can you tell me more?”)</a:t>
+            </a:r>
+          </a:p>
+        </p:txBody>
+      </p:sp>
+      <p:sp>
+        <p:nvSpPr>
+          <p:cNvPr id="7" name="Text Placeholder 2">
+            <a:extLst>
+              <a:ext uri="{FF2B5EF4-FFF2-40B4-BE49-F238E27FC236}">
+                <a16:creationId xmlns:a16="http://schemas.microsoft.com/office/drawing/2014/main" id="{0C03725A-973B-874F-AC9C-1B79D87F47DD}"/>
+              </a:ext>
+            </a:extLst>
+          </p:cNvPr>
+          <p:cNvSpPr txBox="1">
+            <a:spLocks/>
+          </p:cNvSpPr>
+          <p:nvPr/>
+        </p:nvSpPr>
+        <p:spPr>
+          <a:xfrm>
+            <a:off x="8670131" y="1993900"/>
+            <a:ext cx="6887369" cy="7131050"/>
+          </a:xfrm>
+          <a:prstGeom prst="rect">
+            <a:avLst/>
+          </a:prstGeom>
+          <a:noFill/>
+          <a:ln>
+            <a:noFill/>
+          </a:ln>
+        </p:spPr>
+        <p:txBody>
+          <a:bodyPr spcFirstLastPara="1" wrap="square" lIns="0" tIns="0" rIns="0" bIns="0" anchor="t" anchorCtr="0">
+            <a:normAutofit fontScale="77500" lnSpcReduction="20000"/>
+          </a:bodyPr>
+          <a:lstStyle>
+            <a:defPPr marR="0" lvl="0" algn="l" rtl="0">
+              <a:lnSpc>
+                <a:spcPct val="100000"/>
+              </a:lnSpc>
+              <a:spcBef>
+                <a:spcPts val="0"/>
+              </a:spcBef>
+              <a:spcAft>
+                <a:spcPts val="0"/>
+              </a:spcAft>
+            </a:defPPr>
+            <a:lvl1pPr marL="457246" marR="0" lvl="0" indent="-285779" algn="l" rtl="0">
+              <a:lnSpc>
+                <a:spcPct val="100000"/>
+              </a:lnSpc>
+              <a:spcBef>
+                <a:spcPts val="4200"/>
+              </a:spcBef>
+              <a:spcAft>
+                <a:spcPts val="0"/>
+              </a:spcAft>
+              <a:buClr>
+                <a:srgbClr val="0D71BC"/>
+              </a:buClr>
+              <a:buSzPct val="112000"/>
+              <a:buFont typeface="Arial" panose="020B0604020202020204" pitchFamily="34" charset="0"/>
+              <a:buChar char="•"/>
+              <a:defRPr sz="3600" b="0" i="0" u="none" strike="noStrike" cap="none">
+                <a:solidFill>
+                  <a:srgbClr val="0D71BC"/>
+                </a:solidFill>
+                <a:latin typeface="Source Sans Pro" panose="020B0503030403020204" pitchFamily="34" charset="0"/>
+                <a:ea typeface="Source Sans Pro" panose="020B0503030403020204" pitchFamily="34" charset="0"/>
+                <a:cs typeface="Avenir"/>
+                <a:sym typeface="Avenir"/>
+              </a:defRPr>
+            </a:lvl1pPr>
+            <a:lvl2pPr marL="914492" marR="0" lvl="1" indent="-285779" algn="l" rtl="0">
+              <a:lnSpc>
+                <a:spcPct val="100000"/>
+              </a:lnSpc>
+              <a:spcBef>
+                <a:spcPts val="4200"/>
+              </a:spcBef>
+              <a:spcAft>
+                <a:spcPts val="0"/>
+              </a:spcAft>
+              <a:buClr>
+                <a:srgbClr val="0D71BC"/>
+              </a:buClr>
+              <a:buSzPct val="112000"/>
+              <a:buFont typeface="Arial" panose="020B0604020202020204" pitchFamily="34" charset="0"/>
+              <a:buChar char="•"/>
+              <a:defRPr sz="3600" b="0" i="0" u="none" strike="noStrike" cap="none">
+                <a:solidFill>
+                  <a:srgbClr val="0D71BC"/>
+                </a:solidFill>
+                <a:latin typeface="Source Sans Pro" panose="020B0503030403020204" pitchFamily="34" charset="0"/>
+                <a:ea typeface="Source Sans Pro" panose="020B0503030403020204" pitchFamily="34" charset="0"/>
+                <a:cs typeface="Avenir"/>
+                <a:sym typeface="Avenir"/>
+              </a:defRPr>
+            </a:lvl2pPr>
+            <a:lvl3pPr marL="1371737" marR="0" lvl="2" indent="-314357" algn="l" rtl="0">
+              <a:lnSpc>
+                <a:spcPct val="100000"/>
+              </a:lnSpc>
+              <a:spcBef>
+                <a:spcPts val="4200"/>
+              </a:spcBef>
+              <a:spcAft>
+                <a:spcPts val="0"/>
+              </a:spcAft>
+              <a:buClr>
+                <a:srgbClr val="0D71BC"/>
+              </a:buClr>
+              <a:buSzPct val="112000"/>
+              <a:buFont typeface="Arial" panose="020B0604020202020204" pitchFamily="34" charset="0"/>
+              <a:buChar char="•"/>
+              <a:defRPr sz="3600" b="0" i="0" u="none" strike="noStrike" cap="none">
+                <a:solidFill>
+                  <a:srgbClr val="0D71BC"/>
+                </a:solidFill>
+                <a:latin typeface="Source Sans Pro" panose="020B0503030403020204" pitchFamily="34" charset="0"/>
+                <a:ea typeface="Source Sans Pro" panose="020B0503030403020204" pitchFamily="34" charset="0"/>
+                <a:cs typeface="Avenir"/>
+                <a:sym typeface="Avenir"/>
+              </a:defRPr>
+            </a:lvl3pPr>
+            <a:lvl4pPr marL="1828984" marR="0" lvl="3" indent="-314357" algn="l" rtl="0">
+              <a:lnSpc>
+                <a:spcPct val="100000"/>
+              </a:lnSpc>
+              <a:spcBef>
+                <a:spcPts val="4200"/>
+              </a:spcBef>
+              <a:spcAft>
+                <a:spcPts val="0"/>
+              </a:spcAft>
+              <a:buClr>
+                <a:srgbClr val="0D71BC"/>
+              </a:buClr>
+              <a:buSzPct val="112000"/>
+              <a:buFont typeface="Arial" panose="020B0604020202020204" pitchFamily="34" charset="0"/>
+              <a:buChar char="•"/>
+              <a:defRPr sz="3600" b="0" i="0" u="none" strike="noStrike" cap="none">
+                <a:solidFill>
+                  <a:srgbClr val="0D71BC"/>
+                </a:solidFill>
+                <a:latin typeface="Source Sans Pro" panose="020B0503030403020204" pitchFamily="34" charset="0"/>
+                <a:ea typeface="Source Sans Pro" panose="020B0503030403020204" pitchFamily="34" charset="0"/>
+                <a:cs typeface="Avenir"/>
+                <a:sym typeface="Avenir"/>
+              </a:defRPr>
+            </a:lvl4pPr>
+            <a:lvl5pPr marL="2286228" marR="0" lvl="4" indent="-314357" algn="l" rtl="0">
+              <a:lnSpc>
+                <a:spcPct val="100000"/>
+              </a:lnSpc>
+              <a:spcBef>
+                <a:spcPts val="4200"/>
+              </a:spcBef>
+              <a:spcAft>
+                <a:spcPts val="0"/>
+              </a:spcAft>
+              <a:buClr>
+                <a:srgbClr val="0D71BC"/>
+              </a:buClr>
+              <a:buSzPct val="112000"/>
+              <a:buFont typeface="Arial" panose="020B0604020202020204" pitchFamily="34" charset="0"/>
+              <a:buChar char="•"/>
+              <a:defRPr sz="3600" b="0" i="0" u="none" strike="noStrike" cap="none">
+                <a:solidFill>
+                  <a:srgbClr val="0D71BC"/>
+                </a:solidFill>
+                <a:latin typeface="Source Sans Pro" panose="020B0503030403020204" pitchFamily="34" charset="0"/>
+                <a:ea typeface="Source Sans Pro" panose="020B0503030403020204" pitchFamily="34" charset="0"/>
+                <a:cs typeface="Avenir"/>
+                <a:sym typeface="Avenir"/>
+              </a:defRPr>
+            </a:lvl5pPr>
+            <a:lvl6pPr marL="2743475" marR="0" lvl="5" indent="-314357" algn="l" rtl="0">
+              <a:lnSpc>
+                <a:spcPct val="100000"/>
+              </a:lnSpc>
+              <a:spcBef>
+                <a:spcPts val="4200"/>
+              </a:spcBef>
+              <a:spcAft>
+                <a:spcPts val="0"/>
+              </a:spcAft>
+              <a:buClr>
+                <a:srgbClr val="000000"/>
+              </a:buClr>
+              <a:buSzPts val="1350"/>
+              <a:buFont typeface="Rockwell"/>
+              <a:buChar char="•"/>
+              <a:defRPr sz="3600" b="0" i="0" u="none" strike="noStrike" cap="none">
+                <a:solidFill>
+                  <a:srgbClr val="000000"/>
+                </a:solidFill>
+                <a:latin typeface="Rockwell"/>
+                <a:ea typeface="Rockwell"/>
+                <a:cs typeface="Rockwell"/>
+                <a:sym typeface="Rockwell"/>
+              </a:defRPr>
+            </a:lvl6pPr>
+            <a:lvl7pPr marL="3200720" marR="0" lvl="6" indent="-314357" algn="l" rtl="0">
+              <a:lnSpc>
+                <a:spcPct val="100000"/>
+              </a:lnSpc>
+              <a:spcBef>
+                <a:spcPts val="4200"/>
+              </a:spcBef>
+              <a:spcAft>
+                <a:spcPts val="0"/>
+              </a:spcAft>
+              <a:buClr>
+                <a:srgbClr val="000000"/>
+              </a:buClr>
+              <a:buSzPts val="1350"/>
+              <a:buFont typeface="Rockwell"/>
+              <a:buChar char="•"/>
+              <a:defRPr sz="3600" b="0" i="0" u="none" strike="noStrike" cap="none">
+                <a:solidFill>
+                  <a:srgbClr val="000000"/>
+                </a:solidFill>
+                <a:latin typeface="Rockwell"/>
+                <a:ea typeface="Rockwell"/>
+                <a:cs typeface="Rockwell"/>
+                <a:sym typeface="Rockwell"/>
+              </a:defRPr>
+            </a:lvl7pPr>
+            <a:lvl8pPr marL="3657966" marR="0" lvl="7" indent="-314357" algn="l" rtl="0">
+              <a:lnSpc>
+                <a:spcPct val="100000"/>
+              </a:lnSpc>
+              <a:spcBef>
+                <a:spcPts val="4200"/>
+              </a:spcBef>
+              <a:spcAft>
+                <a:spcPts val="0"/>
+              </a:spcAft>
+              <a:buClr>
+                <a:srgbClr val="000000"/>
+              </a:buClr>
+              <a:buSzPts val="1350"/>
+              <a:buFont typeface="Rockwell"/>
+              <a:buChar char="•"/>
+              <a:defRPr sz="3600" b="0" i="0" u="none" strike="noStrike" cap="none">
+                <a:solidFill>
+                  <a:srgbClr val="000000"/>
+                </a:solidFill>
+                <a:latin typeface="Rockwell"/>
+                <a:ea typeface="Rockwell"/>
+                <a:cs typeface="Rockwell"/>
+                <a:sym typeface="Rockwell"/>
+              </a:defRPr>
+            </a:lvl8pPr>
+            <a:lvl9pPr marL="4115212" marR="0" lvl="8" indent="-314357" algn="l" rtl="0">
+              <a:lnSpc>
+                <a:spcPct val="100000"/>
+              </a:lnSpc>
+              <a:spcBef>
+                <a:spcPts val="4200"/>
+              </a:spcBef>
+              <a:spcAft>
+                <a:spcPts val="0"/>
+              </a:spcAft>
+              <a:buClr>
+                <a:srgbClr val="000000"/>
+              </a:buClr>
+              <a:buSzPts val="1350"/>
+              <a:buFont typeface="Rockwell"/>
+              <a:buChar char="•"/>
+              <a:defRPr sz="3600" b="0" i="0" u="none" strike="noStrike" cap="none">
+                <a:solidFill>
+                  <a:srgbClr val="000000"/>
+                </a:solidFill>
+                <a:latin typeface="Rockwell"/>
+                <a:ea typeface="Rockwell"/>
+                <a:cs typeface="Rockwell"/>
+                <a:sym typeface="Rockwell"/>
+              </a:defRPr>
+            </a:lvl9pPr>
+          </a:lstStyle>
+          <a:p>
+            <a:pPr>
+              <a:buClr>
+                <a:schemeClr val="tx2"/>
+              </a:buClr>
+            </a:pPr>
+            <a:r>
+              <a:rPr lang="en-US" dirty="0">
+                <a:solidFill>
+                  <a:schemeClr val="tx2"/>
+                </a:solidFill>
+                <a:latin typeface="Arial" panose="020B0604020202020204" pitchFamily="34" charset="0"/>
+                <a:cs typeface="Arial" panose="020B0604020202020204" pitchFamily="34" charset="0"/>
+              </a:rPr>
+              <a:t>The second interview tests the applicant’s </a:t>
+            </a:r>
+            <a:r>
+              <a:rPr lang="en-US" b="1" i="1" dirty="0">
+                <a:solidFill>
+                  <a:schemeClr val="tx2"/>
+                </a:solidFill>
+                <a:latin typeface="Arial" panose="020B0604020202020204" pitchFamily="34" charset="0"/>
+                <a:cs typeface="Arial" panose="020B0604020202020204" pitchFamily="34" charset="0"/>
+              </a:rPr>
+              <a:t>depth of knowledge</a:t>
+            </a:r>
+            <a:r>
+              <a:rPr lang="en-US" b="1" dirty="0">
+                <a:solidFill>
+                  <a:schemeClr val="tx2"/>
+                </a:solidFill>
+                <a:latin typeface="Arial" panose="020B0604020202020204" pitchFamily="34" charset="0"/>
+                <a:cs typeface="Arial" panose="020B0604020202020204" pitchFamily="34" charset="0"/>
+              </a:rPr>
+              <a:t> </a:t>
+            </a:r>
+            <a:r>
+              <a:rPr lang="en-US" dirty="0">
+                <a:solidFill>
+                  <a:schemeClr val="tx2"/>
+                </a:solidFill>
+                <a:latin typeface="Arial" panose="020B0604020202020204" pitchFamily="34" charset="0"/>
+                <a:cs typeface="Arial" panose="020B0604020202020204" pitchFamily="34" charset="0"/>
+              </a:rPr>
+              <a:t>across the competencies.</a:t>
+            </a:r>
+          </a:p>
+          <a:p>
+            <a:pPr>
+              <a:buClr>
+                <a:schemeClr val="tx2"/>
+              </a:buClr>
+            </a:pPr>
+            <a:r>
+              <a:rPr lang="en-US" dirty="0">
+                <a:solidFill>
+                  <a:schemeClr val="tx2"/>
+                </a:solidFill>
+                <a:latin typeface="Arial" panose="020B0604020202020204" pitchFamily="34" charset="0"/>
+                <a:cs typeface="Arial" panose="020B0604020202020204" pitchFamily="34" charset="0"/>
+              </a:rPr>
+              <a:t>Depth questions can take up to 10-15 minutes for an applicant to answer. </a:t>
+            </a:r>
+          </a:p>
+          <a:p>
+            <a:pPr>
+              <a:buClr>
+                <a:schemeClr val="tx2"/>
+              </a:buClr>
+            </a:pPr>
+            <a:r>
+              <a:rPr lang="en-US" dirty="0">
+                <a:solidFill>
+                  <a:schemeClr val="tx2"/>
+                </a:solidFill>
+                <a:latin typeface="Arial" panose="020B0604020202020204" pitchFamily="34" charset="0"/>
+                <a:cs typeface="Arial" panose="020B0604020202020204" pitchFamily="34" charset="0"/>
+              </a:rPr>
+              <a:t>Depth questions test how an applicant reacts and responds to changes in the presented situation.</a:t>
+            </a:r>
+          </a:p>
+          <a:p>
+            <a:pPr>
+              <a:buClr>
+                <a:schemeClr val="tx2"/>
+              </a:buClr>
+            </a:pPr>
+            <a:r>
+              <a:rPr lang="en-US" dirty="0">
+                <a:solidFill>
+                  <a:schemeClr val="tx2"/>
+                </a:solidFill>
+                <a:latin typeface="Arial" panose="020B0604020202020204" pitchFamily="34" charset="0"/>
+                <a:cs typeface="Arial" panose="020B0604020202020204" pitchFamily="34" charset="0"/>
+              </a:rPr>
+              <a:t>Depth: Mandated follow up questions that probe deeper (i.e., “Now imagine...” or “Tell me about a time you've experienced that hypothetical in real life.”).</a:t>
+            </a:r>
+          </a:p>
+          <a:p>
+            <a:pPr>
+              <a:buClr>
+                <a:schemeClr val="tx2"/>
+              </a:buClr>
+            </a:pPr>
+            <a:endParaRPr lang="en-US" dirty="0">
+              <a:solidFill>
+                <a:schemeClr val="tx2"/>
+              </a:solidFill>
+              <a:latin typeface="Arial" panose="020B0604020202020204" pitchFamily="34" charset="0"/>
+              <a:cs typeface="Arial" panose="020B0604020202020204" pitchFamily="34" charset="0"/>
+            </a:endParaRPr>
+          </a:p>
+        </p:txBody>
+      </p:sp>
+      <p:sp>
+        <p:nvSpPr>
+          <p:cNvPr id="8" name="Title 3">
+            <a:extLst>
+              <a:ext uri="{FF2B5EF4-FFF2-40B4-BE49-F238E27FC236}">
+                <a16:creationId xmlns:a16="http://schemas.microsoft.com/office/drawing/2014/main" id="{03688122-A7F5-3048-AD5C-54D50A88EE13}"/>
+              </a:ext>
+            </a:extLst>
+          </p:cNvPr>
+          <p:cNvSpPr txBox="1">
+            <a:spLocks/>
+          </p:cNvSpPr>
+          <p:nvPr/>
+        </p:nvSpPr>
+        <p:spPr>
+          <a:xfrm>
+            <a:off x="8670131" y="505196"/>
+            <a:ext cx="7039768" cy="1290459"/>
+          </a:xfrm>
+          <a:prstGeom prst="rect">
+            <a:avLst/>
+          </a:prstGeom>
+          <a:noFill/>
+          <a:ln>
+            <a:noFill/>
+          </a:ln>
+        </p:spPr>
+        <p:txBody>
+          <a:bodyPr spcFirstLastPara="1" wrap="square" lIns="91425" tIns="45700" rIns="91425" bIns="45700" anchor="t" anchorCtr="0"/>
+          <a:lstStyle>
+            <a:defPPr marR="0" lvl="0" algn="l" rtl="0">
+              <a:lnSpc>
+                <a:spcPct val="100000"/>
+              </a:lnSpc>
+              <a:spcBef>
+                <a:spcPts val="0"/>
+              </a:spcBef>
+              <a:spcAft>
+                <a:spcPts val="0"/>
+              </a:spcAft>
+            </a:defPPr>
+            <a:lvl1pPr marR="0" lvl="0" algn="l" rtl="0">
+              <a:lnSpc>
+                <a:spcPct val="100000"/>
+              </a:lnSpc>
+              <a:spcBef>
+                <a:spcPts val="0"/>
+              </a:spcBef>
+              <a:spcAft>
+                <a:spcPts val="0"/>
+              </a:spcAft>
+              <a:buClr>
+                <a:srgbClr val="000000"/>
+              </a:buClr>
+              <a:buSzPts val="1400"/>
+              <a:buFont typeface="Arial"/>
+              <a:buNone/>
+              <a:defRPr sz="3600" b="1" i="0" u="none" strike="noStrike" cap="all" baseline="0">
+                <a:solidFill>
+                  <a:srgbClr val="0D71BC"/>
+                </a:solidFill>
+                <a:latin typeface="Source Sans Pro SemiBold" panose="020B0503030403020204" pitchFamily="34" charset="0"/>
+                <a:ea typeface="Source Sans Pro SemiBold" panose="020B0503030403020204" pitchFamily="34" charset="0"/>
+                <a:cs typeface="Source Sans Pro SemiBold" panose="020B0503030403020204" pitchFamily="34" charset="0"/>
+                <a:sym typeface="Avenir"/>
+              </a:defRPr>
+            </a:lvl1pPr>
+            <a:lvl2pPr marR="0" lvl="1" algn="ctr" rtl="0">
+              <a:lnSpc>
+                <a:spcPct val="100000"/>
+              </a:lnSpc>
+              <a:spcBef>
+                <a:spcPts val="0"/>
+              </a:spcBef>
+              <a:spcAft>
+                <a:spcPts val="0"/>
+              </a:spcAft>
+              <a:buClr>
+                <a:srgbClr val="000000"/>
+              </a:buClr>
+              <a:buSzPts val="1400"/>
+              <a:buFont typeface="Arial"/>
+              <a:buNone/>
+              <a:defRPr sz="8000" b="0" i="0" u="none" strike="noStrike" cap="none">
+                <a:solidFill>
+                  <a:srgbClr val="000000"/>
+                </a:solidFill>
+                <a:latin typeface="Rockwell"/>
+                <a:ea typeface="Rockwell"/>
+                <a:cs typeface="Rockwell"/>
+                <a:sym typeface="Rockwell"/>
+              </a:defRPr>
+            </a:lvl2pPr>
+            <a:lvl3pPr marR="0" lvl="2" algn="ctr" rtl="0">
+              <a:lnSpc>
+                <a:spcPct val="100000"/>
+              </a:lnSpc>
+              <a:spcBef>
+                <a:spcPts val="0"/>
+              </a:spcBef>
+              <a:spcAft>
+                <a:spcPts val="0"/>
+              </a:spcAft>
+              <a:buClr>
+                <a:srgbClr val="000000"/>
+              </a:buClr>
+              <a:buSzPts val="1400"/>
+              <a:buFont typeface="Arial"/>
+              <a:buNone/>
+              <a:defRPr sz="8000" b="0" i="0" u="none" strike="noStrike" cap="none">
+                <a:solidFill>
+                  <a:srgbClr val="000000"/>
+                </a:solidFill>
+                <a:latin typeface="Rockwell"/>
+                <a:ea typeface="Rockwell"/>
+                <a:cs typeface="Rockwell"/>
+                <a:sym typeface="Rockwell"/>
+              </a:defRPr>
+            </a:lvl3pPr>
+            <a:lvl4pPr marR="0" lvl="3" algn="ctr" rtl="0">
+              <a:lnSpc>
+                <a:spcPct val="100000"/>
+              </a:lnSpc>
+              <a:spcBef>
+                <a:spcPts val="0"/>
+              </a:spcBef>
+              <a:spcAft>
+                <a:spcPts val="0"/>
+              </a:spcAft>
+              <a:buClr>
+                <a:srgbClr val="000000"/>
+              </a:buClr>
+              <a:buSzPts val="1400"/>
+              <a:buFont typeface="Arial"/>
+              <a:buNone/>
+              <a:defRPr sz="8000" b="0" i="0" u="none" strike="noStrike" cap="none">
+                <a:solidFill>
+                  <a:srgbClr val="000000"/>
+                </a:solidFill>
+                <a:latin typeface="Rockwell"/>
+                <a:ea typeface="Rockwell"/>
+                <a:cs typeface="Rockwell"/>
+                <a:sym typeface="Rockwell"/>
+              </a:defRPr>
+            </a:lvl4pPr>
+            <a:lvl5pPr marR="0" lvl="4" algn="ctr" rtl="0">
+              <a:lnSpc>
+                <a:spcPct val="100000"/>
+              </a:lnSpc>
+              <a:spcBef>
+                <a:spcPts val="0"/>
+              </a:spcBef>
+              <a:spcAft>
+                <a:spcPts val="0"/>
+              </a:spcAft>
+              <a:buClr>
+                <a:srgbClr val="000000"/>
+              </a:buClr>
+              <a:buSzPts val="1400"/>
+              <a:buFont typeface="Arial"/>
+              <a:buNone/>
+              <a:defRPr sz="8000" b="0" i="0" u="none" strike="noStrike" cap="none">
+                <a:solidFill>
+                  <a:srgbClr val="000000"/>
+                </a:solidFill>
+                <a:latin typeface="Rockwell"/>
+                <a:ea typeface="Rockwell"/>
+                <a:cs typeface="Rockwell"/>
+                <a:sym typeface="Rockwell"/>
+              </a:defRPr>
+            </a:lvl5pPr>
+            <a:lvl6pPr marR="0" lvl="5" algn="ctr" rtl="0">
+              <a:lnSpc>
+                <a:spcPct val="100000"/>
+              </a:lnSpc>
+              <a:spcBef>
+                <a:spcPts val="0"/>
+              </a:spcBef>
+              <a:spcAft>
+                <a:spcPts val="0"/>
+              </a:spcAft>
+              <a:buClr>
+                <a:srgbClr val="000000"/>
+              </a:buClr>
+              <a:buSzPts val="1400"/>
+              <a:buFont typeface="Arial"/>
+              <a:buNone/>
+              <a:defRPr sz="8000" b="0" i="0" u="none" strike="noStrike" cap="none">
+                <a:solidFill>
+                  <a:srgbClr val="000000"/>
+                </a:solidFill>
+                <a:latin typeface="Rockwell"/>
+                <a:ea typeface="Rockwell"/>
+                <a:cs typeface="Rockwell"/>
+                <a:sym typeface="Rockwell"/>
+              </a:defRPr>
+            </a:lvl6pPr>
+            <a:lvl7pPr marR="0" lvl="6" algn="ctr" rtl="0">
+              <a:lnSpc>
+                <a:spcPct val="100000"/>
+              </a:lnSpc>
+              <a:spcBef>
+                <a:spcPts val="0"/>
+              </a:spcBef>
+              <a:spcAft>
+                <a:spcPts val="0"/>
+              </a:spcAft>
+              <a:buClr>
+                <a:srgbClr val="000000"/>
+              </a:buClr>
+              <a:buSzPts val="1400"/>
+              <a:buFont typeface="Arial"/>
+              <a:buNone/>
+              <a:defRPr sz="8000" b="0" i="0" u="none" strike="noStrike" cap="none">
+                <a:solidFill>
+                  <a:srgbClr val="000000"/>
+                </a:solidFill>
+                <a:latin typeface="Rockwell"/>
+                <a:ea typeface="Rockwell"/>
+                <a:cs typeface="Rockwell"/>
+                <a:sym typeface="Rockwell"/>
+              </a:defRPr>
+            </a:lvl7pPr>
+            <a:lvl8pPr marR="0" lvl="7" algn="ctr" rtl="0">
+              <a:lnSpc>
+                <a:spcPct val="100000"/>
+              </a:lnSpc>
+              <a:spcBef>
+                <a:spcPts val="0"/>
+              </a:spcBef>
+              <a:spcAft>
+                <a:spcPts val="0"/>
+              </a:spcAft>
+              <a:buClr>
+                <a:srgbClr val="000000"/>
+              </a:buClr>
+              <a:buSzPts val="1400"/>
+              <a:buFont typeface="Arial"/>
+              <a:buNone/>
+              <a:defRPr sz="8000" b="0" i="0" u="none" strike="noStrike" cap="none">
+                <a:solidFill>
+                  <a:srgbClr val="000000"/>
+                </a:solidFill>
+                <a:latin typeface="Rockwell"/>
+                <a:ea typeface="Rockwell"/>
+                <a:cs typeface="Rockwell"/>
+                <a:sym typeface="Rockwell"/>
+              </a:defRPr>
+            </a:lvl8pPr>
+            <a:lvl9pPr marR="0" lvl="8" algn="ctr" rtl="0">
+              <a:lnSpc>
+                <a:spcPct val="100000"/>
+              </a:lnSpc>
+              <a:spcBef>
+                <a:spcPts val="0"/>
+              </a:spcBef>
+              <a:spcAft>
+                <a:spcPts val="0"/>
+              </a:spcAft>
+              <a:buClr>
+                <a:srgbClr val="000000"/>
+              </a:buClr>
+              <a:buSzPts val="1400"/>
+              <a:buFont typeface="Arial"/>
+              <a:buNone/>
+              <a:defRPr sz="8000" b="0" i="0" u="none" strike="noStrike" cap="none">
+                <a:solidFill>
+                  <a:srgbClr val="000000"/>
+                </a:solidFill>
+                <a:latin typeface="Rockwell"/>
+                <a:ea typeface="Rockwell"/>
+                <a:cs typeface="Rockwell"/>
+                <a:sym typeface="Rockwell"/>
+              </a:defRPr>
+            </a:lvl9pPr>
+          </a:lstStyle>
+          <a:p>
+            <a:r>
+              <a:rPr lang="en-US" dirty="0">
+                <a:solidFill>
+                  <a:schemeClr val="tx2"/>
+                </a:solidFill>
+                <a:latin typeface="+mn-lt"/>
+              </a:rPr>
+              <a:t>Depth questions</a:t>
+            </a:r>
+          </a:p>
+        </p:txBody>
+      </p:sp>
+      <p:sp>
+        <p:nvSpPr>
+          <p:cNvPr id="9" name="Rectangle 8">
+            <a:extLst>
+              <a:ext uri="{FF2B5EF4-FFF2-40B4-BE49-F238E27FC236}">
+                <a16:creationId xmlns:a16="http://schemas.microsoft.com/office/drawing/2014/main" id="{1503535E-A95D-194A-BCC3-2DC71399598E}"/>
+              </a:ext>
+            </a:extLst>
+          </p:cNvPr>
+          <p:cNvSpPr/>
+          <p:nvPr/>
+        </p:nvSpPr>
+        <p:spPr>
+          <a:xfrm>
+            <a:off x="1734112" y="3746809"/>
+            <a:ext cx="13872117" cy="2141034"/>
+          </a:xfrm>
+          <a:prstGeom prst="rect">
+            <a:avLst/>
+          </a:prstGeom>
+          <a:solidFill>
+            <a:srgbClr val="FFFF00"/>
+          </a:solidFill>
+        </p:spPr>
+        <p:style>
+          <a:lnRef idx="2">
+            <a:schemeClr val="accent1">
+              <a:shade val="50000"/>
+            </a:schemeClr>
+          </a:lnRef>
+          <a:fillRef idx="1">
+            <a:schemeClr val="accent1"/>
+          </a:fillRef>
+          <a:effectRef idx="0">
+            <a:schemeClr val="accent1"/>
+          </a:effectRef>
+          <a:fontRef idx="minor">
+            <a:schemeClr val="lt1"/>
+          </a:fontRef>
+        </p:style>
+        <p:txBody>
+          <a:bodyPr rtlCol="0" anchor="ctr"/>
           <a:lstStyle/>
           <a:p>
-            <a:r>
-              <a:rPr lang="en-US" dirty="0"/>
-              <a:t>Next, we’ll create questions. Some example question types.</a:t>
-            </a:r>
-          </a:p>
-          <a:p>
-            <a:pPr lvl="1"/>
-            <a:r>
-              <a:rPr lang="en-US" dirty="0"/>
-              <a:t>Past experience: “Tell me about a time…”</a:t>
-            </a:r>
-          </a:p>
-          <a:p>
-            <a:pPr lvl="1"/>
-            <a:r>
-              <a:rPr lang="en-US" dirty="0"/>
-              <a:t>Hypothetical situation: “Imagine we have a problem with…”</a:t>
-            </a:r>
-          </a:p>
-          <a:p>
-            <a:pPr lvl="1"/>
-            <a:r>
-              <a:rPr lang="en-US" dirty="0"/>
-              <a:t>Applicant’s viewpoint: “What do you think about…”</a:t>
-            </a:r>
+            <a:pPr algn="ctr"/>
+            <a:r>
+              <a:rPr lang="en-US" sz="3600" b="1" dirty="0">
+                <a:solidFill>
+                  <a:schemeClr val="tx2"/>
+                </a:solidFill>
+                <a:latin typeface="+mj-lt"/>
+              </a:rPr>
+              <a:t>Use this slide if doing two structured interview assessments</a:t>
+            </a:r>
+          </a:p>
+          <a:p>
+            <a:pPr algn="ctr"/>
+            <a:endParaRPr lang="en-US" dirty="0"/>
           </a:p>
         </p:txBody>
       </p:sp>
     </p:spTree>
     <p:extLst>
       <p:ext uri="{BB962C8B-B14F-4D97-AF65-F5344CB8AC3E}">
-        <p14:creationId xmlns:p14="http://schemas.microsoft.com/office/powerpoint/2010/main" val="3085537343"/>
+        <p14:creationId xmlns:p14="http://schemas.microsoft.com/office/powerpoint/2010/main" val="1075016947"/>
       </p:ext>
     </p:extLst>
   </p:cSld>
@@ -11282,10 +12205,10 @@
       </p:grpSpPr>
       <p:sp>
         <p:nvSpPr>
-          <p:cNvPr id="4" name="Title 3">
+          <p:cNvPr id="2" name="Title 1">
             <a:extLst>
               <a:ext uri="{FF2B5EF4-FFF2-40B4-BE49-F238E27FC236}">
-                <a16:creationId xmlns:a16="http://schemas.microsoft.com/office/drawing/2014/main" id="{AE90C0D7-6A34-964F-8E33-5E36603A25C5}"/>
+                <a16:creationId xmlns:a16="http://schemas.microsoft.com/office/drawing/2014/main" id="{D4E4C047-701E-6045-A204-2E9F55292620}"/>
               </a:ext>
             </a:extLst>
           </p:cNvPr>
@@ -11296,45 +12219,39 @@
             <p:ph type="title"/>
           </p:nvPr>
         </p:nvSpPr>
-        <p:spPr>
-          <a:xfrm>
-            <a:off x="1268344" y="519298"/>
-            <a:ext cx="7039768" cy="1290459"/>
-          </a:xfrm>
-        </p:spPr>
+        <p:spPr/>
         <p:txBody>
           <a:bodyPr/>
           <a:lstStyle/>
           <a:p>
             <a:r>
               <a:rPr lang="en-US" dirty="0"/>
-              <a:t>Breadth questions</a:t>
+              <a:t>Example Breadth Question – Stakeholder Engagement Competency</a:t>
             </a:r>
           </a:p>
         </p:txBody>
       </p:sp>
       <p:sp>
         <p:nvSpPr>
-          <p:cNvPr id="6" name="Text Placeholder 2">
+          <p:cNvPr id="3" name="Text Placeholder 2">
             <a:extLst>
               <a:ext uri="{FF2B5EF4-FFF2-40B4-BE49-F238E27FC236}">
-                <a16:creationId xmlns:a16="http://schemas.microsoft.com/office/drawing/2014/main" id="{CC2E7D81-A3D8-E140-B023-A4C267EF860A}"/>
+                <a16:creationId xmlns:a16="http://schemas.microsoft.com/office/drawing/2014/main" id="{D6A4DA58-3293-B044-90E9-FC07DFF20EF1}"/>
               </a:ext>
             </a:extLst>
           </p:cNvPr>
-          <p:cNvSpPr txBox="1">
-            <a:spLocks/>
+          <p:cNvSpPr>
+            <a:spLocks noGrp="1"/>
           </p:cNvSpPr>
-          <p:nvPr/>
+          <p:nvPr>
+            <p:ph type="body" idx="1"/>
+          </p:nvPr>
         </p:nvSpPr>
         <p:spPr>
           <a:xfrm>
-            <a:off x="1268344" y="1993900"/>
-            <a:ext cx="6887369" cy="7131050"/>
+            <a:off x="1192143" y="1841500"/>
+            <a:ext cx="14956057" cy="7392802"/>
           </a:xfrm>
-          <a:prstGeom prst="rect">
-            <a:avLst/>
-          </a:prstGeom>
           <a:noFill/>
           <a:ln>
             <a:noFill/>
@@ -11342,1101 +12259,28 @@
         </p:spPr>
         <p:txBody>
           <a:bodyPr spcFirstLastPara="1" wrap="square" lIns="0" tIns="0" rIns="0" bIns="0" anchor="t" anchorCtr="0">
-            <a:normAutofit fontScale="77500" lnSpcReduction="20000"/>
+            <a:normAutofit/>
           </a:bodyPr>
-          <a:lstStyle>
-            <a:defPPr marR="0" lvl="0" algn="l" rtl="0">
-              <a:lnSpc>
-                <a:spcPct val="100000"/>
-              </a:lnSpc>
-              <a:spcBef>
-                <a:spcPts val="0"/>
-              </a:spcBef>
-              <a:spcAft>
-                <a:spcPts val="0"/>
-              </a:spcAft>
-            </a:defPPr>
-            <a:lvl1pPr marL="457246" marR="0" lvl="0" indent="-285779" algn="l" rtl="0">
-              <a:lnSpc>
-                <a:spcPct val="100000"/>
-              </a:lnSpc>
-              <a:spcBef>
-                <a:spcPts val="4200"/>
-              </a:spcBef>
-              <a:spcAft>
-                <a:spcPts val="0"/>
-              </a:spcAft>
-              <a:buClr>
-                <a:srgbClr val="0D71BC"/>
-              </a:buClr>
-              <a:buSzPct val="112000"/>
-              <a:buFont typeface="Arial" panose="020B0604020202020204" pitchFamily="34" charset="0"/>
-              <a:buChar char="•"/>
-              <a:defRPr sz="3600" b="0" i="0" u="none" strike="noStrike" cap="none">
-                <a:solidFill>
-                  <a:srgbClr val="0D71BC"/>
-                </a:solidFill>
-                <a:latin typeface="Source Sans Pro" panose="020B0503030403020204" pitchFamily="34" charset="0"/>
-                <a:ea typeface="Source Sans Pro" panose="020B0503030403020204" pitchFamily="34" charset="0"/>
-                <a:cs typeface="Avenir"/>
-                <a:sym typeface="Avenir"/>
-              </a:defRPr>
-            </a:lvl1pPr>
-            <a:lvl2pPr marL="914492" marR="0" lvl="1" indent="-285779" algn="l" rtl="0">
-              <a:lnSpc>
-                <a:spcPct val="100000"/>
-              </a:lnSpc>
-              <a:spcBef>
-                <a:spcPts val="4200"/>
-              </a:spcBef>
-              <a:spcAft>
-                <a:spcPts val="0"/>
-              </a:spcAft>
-              <a:buClr>
-                <a:srgbClr val="0D71BC"/>
-              </a:buClr>
-              <a:buSzPct val="112000"/>
-              <a:buFont typeface="Arial" panose="020B0604020202020204" pitchFamily="34" charset="0"/>
-              <a:buChar char="•"/>
-              <a:defRPr sz="3600" b="0" i="0" u="none" strike="noStrike" cap="none">
-                <a:solidFill>
-                  <a:srgbClr val="0D71BC"/>
-                </a:solidFill>
-                <a:latin typeface="Source Sans Pro" panose="020B0503030403020204" pitchFamily="34" charset="0"/>
-                <a:ea typeface="Source Sans Pro" panose="020B0503030403020204" pitchFamily="34" charset="0"/>
-                <a:cs typeface="Avenir"/>
-                <a:sym typeface="Avenir"/>
-              </a:defRPr>
-            </a:lvl2pPr>
-            <a:lvl3pPr marL="1371737" marR="0" lvl="2" indent="-314357" algn="l" rtl="0">
-              <a:lnSpc>
-                <a:spcPct val="100000"/>
-              </a:lnSpc>
-              <a:spcBef>
-                <a:spcPts val="4200"/>
-              </a:spcBef>
-              <a:spcAft>
-                <a:spcPts val="0"/>
-              </a:spcAft>
-              <a:buClr>
-                <a:srgbClr val="0D71BC"/>
-              </a:buClr>
-              <a:buSzPct val="112000"/>
-              <a:buFont typeface="Arial" panose="020B0604020202020204" pitchFamily="34" charset="0"/>
-              <a:buChar char="•"/>
-              <a:defRPr sz="3600" b="0" i="0" u="none" strike="noStrike" cap="none">
-                <a:solidFill>
-                  <a:srgbClr val="0D71BC"/>
-                </a:solidFill>
-                <a:latin typeface="Source Sans Pro" panose="020B0503030403020204" pitchFamily="34" charset="0"/>
-                <a:ea typeface="Source Sans Pro" panose="020B0503030403020204" pitchFamily="34" charset="0"/>
-                <a:cs typeface="Avenir"/>
-                <a:sym typeface="Avenir"/>
-              </a:defRPr>
-            </a:lvl3pPr>
-            <a:lvl4pPr marL="1828984" marR="0" lvl="3" indent="-314357" algn="l" rtl="0">
-              <a:lnSpc>
-                <a:spcPct val="100000"/>
-              </a:lnSpc>
-              <a:spcBef>
-                <a:spcPts val="4200"/>
-              </a:spcBef>
-              <a:spcAft>
-                <a:spcPts val="0"/>
-              </a:spcAft>
-              <a:buClr>
-                <a:srgbClr val="0D71BC"/>
-              </a:buClr>
-              <a:buSzPct val="112000"/>
-              <a:buFont typeface="Arial" panose="020B0604020202020204" pitchFamily="34" charset="0"/>
-              <a:buChar char="•"/>
-              <a:defRPr sz="3600" b="0" i="0" u="none" strike="noStrike" cap="none">
-                <a:solidFill>
-                  <a:srgbClr val="0D71BC"/>
-                </a:solidFill>
-                <a:latin typeface="Source Sans Pro" panose="020B0503030403020204" pitchFamily="34" charset="0"/>
-                <a:ea typeface="Source Sans Pro" panose="020B0503030403020204" pitchFamily="34" charset="0"/>
-                <a:cs typeface="Avenir"/>
-                <a:sym typeface="Avenir"/>
-              </a:defRPr>
-            </a:lvl4pPr>
-            <a:lvl5pPr marL="2286228" marR="0" lvl="4" indent="-314357" algn="l" rtl="0">
-              <a:lnSpc>
-                <a:spcPct val="100000"/>
-              </a:lnSpc>
-              <a:spcBef>
-                <a:spcPts val="4200"/>
-              </a:spcBef>
-              <a:spcAft>
-                <a:spcPts val="0"/>
-              </a:spcAft>
-              <a:buClr>
-                <a:srgbClr val="0D71BC"/>
-              </a:buClr>
-              <a:buSzPct val="112000"/>
-              <a:buFont typeface="Arial" panose="020B0604020202020204" pitchFamily="34" charset="0"/>
-              <a:buChar char="•"/>
-              <a:defRPr sz="3600" b="0" i="0" u="none" strike="noStrike" cap="none">
-                <a:solidFill>
-                  <a:srgbClr val="0D71BC"/>
-                </a:solidFill>
-                <a:latin typeface="Source Sans Pro" panose="020B0503030403020204" pitchFamily="34" charset="0"/>
-                <a:ea typeface="Source Sans Pro" panose="020B0503030403020204" pitchFamily="34" charset="0"/>
-                <a:cs typeface="Avenir"/>
-                <a:sym typeface="Avenir"/>
-              </a:defRPr>
-            </a:lvl5pPr>
-            <a:lvl6pPr marL="2743475" marR="0" lvl="5" indent="-314357" algn="l" rtl="0">
-              <a:lnSpc>
-                <a:spcPct val="100000"/>
-              </a:lnSpc>
-              <a:spcBef>
-                <a:spcPts val="4200"/>
-              </a:spcBef>
-              <a:spcAft>
-                <a:spcPts val="0"/>
-              </a:spcAft>
-              <a:buClr>
-                <a:srgbClr val="000000"/>
-              </a:buClr>
-              <a:buSzPts val="1350"/>
-              <a:buFont typeface="Rockwell"/>
-              <a:buChar char="•"/>
-              <a:defRPr sz="3600" b="0" i="0" u="none" strike="noStrike" cap="none">
-                <a:solidFill>
-                  <a:srgbClr val="000000"/>
-                </a:solidFill>
-                <a:latin typeface="Rockwell"/>
-                <a:ea typeface="Rockwell"/>
-                <a:cs typeface="Rockwell"/>
-                <a:sym typeface="Rockwell"/>
-              </a:defRPr>
-            </a:lvl6pPr>
-            <a:lvl7pPr marL="3200720" marR="0" lvl="6" indent="-314357" algn="l" rtl="0">
-              <a:lnSpc>
-                <a:spcPct val="100000"/>
-              </a:lnSpc>
-              <a:spcBef>
-                <a:spcPts val="4200"/>
-              </a:spcBef>
-              <a:spcAft>
-                <a:spcPts val="0"/>
-              </a:spcAft>
-              <a:buClr>
-                <a:srgbClr val="000000"/>
-              </a:buClr>
-              <a:buSzPts val="1350"/>
-              <a:buFont typeface="Rockwell"/>
-              <a:buChar char="•"/>
-              <a:defRPr sz="3600" b="0" i="0" u="none" strike="noStrike" cap="none">
-                <a:solidFill>
-                  <a:srgbClr val="000000"/>
-                </a:solidFill>
-                <a:latin typeface="Rockwell"/>
-                <a:ea typeface="Rockwell"/>
-                <a:cs typeface="Rockwell"/>
-                <a:sym typeface="Rockwell"/>
-              </a:defRPr>
-            </a:lvl7pPr>
-            <a:lvl8pPr marL="3657966" marR="0" lvl="7" indent="-314357" algn="l" rtl="0">
-              <a:lnSpc>
-                <a:spcPct val="100000"/>
-              </a:lnSpc>
-              <a:spcBef>
-                <a:spcPts val="4200"/>
-              </a:spcBef>
-              <a:spcAft>
-                <a:spcPts val="0"/>
-              </a:spcAft>
-              <a:buClr>
-                <a:srgbClr val="000000"/>
-              </a:buClr>
-              <a:buSzPts val="1350"/>
-              <a:buFont typeface="Rockwell"/>
-              <a:buChar char="•"/>
-              <a:defRPr sz="3600" b="0" i="0" u="none" strike="noStrike" cap="none">
-                <a:solidFill>
-                  <a:srgbClr val="000000"/>
-                </a:solidFill>
-                <a:latin typeface="Rockwell"/>
-                <a:ea typeface="Rockwell"/>
-                <a:cs typeface="Rockwell"/>
-                <a:sym typeface="Rockwell"/>
-              </a:defRPr>
-            </a:lvl8pPr>
-            <a:lvl9pPr marL="4115212" marR="0" lvl="8" indent="-314357" algn="l" rtl="0">
-              <a:lnSpc>
-                <a:spcPct val="100000"/>
-              </a:lnSpc>
-              <a:spcBef>
-                <a:spcPts val="4200"/>
-              </a:spcBef>
-              <a:spcAft>
-                <a:spcPts val="0"/>
-              </a:spcAft>
-              <a:buClr>
-                <a:srgbClr val="000000"/>
-              </a:buClr>
-              <a:buSzPts val="1350"/>
-              <a:buFont typeface="Rockwell"/>
-              <a:buChar char="•"/>
-              <a:defRPr sz="3600" b="0" i="0" u="none" strike="noStrike" cap="none">
-                <a:solidFill>
-                  <a:srgbClr val="000000"/>
-                </a:solidFill>
-                <a:latin typeface="Rockwell"/>
-                <a:ea typeface="Rockwell"/>
-                <a:cs typeface="Rockwell"/>
-                <a:sym typeface="Rockwell"/>
-              </a:defRPr>
-            </a:lvl9pPr>
-          </a:lstStyle>
-          <a:p>
-            <a:pPr>
-              <a:buClr>
-                <a:schemeClr val="tx2"/>
-              </a:buClr>
+          <a:lstStyle/>
+          <a:p>
+            <a:pPr marL="171467" indent="0">
+              <a:buNone/>
             </a:pPr>
             <a:r>
-              <a:rPr lang="en-US" dirty="0">
-                <a:solidFill>
-                  <a:schemeClr val="tx2"/>
-                </a:solidFill>
-                <a:latin typeface="Arial" panose="020B0604020202020204" pitchFamily="34" charset="0"/>
-                <a:cs typeface="Arial" panose="020B0604020202020204" pitchFamily="34" charset="0"/>
-              </a:rPr>
-              <a:t>The first interview tests the applicant’s </a:t>
-            </a:r>
-            <a:r>
-              <a:rPr lang="en-US" b="1" i="1" dirty="0">
-                <a:solidFill>
-                  <a:schemeClr val="tx2"/>
-                </a:solidFill>
-                <a:latin typeface="Arial" panose="020B0604020202020204" pitchFamily="34" charset="0"/>
-                <a:cs typeface="Arial" panose="020B0604020202020204" pitchFamily="34" charset="0"/>
-              </a:rPr>
-              <a:t>breadth of experience</a:t>
-            </a:r>
-            <a:r>
-              <a:rPr lang="en-US" b="1" dirty="0">
-                <a:solidFill>
-                  <a:schemeClr val="tx2"/>
-                </a:solidFill>
-                <a:latin typeface="Arial" panose="020B0604020202020204" pitchFamily="34" charset="0"/>
-                <a:cs typeface="Arial" panose="020B0604020202020204" pitchFamily="34" charset="0"/>
-              </a:rPr>
-              <a:t> </a:t>
-            </a:r>
-            <a:r>
-              <a:rPr lang="en-US" dirty="0">
-                <a:solidFill>
-                  <a:schemeClr val="tx2"/>
-                </a:solidFill>
-                <a:latin typeface="Arial" panose="020B0604020202020204" pitchFamily="34" charset="0"/>
-                <a:cs typeface="Arial" panose="020B0604020202020204" pitchFamily="34" charset="0"/>
-              </a:rPr>
-              <a:t>across the competencies.</a:t>
-            </a:r>
-          </a:p>
-          <a:p>
-            <a:pPr>
-              <a:buClr>
-                <a:schemeClr val="tx2"/>
-              </a:buClr>
-            </a:pPr>
-            <a:r>
-              <a:rPr lang="en-US" dirty="0">
-                <a:solidFill>
-                  <a:schemeClr val="tx2"/>
-                </a:solidFill>
-                <a:latin typeface="Arial" panose="020B0604020202020204" pitchFamily="34" charset="0"/>
-                <a:cs typeface="Arial" panose="020B0604020202020204" pitchFamily="34" charset="0"/>
-              </a:rPr>
-              <a:t>Breadth questions tend to take 5-10 minutes for an applicant to answer.</a:t>
-            </a:r>
-          </a:p>
-          <a:p>
-            <a:pPr>
-              <a:buClr>
-                <a:schemeClr val="tx2"/>
-              </a:buClr>
-            </a:pPr>
-            <a:r>
-              <a:rPr lang="en-US" dirty="0">
-                <a:solidFill>
-                  <a:schemeClr val="tx2"/>
-                </a:solidFill>
-                <a:latin typeface="Arial" panose="020B0604020202020204" pitchFamily="34" charset="0"/>
-                <a:cs typeface="Arial" panose="020B0604020202020204" pitchFamily="34" charset="0"/>
-              </a:rPr>
-              <a:t>Breadth questions test if an applicant has experience, knowledge, or exposure to a general topic.</a:t>
-            </a:r>
-          </a:p>
-          <a:p>
-            <a:pPr>
-              <a:buClr>
-                <a:schemeClr val="tx2"/>
-              </a:buClr>
-            </a:pPr>
-            <a:r>
-              <a:rPr lang="en-US" dirty="0">
-                <a:solidFill>
-                  <a:schemeClr val="tx2"/>
-                </a:solidFill>
-                <a:latin typeface="Arial" panose="020B0604020202020204" pitchFamily="34" charset="0"/>
-                <a:cs typeface="Arial" panose="020B0604020202020204" pitchFamily="34" charset="0"/>
-              </a:rPr>
-              <a:t>Breadth: Limit follow up questions to basic probe questions (i.e., “What was your role?” or  “Can you tell me more?”)</a:t>
-            </a:r>
-          </a:p>
-        </p:txBody>
-      </p:sp>
-      <p:sp>
-        <p:nvSpPr>
-          <p:cNvPr id="7" name="Text Placeholder 2">
-            <a:extLst>
-              <a:ext uri="{FF2B5EF4-FFF2-40B4-BE49-F238E27FC236}">
-                <a16:creationId xmlns:a16="http://schemas.microsoft.com/office/drawing/2014/main" id="{0C03725A-973B-874F-AC9C-1B79D87F47DD}"/>
-              </a:ext>
-            </a:extLst>
-          </p:cNvPr>
-          <p:cNvSpPr txBox="1">
-            <a:spLocks/>
-          </p:cNvSpPr>
-          <p:nvPr/>
-        </p:nvSpPr>
-        <p:spPr>
-          <a:xfrm>
-            <a:off x="8670131" y="1993900"/>
-            <a:ext cx="6887369" cy="7131050"/>
-          </a:xfrm>
-          <a:prstGeom prst="rect">
-            <a:avLst/>
-          </a:prstGeom>
-          <a:noFill/>
-          <a:ln>
-            <a:noFill/>
-          </a:ln>
-        </p:spPr>
-        <p:txBody>
-          <a:bodyPr spcFirstLastPara="1" wrap="square" lIns="0" tIns="0" rIns="0" bIns="0" anchor="t" anchorCtr="0">
-            <a:normAutofit fontScale="77500" lnSpcReduction="20000"/>
-          </a:bodyPr>
-          <a:lstStyle>
-            <a:defPPr marR="0" lvl="0" algn="l" rtl="0">
-              <a:lnSpc>
-                <a:spcPct val="100000"/>
-              </a:lnSpc>
-              <a:spcBef>
-                <a:spcPts val="0"/>
-              </a:spcBef>
-              <a:spcAft>
-                <a:spcPts val="0"/>
-              </a:spcAft>
-            </a:defPPr>
-            <a:lvl1pPr marL="457246" marR="0" lvl="0" indent="-285779" algn="l" rtl="0">
-              <a:lnSpc>
-                <a:spcPct val="100000"/>
-              </a:lnSpc>
-              <a:spcBef>
-                <a:spcPts val="4200"/>
-              </a:spcBef>
-              <a:spcAft>
-                <a:spcPts val="0"/>
-              </a:spcAft>
-              <a:buClr>
-                <a:srgbClr val="0D71BC"/>
-              </a:buClr>
-              <a:buSzPct val="112000"/>
-              <a:buFont typeface="Arial" panose="020B0604020202020204" pitchFamily="34" charset="0"/>
-              <a:buChar char="•"/>
-              <a:defRPr sz="3600" b="0" i="0" u="none" strike="noStrike" cap="none">
-                <a:solidFill>
-                  <a:srgbClr val="0D71BC"/>
-                </a:solidFill>
-                <a:latin typeface="Source Sans Pro" panose="020B0503030403020204" pitchFamily="34" charset="0"/>
-                <a:ea typeface="Source Sans Pro" panose="020B0503030403020204" pitchFamily="34" charset="0"/>
-                <a:cs typeface="Avenir"/>
-                <a:sym typeface="Avenir"/>
-              </a:defRPr>
-            </a:lvl1pPr>
-            <a:lvl2pPr marL="914492" marR="0" lvl="1" indent="-285779" algn="l" rtl="0">
-              <a:lnSpc>
-                <a:spcPct val="100000"/>
-              </a:lnSpc>
-              <a:spcBef>
-                <a:spcPts val="4200"/>
-              </a:spcBef>
-              <a:spcAft>
-                <a:spcPts val="0"/>
-              </a:spcAft>
-              <a:buClr>
-                <a:srgbClr val="0D71BC"/>
-              </a:buClr>
-              <a:buSzPct val="112000"/>
-              <a:buFont typeface="Arial" panose="020B0604020202020204" pitchFamily="34" charset="0"/>
-              <a:buChar char="•"/>
-              <a:defRPr sz="3600" b="0" i="0" u="none" strike="noStrike" cap="none">
-                <a:solidFill>
-                  <a:srgbClr val="0D71BC"/>
-                </a:solidFill>
-                <a:latin typeface="Source Sans Pro" panose="020B0503030403020204" pitchFamily="34" charset="0"/>
-                <a:ea typeface="Source Sans Pro" panose="020B0503030403020204" pitchFamily="34" charset="0"/>
-                <a:cs typeface="Avenir"/>
-                <a:sym typeface="Avenir"/>
-              </a:defRPr>
-            </a:lvl2pPr>
-            <a:lvl3pPr marL="1371737" marR="0" lvl="2" indent="-314357" algn="l" rtl="0">
-              <a:lnSpc>
-                <a:spcPct val="100000"/>
-              </a:lnSpc>
-              <a:spcBef>
-                <a:spcPts val="4200"/>
-              </a:spcBef>
-              <a:spcAft>
-                <a:spcPts val="0"/>
-              </a:spcAft>
-              <a:buClr>
-                <a:srgbClr val="0D71BC"/>
-              </a:buClr>
-              <a:buSzPct val="112000"/>
-              <a:buFont typeface="Arial" panose="020B0604020202020204" pitchFamily="34" charset="0"/>
-              <a:buChar char="•"/>
-              <a:defRPr sz="3600" b="0" i="0" u="none" strike="noStrike" cap="none">
-                <a:solidFill>
-                  <a:srgbClr val="0D71BC"/>
-                </a:solidFill>
-                <a:latin typeface="Source Sans Pro" panose="020B0503030403020204" pitchFamily="34" charset="0"/>
-                <a:ea typeface="Source Sans Pro" panose="020B0503030403020204" pitchFamily="34" charset="0"/>
-                <a:cs typeface="Avenir"/>
-                <a:sym typeface="Avenir"/>
-              </a:defRPr>
-            </a:lvl3pPr>
-            <a:lvl4pPr marL="1828984" marR="0" lvl="3" indent="-314357" algn="l" rtl="0">
-              <a:lnSpc>
-                <a:spcPct val="100000"/>
-              </a:lnSpc>
-              <a:spcBef>
-                <a:spcPts val="4200"/>
-              </a:spcBef>
-              <a:spcAft>
-                <a:spcPts val="0"/>
-              </a:spcAft>
-              <a:buClr>
-                <a:srgbClr val="0D71BC"/>
-              </a:buClr>
-              <a:buSzPct val="112000"/>
-              <a:buFont typeface="Arial" panose="020B0604020202020204" pitchFamily="34" charset="0"/>
-              <a:buChar char="•"/>
-              <a:defRPr sz="3600" b="0" i="0" u="none" strike="noStrike" cap="none">
-                <a:solidFill>
-                  <a:srgbClr val="0D71BC"/>
-                </a:solidFill>
-                <a:latin typeface="Source Sans Pro" panose="020B0503030403020204" pitchFamily="34" charset="0"/>
-                <a:ea typeface="Source Sans Pro" panose="020B0503030403020204" pitchFamily="34" charset="0"/>
-                <a:cs typeface="Avenir"/>
-                <a:sym typeface="Avenir"/>
-              </a:defRPr>
-            </a:lvl4pPr>
-            <a:lvl5pPr marL="2286228" marR="0" lvl="4" indent="-314357" algn="l" rtl="0">
-              <a:lnSpc>
-                <a:spcPct val="100000"/>
-              </a:lnSpc>
-              <a:spcBef>
-                <a:spcPts val="4200"/>
-              </a:spcBef>
-              <a:spcAft>
-                <a:spcPts val="0"/>
-              </a:spcAft>
-              <a:buClr>
-                <a:srgbClr val="0D71BC"/>
-              </a:buClr>
-              <a:buSzPct val="112000"/>
-              <a:buFont typeface="Arial" panose="020B0604020202020204" pitchFamily="34" charset="0"/>
-              <a:buChar char="•"/>
-              <a:defRPr sz="3600" b="0" i="0" u="none" strike="noStrike" cap="none">
-                <a:solidFill>
-                  <a:srgbClr val="0D71BC"/>
-                </a:solidFill>
-                <a:latin typeface="Source Sans Pro" panose="020B0503030403020204" pitchFamily="34" charset="0"/>
-                <a:ea typeface="Source Sans Pro" panose="020B0503030403020204" pitchFamily="34" charset="0"/>
-                <a:cs typeface="Avenir"/>
-                <a:sym typeface="Avenir"/>
-              </a:defRPr>
-            </a:lvl5pPr>
-            <a:lvl6pPr marL="2743475" marR="0" lvl="5" indent="-314357" algn="l" rtl="0">
-              <a:lnSpc>
-                <a:spcPct val="100000"/>
-              </a:lnSpc>
-              <a:spcBef>
-                <a:spcPts val="4200"/>
-              </a:spcBef>
-              <a:spcAft>
-                <a:spcPts val="0"/>
-              </a:spcAft>
-              <a:buClr>
-                <a:srgbClr val="000000"/>
-              </a:buClr>
-              <a:buSzPts val="1350"/>
-              <a:buFont typeface="Rockwell"/>
-              <a:buChar char="•"/>
-              <a:defRPr sz="3600" b="0" i="0" u="none" strike="noStrike" cap="none">
-                <a:solidFill>
-                  <a:srgbClr val="000000"/>
-                </a:solidFill>
-                <a:latin typeface="Rockwell"/>
-                <a:ea typeface="Rockwell"/>
-                <a:cs typeface="Rockwell"/>
-                <a:sym typeface="Rockwell"/>
-              </a:defRPr>
-            </a:lvl6pPr>
-            <a:lvl7pPr marL="3200720" marR="0" lvl="6" indent="-314357" algn="l" rtl="0">
-              <a:lnSpc>
-                <a:spcPct val="100000"/>
-              </a:lnSpc>
-              <a:spcBef>
-                <a:spcPts val="4200"/>
-              </a:spcBef>
-              <a:spcAft>
-                <a:spcPts val="0"/>
-              </a:spcAft>
-              <a:buClr>
-                <a:srgbClr val="000000"/>
-              </a:buClr>
-              <a:buSzPts val="1350"/>
-              <a:buFont typeface="Rockwell"/>
-              <a:buChar char="•"/>
-              <a:defRPr sz="3600" b="0" i="0" u="none" strike="noStrike" cap="none">
-                <a:solidFill>
-                  <a:srgbClr val="000000"/>
-                </a:solidFill>
-                <a:latin typeface="Rockwell"/>
-                <a:ea typeface="Rockwell"/>
-                <a:cs typeface="Rockwell"/>
-                <a:sym typeface="Rockwell"/>
-              </a:defRPr>
-            </a:lvl7pPr>
-            <a:lvl8pPr marL="3657966" marR="0" lvl="7" indent="-314357" algn="l" rtl="0">
-              <a:lnSpc>
-                <a:spcPct val="100000"/>
-              </a:lnSpc>
-              <a:spcBef>
-                <a:spcPts val="4200"/>
-              </a:spcBef>
-              <a:spcAft>
-                <a:spcPts val="0"/>
-              </a:spcAft>
-              <a:buClr>
-                <a:srgbClr val="000000"/>
-              </a:buClr>
-              <a:buSzPts val="1350"/>
-              <a:buFont typeface="Rockwell"/>
-              <a:buChar char="•"/>
-              <a:defRPr sz="3600" b="0" i="0" u="none" strike="noStrike" cap="none">
-                <a:solidFill>
-                  <a:srgbClr val="000000"/>
-                </a:solidFill>
-                <a:latin typeface="Rockwell"/>
-                <a:ea typeface="Rockwell"/>
-                <a:cs typeface="Rockwell"/>
-                <a:sym typeface="Rockwell"/>
-              </a:defRPr>
-            </a:lvl8pPr>
-            <a:lvl9pPr marL="4115212" marR="0" lvl="8" indent="-314357" algn="l" rtl="0">
-              <a:lnSpc>
-                <a:spcPct val="100000"/>
-              </a:lnSpc>
-              <a:spcBef>
-                <a:spcPts val="4200"/>
-              </a:spcBef>
-              <a:spcAft>
-                <a:spcPts val="0"/>
-              </a:spcAft>
-              <a:buClr>
-                <a:srgbClr val="000000"/>
-              </a:buClr>
-              <a:buSzPts val="1350"/>
-              <a:buFont typeface="Rockwell"/>
-              <a:buChar char="•"/>
-              <a:defRPr sz="3600" b="0" i="0" u="none" strike="noStrike" cap="none">
-                <a:solidFill>
-                  <a:srgbClr val="000000"/>
-                </a:solidFill>
-                <a:latin typeface="Rockwell"/>
-                <a:ea typeface="Rockwell"/>
-                <a:cs typeface="Rockwell"/>
-                <a:sym typeface="Rockwell"/>
-              </a:defRPr>
-            </a:lvl9pPr>
-          </a:lstStyle>
-          <a:p>
-            <a:pPr>
-              <a:buClr>
-                <a:schemeClr val="tx2"/>
-              </a:buClr>
-            </a:pPr>
-            <a:r>
-              <a:rPr lang="en-US" dirty="0">
-                <a:solidFill>
-                  <a:schemeClr val="tx2"/>
-                </a:solidFill>
-                <a:latin typeface="Arial" panose="020B0604020202020204" pitchFamily="34" charset="0"/>
-                <a:cs typeface="Arial" panose="020B0604020202020204" pitchFamily="34" charset="0"/>
-              </a:rPr>
-              <a:t>The second interview tests the applicant’s </a:t>
-            </a:r>
-            <a:r>
-              <a:rPr lang="en-US" b="1" i="1" dirty="0">
-                <a:solidFill>
-                  <a:schemeClr val="tx2"/>
-                </a:solidFill>
-                <a:latin typeface="Arial" panose="020B0604020202020204" pitchFamily="34" charset="0"/>
-                <a:cs typeface="Arial" panose="020B0604020202020204" pitchFamily="34" charset="0"/>
-              </a:rPr>
-              <a:t>depth of knowledge</a:t>
-            </a:r>
-            <a:r>
-              <a:rPr lang="en-US" b="1" dirty="0">
-                <a:solidFill>
-                  <a:schemeClr val="tx2"/>
-                </a:solidFill>
-                <a:latin typeface="Arial" panose="020B0604020202020204" pitchFamily="34" charset="0"/>
-                <a:cs typeface="Arial" panose="020B0604020202020204" pitchFamily="34" charset="0"/>
-              </a:rPr>
-              <a:t> </a:t>
-            </a:r>
-            <a:r>
-              <a:rPr lang="en-US" dirty="0">
-                <a:solidFill>
-                  <a:schemeClr val="tx2"/>
-                </a:solidFill>
-                <a:latin typeface="Arial" panose="020B0604020202020204" pitchFamily="34" charset="0"/>
-                <a:cs typeface="Arial" panose="020B0604020202020204" pitchFamily="34" charset="0"/>
-              </a:rPr>
-              <a:t>across the competencies.</a:t>
-            </a:r>
-          </a:p>
-          <a:p>
-            <a:pPr>
-              <a:buClr>
-                <a:schemeClr val="tx2"/>
-              </a:buClr>
-            </a:pPr>
-            <a:r>
-              <a:rPr lang="en-US" dirty="0">
-                <a:solidFill>
-                  <a:schemeClr val="tx2"/>
-                </a:solidFill>
-                <a:latin typeface="Arial" panose="020B0604020202020204" pitchFamily="34" charset="0"/>
-                <a:cs typeface="Arial" panose="020B0604020202020204" pitchFamily="34" charset="0"/>
-              </a:rPr>
-              <a:t>Depth questions can take up to 10-15 minutes for an applicant to answer. </a:t>
-            </a:r>
-          </a:p>
-          <a:p>
-            <a:pPr>
-              <a:buClr>
-                <a:schemeClr val="tx2"/>
-              </a:buClr>
-            </a:pPr>
-            <a:r>
-              <a:rPr lang="en-US" dirty="0">
-                <a:solidFill>
-                  <a:schemeClr val="tx2"/>
-                </a:solidFill>
-                <a:latin typeface="Arial" panose="020B0604020202020204" pitchFamily="34" charset="0"/>
-                <a:cs typeface="Arial" panose="020B0604020202020204" pitchFamily="34" charset="0"/>
-              </a:rPr>
-              <a:t>Depth questions test how an applicant reacts and responds to changes in the presented situation.</a:t>
-            </a:r>
-          </a:p>
-          <a:p>
-            <a:pPr>
-              <a:buClr>
-                <a:schemeClr val="tx2"/>
-              </a:buClr>
-            </a:pPr>
-            <a:r>
-              <a:rPr lang="en-US" dirty="0">
-                <a:solidFill>
-                  <a:schemeClr val="tx2"/>
-                </a:solidFill>
-                <a:latin typeface="Arial" panose="020B0604020202020204" pitchFamily="34" charset="0"/>
-                <a:cs typeface="Arial" panose="020B0604020202020204" pitchFamily="34" charset="0"/>
-              </a:rPr>
-              <a:t>Depth: Mandated follow up questions that probe deeper (i.e., “Now imagine...” or “Tell me about a time you've experienced that hypothetical in real life.”).</a:t>
-            </a:r>
-          </a:p>
-          <a:p>
-            <a:pPr>
-              <a:buClr>
-                <a:schemeClr val="tx2"/>
-              </a:buClr>
-            </a:pPr>
-            <a:endParaRPr lang="en-US" dirty="0">
-              <a:solidFill>
-                <a:schemeClr val="tx2"/>
-              </a:solidFill>
-              <a:latin typeface="Arial" panose="020B0604020202020204" pitchFamily="34" charset="0"/>
-              <a:cs typeface="Arial" panose="020B0604020202020204" pitchFamily="34" charset="0"/>
-            </a:endParaRPr>
-          </a:p>
-        </p:txBody>
-      </p:sp>
-      <p:sp>
-        <p:nvSpPr>
-          <p:cNvPr id="8" name="Title 3">
-            <a:extLst>
-              <a:ext uri="{FF2B5EF4-FFF2-40B4-BE49-F238E27FC236}">
-                <a16:creationId xmlns:a16="http://schemas.microsoft.com/office/drawing/2014/main" id="{03688122-A7F5-3048-AD5C-54D50A88EE13}"/>
-              </a:ext>
-            </a:extLst>
-          </p:cNvPr>
-          <p:cNvSpPr txBox="1">
-            <a:spLocks/>
-          </p:cNvSpPr>
-          <p:nvPr/>
-        </p:nvSpPr>
-        <p:spPr>
-          <a:xfrm>
-            <a:off x="8670131" y="505196"/>
-            <a:ext cx="7039768" cy="1290459"/>
-          </a:xfrm>
-          <a:prstGeom prst="rect">
-            <a:avLst/>
-          </a:prstGeom>
-          <a:noFill/>
-          <a:ln>
-            <a:noFill/>
-          </a:ln>
-        </p:spPr>
-        <p:txBody>
-          <a:bodyPr spcFirstLastPara="1" wrap="square" lIns="91425" tIns="45700" rIns="91425" bIns="45700" anchor="t" anchorCtr="0"/>
-          <a:lstStyle>
-            <a:defPPr marR="0" lvl="0" algn="l" rtl="0">
-              <a:lnSpc>
-                <a:spcPct val="100000"/>
-              </a:lnSpc>
-              <a:spcBef>
-                <a:spcPts val="0"/>
-              </a:spcBef>
-              <a:spcAft>
-                <a:spcPts val="0"/>
-              </a:spcAft>
-            </a:defPPr>
-            <a:lvl1pPr marR="0" lvl="0" algn="l" rtl="0">
-              <a:lnSpc>
-                <a:spcPct val="100000"/>
-              </a:lnSpc>
-              <a:spcBef>
-                <a:spcPts val="0"/>
-              </a:spcBef>
-              <a:spcAft>
-                <a:spcPts val="0"/>
-              </a:spcAft>
-              <a:buClr>
-                <a:srgbClr val="000000"/>
-              </a:buClr>
-              <a:buSzPts val="1400"/>
-              <a:buFont typeface="Arial"/>
-              <a:buNone/>
-              <a:defRPr sz="3600" b="1" i="0" u="none" strike="noStrike" cap="all" baseline="0">
-                <a:solidFill>
-                  <a:srgbClr val="0D71BC"/>
-                </a:solidFill>
-                <a:latin typeface="Source Sans Pro SemiBold" panose="020B0503030403020204" pitchFamily="34" charset="0"/>
-                <a:ea typeface="Source Sans Pro SemiBold" panose="020B0503030403020204" pitchFamily="34" charset="0"/>
-                <a:cs typeface="Source Sans Pro SemiBold" panose="020B0503030403020204" pitchFamily="34" charset="0"/>
-                <a:sym typeface="Avenir"/>
-              </a:defRPr>
-            </a:lvl1pPr>
-            <a:lvl2pPr marR="0" lvl="1" algn="ctr" rtl="0">
-              <a:lnSpc>
-                <a:spcPct val="100000"/>
-              </a:lnSpc>
-              <a:spcBef>
-                <a:spcPts val="0"/>
-              </a:spcBef>
-              <a:spcAft>
-                <a:spcPts val="0"/>
-              </a:spcAft>
-              <a:buClr>
-                <a:srgbClr val="000000"/>
-              </a:buClr>
-              <a:buSzPts val="1400"/>
-              <a:buFont typeface="Arial"/>
-              <a:buNone/>
-              <a:defRPr sz="8000" b="0" i="0" u="none" strike="noStrike" cap="none">
-                <a:solidFill>
-                  <a:srgbClr val="000000"/>
-                </a:solidFill>
-                <a:latin typeface="Rockwell"/>
-                <a:ea typeface="Rockwell"/>
-                <a:cs typeface="Rockwell"/>
-                <a:sym typeface="Rockwell"/>
-              </a:defRPr>
-            </a:lvl2pPr>
-            <a:lvl3pPr marR="0" lvl="2" algn="ctr" rtl="0">
-              <a:lnSpc>
-                <a:spcPct val="100000"/>
-              </a:lnSpc>
-              <a:spcBef>
-                <a:spcPts val="0"/>
-              </a:spcBef>
-              <a:spcAft>
-                <a:spcPts val="0"/>
-              </a:spcAft>
-              <a:buClr>
-                <a:srgbClr val="000000"/>
-              </a:buClr>
-              <a:buSzPts val="1400"/>
-              <a:buFont typeface="Arial"/>
-              <a:buNone/>
-              <a:defRPr sz="8000" b="0" i="0" u="none" strike="noStrike" cap="none">
-                <a:solidFill>
-                  <a:srgbClr val="000000"/>
-                </a:solidFill>
-                <a:latin typeface="Rockwell"/>
-                <a:ea typeface="Rockwell"/>
-                <a:cs typeface="Rockwell"/>
-                <a:sym typeface="Rockwell"/>
-              </a:defRPr>
-            </a:lvl3pPr>
-            <a:lvl4pPr marR="0" lvl="3" algn="ctr" rtl="0">
-              <a:lnSpc>
-                <a:spcPct val="100000"/>
-              </a:lnSpc>
-              <a:spcBef>
-                <a:spcPts val="0"/>
-              </a:spcBef>
-              <a:spcAft>
-                <a:spcPts val="0"/>
-              </a:spcAft>
-              <a:buClr>
-                <a:srgbClr val="000000"/>
-              </a:buClr>
-              <a:buSzPts val="1400"/>
-              <a:buFont typeface="Arial"/>
-              <a:buNone/>
-              <a:defRPr sz="8000" b="0" i="0" u="none" strike="noStrike" cap="none">
-                <a:solidFill>
-                  <a:srgbClr val="000000"/>
-                </a:solidFill>
-                <a:latin typeface="Rockwell"/>
-                <a:ea typeface="Rockwell"/>
-                <a:cs typeface="Rockwell"/>
-                <a:sym typeface="Rockwell"/>
-              </a:defRPr>
-            </a:lvl4pPr>
-            <a:lvl5pPr marR="0" lvl="4" algn="ctr" rtl="0">
-              <a:lnSpc>
-                <a:spcPct val="100000"/>
-              </a:lnSpc>
-              <a:spcBef>
-                <a:spcPts val="0"/>
-              </a:spcBef>
-              <a:spcAft>
-                <a:spcPts val="0"/>
-              </a:spcAft>
-              <a:buClr>
-                <a:srgbClr val="000000"/>
-              </a:buClr>
-              <a:buSzPts val="1400"/>
-              <a:buFont typeface="Arial"/>
-              <a:buNone/>
-              <a:defRPr sz="8000" b="0" i="0" u="none" strike="noStrike" cap="none">
-                <a:solidFill>
-                  <a:srgbClr val="000000"/>
-                </a:solidFill>
-                <a:latin typeface="Rockwell"/>
-                <a:ea typeface="Rockwell"/>
-                <a:cs typeface="Rockwell"/>
-                <a:sym typeface="Rockwell"/>
-              </a:defRPr>
-            </a:lvl5pPr>
-            <a:lvl6pPr marR="0" lvl="5" algn="ctr" rtl="0">
-              <a:lnSpc>
-                <a:spcPct val="100000"/>
-              </a:lnSpc>
-              <a:spcBef>
-                <a:spcPts val="0"/>
-              </a:spcBef>
-              <a:spcAft>
-                <a:spcPts val="0"/>
-              </a:spcAft>
-              <a:buClr>
-                <a:srgbClr val="000000"/>
-              </a:buClr>
-              <a:buSzPts val="1400"/>
-              <a:buFont typeface="Arial"/>
-              <a:buNone/>
-              <a:defRPr sz="8000" b="0" i="0" u="none" strike="noStrike" cap="none">
-                <a:solidFill>
-                  <a:srgbClr val="000000"/>
-                </a:solidFill>
-                <a:latin typeface="Rockwell"/>
-                <a:ea typeface="Rockwell"/>
-                <a:cs typeface="Rockwell"/>
-                <a:sym typeface="Rockwell"/>
-              </a:defRPr>
-            </a:lvl6pPr>
-            <a:lvl7pPr marR="0" lvl="6" algn="ctr" rtl="0">
-              <a:lnSpc>
-                <a:spcPct val="100000"/>
-              </a:lnSpc>
-              <a:spcBef>
-                <a:spcPts val="0"/>
-              </a:spcBef>
-              <a:spcAft>
-                <a:spcPts val="0"/>
-              </a:spcAft>
-              <a:buClr>
-                <a:srgbClr val="000000"/>
-              </a:buClr>
-              <a:buSzPts val="1400"/>
-              <a:buFont typeface="Arial"/>
-              <a:buNone/>
-              <a:defRPr sz="8000" b="0" i="0" u="none" strike="noStrike" cap="none">
-                <a:solidFill>
-                  <a:srgbClr val="000000"/>
-                </a:solidFill>
-                <a:latin typeface="Rockwell"/>
-                <a:ea typeface="Rockwell"/>
-                <a:cs typeface="Rockwell"/>
-                <a:sym typeface="Rockwell"/>
-              </a:defRPr>
-            </a:lvl7pPr>
-            <a:lvl8pPr marR="0" lvl="7" algn="ctr" rtl="0">
-              <a:lnSpc>
-                <a:spcPct val="100000"/>
-              </a:lnSpc>
-              <a:spcBef>
-                <a:spcPts val="0"/>
-              </a:spcBef>
-              <a:spcAft>
-                <a:spcPts val="0"/>
-              </a:spcAft>
-              <a:buClr>
-                <a:srgbClr val="000000"/>
-              </a:buClr>
-              <a:buSzPts val="1400"/>
-              <a:buFont typeface="Arial"/>
-              <a:buNone/>
-              <a:defRPr sz="8000" b="0" i="0" u="none" strike="noStrike" cap="none">
-                <a:solidFill>
-                  <a:srgbClr val="000000"/>
-                </a:solidFill>
-                <a:latin typeface="Rockwell"/>
-                <a:ea typeface="Rockwell"/>
-                <a:cs typeface="Rockwell"/>
-                <a:sym typeface="Rockwell"/>
-              </a:defRPr>
-            </a:lvl8pPr>
-            <a:lvl9pPr marR="0" lvl="8" algn="ctr" rtl="0">
-              <a:lnSpc>
-                <a:spcPct val="100000"/>
-              </a:lnSpc>
-              <a:spcBef>
-                <a:spcPts val="0"/>
-              </a:spcBef>
-              <a:spcAft>
-                <a:spcPts val="0"/>
-              </a:spcAft>
-              <a:buClr>
-                <a:srgbClr val="000000"/>
-              </a:buClr>
-              <a:buSzPts val="1400"/>
-              <a:buFont typeface="Arial"/>
-              <a:buNone/>
-              <a:defRPr sz="8000" b="0" i="0" u="none" strike="noStrike" cap="none">
-                <a:solidFill>
-                  <a:srgbClr val="000000"/>
-                </a:solidFill>
-                <a:latin typeface="Rockwell"/>
-                <a:ea typeface="Rockwell"/>
-                <a:cs typeface="Rockwell"/>
-                <a:sym typeface="Rockwell"/>
-              </a:defRPr>
-            </a:lvl9pPr>
-          </a:lstStyle>
-          <a:p>
-            <a:r>
-              <a:rPr lang="en-US" dirty="0">
-                <a:solidFill>
-                  <a:schemeClr val="tx2"/>
-                </a:solidFill>
-                <a:latin typeface="+mn-lt"/>
-              </a:rPr>
-              <a:t>Depth questions</a:t>
-            </a:r>
-          </a:p>
-        </p:txBody>
-      </p:sp>
-      <p:sp>
-        <p:nvSpPr>
-          <p:cNvPr id="9" name="Rectangle 8">
-            <a:extLst>
-              <a:ext uri="{FF2B5EF4-FFF2-40B4-BE49-F238E27FC236}">
-                <a16:creationId xmlns:a16="http://schemas.microsoft.com/office/drawing/2014/main" id="{1503535E-A95D-194A-BCC3-2DC71399598E}"/>
-              </a:ext>
-            </a:extLst>
-          </p:cNvPr>
-          <p:cNvSpPr/>
-          <p:nvPr/>
-        </p:nvSpPr>
-        <p:spPr>
-          <a:xfrm>
-            <a:off x="1734112" y="3746809"/>
-            <a:ext cx="13872117" cy="2141034"/>
-          </a:xfrm>
-          <a:prstGeom prst="rect">
-            <a:avLst/>
-          </a:prstGeom>
-          <a:solidFill>
-            <a:srgbClr val="FFFF00"/>
-          </a:solidFill>
-        </p:spPr>
-        <p:style>
-          <a:lnRef idx="2">
-            <a:schemeClr val="accent1">
-              <a:shade val="50000"/>
-            </a:schemeClr>
-          </a:lnRef>
-          <a:fillRef idx="1">
-            <a:schemeClr val="accent1"/>
-          </a:fillRef>
-          <a:effectRef idx="0">
-            <a:schemeClr val="accent1"/>
-          </a:effectRef>
-          <a:fontRef idx="minor">
-            <a:schemeClr val="lt1"/>
-          </a:fontRef>
-        </p:style>
-        <p:txBody>
-          <a:bodyPr rtlCol="0" anchor="ctr"/>
-          <a:lstStyle/>
-          <a:p>
-            <a:pPr algn="ctr"/>
-            <a:r>
-              <a:rPr lang="en-US" sz="3600" b="1" dirty="0">
-                <a:solidFill>
-                  <a:schemeClr val="tx2"/>
-                </a:solidFill>
-                <a:latin typeface="+mj-lt"/>
-              </a:rPr>
-              <a:t>Use this slide if doing two structured interview assessments</a:t>
-            </a:r>
-          </a:p>
-          <a:p>
-            <a:pPr algn="ctr"/>
-            <a:endParaRPr lang="en-US" dirty="0"/>
+              <a:rPr lang="en-US" b="1" dirty="0"/>
+              <a:t>Question</a:t>
+            </a:r>
+            <a:r>
+              <a:rPr lang="en-US" dirty="0"/>
+              <a:t>: Imagine you will be attending a chief executive briefing along with a number of senior leaders from your organization. These senior leaders have more experience and tenure in the organization than you have. In addition, they hold a view that is in conflict with yours. You need the chief executive to adopt your view. How would you prepare for this meeting?</a:t>
+            </a:r>
           </a:p>
         </p:txBody>
       </p:sp>
     </p:spTree>
     <p:extLst>
       <p:ext uri="{BB962C8B-B14F-4D97-AF65-F5344CB8AC3E}">
-        <p14:creationId xmlns:p14="http://schemas.microsoft.com/office/powerpoint/2010/main" val="1075016947"/>
+        <p14:creationId xmlns:p14="http://schemas.microsoft.com/office/powerpoint/2010/main" val="1533237504"/>
       </p:ext>
     </p:extLst>
   </p:cSld>
@@ -12486,110 +12330,6 @@
           <a:p>
             <a:r>
               <a:rPr lang="en-US" dirty="0"/>
-              <a:t>Example Breadth Question – Stakeholder Engagement Competency</a:t>
-            </a:r>
-          </a:p>
-        </p:txBody>
-      </p:sp>
-      <p:sp>
-        <p:nvSpPr>
-          <p:cNvPr id="3" name="Text Placeholder 2">
-            <a:extLst>
-              <a:ext uri="{FF2B5EF4-FFF2-40B4-BE49-F238E27FC236}">
-                <a16:creationId xmlns:a16="http://schemas.microsoft.com/office/drawing/2014/main" id="{D6A4DA58-3293-B044-90E9-FC07DFF20EF1}"/>
-              </a:ext>
-            </a:extLst>
-          </p:cNvPr>
-          <p:cNvSpPr>
-            <a:spLocks noGrp="1"/>
-          </p:cNvSpPr>
-          <p:nvPr>
-            <p:ph type="body" idx="1"/>
-          </p:nvPr>
-        </p:nvSpPr>
-        <p:spPr>
-          <a:xfrm>
-            <a:off x="1192143" y="1841500"/>
-            <a:ext cx="14956057" cy="7392802"/>
-          </a:xfrm>
-          <a:noFill/>
-          <a:ln>
-            <a:noFill/>
-          </a:ln>
-        </p:spPr>
-        <p:txBody>
-          <a:bodyPr spcFirstLastPara="1" wrap="square" lIns="0" tIns="0" rIns="0" bIns="0" anchor="t" anchorCtr="0">
-            <a:normAutofit/>
-          </a:bodyPr>
-          <a:lstStyle/>
-          <a:p>
-            <a:pPr marL="171467" indent="0">
-              <a:buNone/>
-            </a:pPr>
-            <a:r>
-              <a:rPr lang="en-US" b="1" dirty="0"/>
-              <a:t>Question</a:t>
-            </a:r>
-            <a:r>
-              <a:rPr lang="en-US" dirty="0"/>
-              <a:t>: Imagine you will be attending a chief executive briefing along with a number of senior leaders from your organization. These senior leaders have more experience and tenure in the organization than you have. In addition, they hold a view that is in conflict with yours. You need the chief executive to adopt your view. How would you prepare for this meeting?</a:t>
-            </a:r>
-          </a:p>
-        </p:txBody>
-      </p:sp>
-    </p:spTree>
-    <p:extLst>
-      <p:ext uri="{BB962C8B-B14F-4D97-AF65-F5344CB8AC3E}">
-        <p14:creationId xmlns:p14="http://schemas.microsoft.com/office/powerpoint/2010/main" val="1533237504"/>
-      </p:ext>
-    </p:extLst>
-  </p:cSld>
-  <p:clrMapOvr>
-    <a:masterClrMapping/>
-  </p:clrMapOvr>
-</p:sld>
-</file>
-
-<file path=ppt/slides/slide32.xml><?xml version="1.0" encoding="utf-8"?>
-<p:sld xmlns:a="http://schemas.openxmlformats.org/drawingml/2006/main" xmlns:r="http://schemas.openxmlformats.org/officeDocument/2006/relationships" xmlns:p="http://schemas.openxmlformats.org/presentationml/2006/main">
-  <p:cSld>
-    <p:spTree>
-      <p:nvGrpSpPr>
-        <p:cNvPr id="1" name=""/>
-        <p:cNvGrpSpPr/>
-        <p:nvPr/>
-      </p:nvGrpSpPr>
-      <p:grpSpPr>
-        <a:xfrm>
-          <a:off x="0" y="0"/>
-          <a:ext cx="0" cy="0"/>
-          <a:chOff x="0" y="0"/>
-          <a:chExt cx="0" cy="0"/>
-        </a:xfrm>
-      </p:grpSpPr>
-      <p:sp>
-        <p:nvSpPr>
-          <p:cNvPr id="2" name="Title 1">
-            <a:extLst>
-              <a:ext uri="{FF2B5EF4-FFF2-40B4-BE49-F238E27FC236}">
-                <a16:creationId xmlns:a16="http://schemas.microsoft.com/office/drawing/2014/main" id="{D4E4C047-701E-6045-A204-2E9F55292620}"/>
-              </a:ext>
-            </a:extLst>
-          </p:cNvPr>
-          <p:cNvSpPr>
-            <a:spLocks noGrp="1"/>
-          </p:cNvSpPr>
-          <p:nvPr>
-            <p:ph type="title"/>
-          </p:nvPr>
-        </p:nvSpPr>
-        <p:spPr/>
-        <p:txBody>
-          <a:bodyPr/>
-          <a:lstStyle/>
-          <a:p>
-            <a:r>
-              <a:rPr lang="en-US" dirty="0"/>
               <a:t>Example Depth Question – Stakeholder Engagement Competency</a:t>
             </a:r>
           </a:p>
@@ -12690,7 +12430,7 @@
 </p:sld>
 </file>
 
-<file path=ppt/slides/slide33.xml><?xml version="1.0" encoding="utf-8"?>
+<file path=ppt/slides/slide32.xml><?xml version="1.0" encoding="utf-8"?>
 <p:sld xmlns:a="http://schemas.openxmlformats.org/drawingml/2006/main" xmlns:r="http://schemas.openxmlformats.org/officeDocument/2006/relationships" xmlns:p="http://schemas.openxmlformats.org/presentationml/2006/main">
   <p:cSld>
     <p:spTree>
@@ -12812,7 +12552,7 @@
 </p:sld>
 </file>
 
-<file path=ppt/slides/slide34.xml><?xml version="1.0" encoding="utf-8"?>
+<file path=ppt/slides/slide33.xml><?xml version="1.0" encoding="utf-8"?>
 <p:sld xmlns:a="http://schemas.openxmlformats.org/drawingml/2006/main" xmlns:r="http://schemas.openxmlformats.org/officeDocument/2006/relationships" xmlns:p="http://schemas.openxmlformats.org/presentationml/2006/main">
   <p:cSld>
     <p:spTree>
@@ -12870,7 +12610,7 @@
 </p:sld>
 </file>
 
-<file path=ppt/slides/slide35.xml><?xml version="1.0" encoding="utf-8"?>
+<file path=ppt/slides/slide34.xml><?xml version="1.0" encoding="utf-8"?>
 <p:sld xmlns:a="http://schemas.openxmlformats.org/drawingml/2006/main" xmlns:r="http://schemas.openxmlformats.org/officeDocument/2006/relationships" xmlns:p="http://schemas.openxmlformats.org/presentationml/2006/main" show="0">
   <p:cSld>
     <p:spTree>
@@ -13003,7 +12743,7 @@
 </p:sld>
 </file>
 
-<file path=ppt/slides/slide36.xml><?xml version="1.0" encoding="utf-8"?>
+<file path=ppt/slides/slide35.xml><?xml version="1.0" encoding="utf-8"?>
 <p:sld xmlns:a="http://schemas.openxmlformats.org/drawingml/2006/main" xmlns:r="http://schemas.openxmlformats.org/officeDocument/2006/relationships" xmlns:p="http://schemas.openxmlformats.org/presentationml/2006/main" show="0">
   <p:cSld>
     <p:spTree>

</xml_diff>

<commit_message>
update from Carlene's comments
</commit_message>
<xml_diff>
--- a/toolkit/job-analysis/job-analysis-presentation.pptx
+++ b/toolkit/job-analysis/job-analysis-presentation.pptx
@@ -81,14 +81,14 @@
       <p:boldItalic r:id="rId62"/>
     </p:embeddedFont>
     <p:embeddedFont>
-      <p:font typeface="Merriweather" pitchFamily="2" charset="77"/>
+      <p:font typeface="Merriweather" panose="02060503050406030704" pitchFamily="18" charset="0"/>
       <p:regular r:id="rId63"/>
       <p:bold r:id="rId64"/>
       <p:italic r:id="rId65"/>
       <p:boldItalic r:id="rId66"/>
     </p:embeddedFont>
     <p:embeddedFont>
-      <p:font typeface="Merriweather Sans" pitchFamily="2" charset="77"/>
+      <p:font typeface="Merriweather Sans" panose="02060503050406030704" pitchFamily="18" charset="0"/>
       <p:regular r:id="rId67"/>
       <p:bold r:id="rId68"/>
       <p:italic r:id="rId69"/>
@@ -102,14 +102,14 @@
       <p:boldItalic r:id="rId74"/>
     </p:embeddedFont>
     <p:embeddedFont>
-      <p:font typeface="Source Sans Pro" panose="020B0503030403020204" pitchFamily="34" charset="0"/>
+      <p:font typeface="Source Sans Pro" panose="020B0503030403020204" pitchFamily="34" charset="77"/>
       <p:regular r:id="rId75"/>
       <p:bold r:id="rId76"/>
       <p:italic r:id="rId77"/>
       <p:boldItalic r:id="rId78"/>
     </p:embeddedFont>
     <p:embeddedFont>
-      <p:font typeface="Source Sans Pro SemiBold" panose="020B0603030403020204" pitchFamily="34" charset="0"/>
+      <p:font typeface="Source Sans Pro SemiBold" panose="020B0503030403020204" pitchFamily="34" charset="77"/>
       <p:bold r:id="rId79"/>
       <p:boldItalic r:id="rId80"/>
     </p:embeddedFont>
@@ -471,7 +471,7 @@
           <a:p>
             <a:fld id="{5F1244B9-655E-9143-8F11-143B7EBD7CDE}" type="datetimeFigureOut">
               <a:rPr lang="en-US" smtClean="0"/>
-              <a:t>7/6/21</a:t>
+              <a:t>8/27/21</a:t>
             </a:fld>
             <a:endParaRPr lang="en-US"/>
           </a:p>
@@ -3034,10 +3034,20 @@
                 <a:cs typeface="Merriweather Sans"/>
                 <a:sym typeface="Merriweather Sans"/>
               </a:rPr>
-              <a:t>First, you develop the materials from the overall Job Analysis Workshop. Then the job announcement is posted and applicants apply. Once applicants apply, then SMEs will review applicants through resume review and assessments. The cert will be created only after this assessment, ensuring that only candidates who are qualified make it onto the hiring cert. </a:t>
-            </a:r>
-          </a:p>
-          <a:p>
+              <a:t>First, you develop the materials from the overall Job Analysis Workshop. Then the job announcement is posted and applicants apply. Once applicants apply, then SMEs will review applicants through resume review and assessments. Only after this assessment are veteran preference requirements applied and the cert(s) created.  This better ensures certification of qualified candidates.</a:t>
+            </a:r>
+            <a:br>
+              <a:rPr lang="en-US" sz="2200" b="0" i="0" u="none" strike="noStrike" cap="none" dirty="0">
+                <a:solidFill>
+                  <a:srgbClr val="000000"/>
+                </a:solidFill>
+                <a:effectLst/>
+                <a:latin typeface="Merriweather Sans"/>
+                <a:ea typeface="Merriweather Sans"/>
+                <a:cs typeface="Merriweather Sans"/>
+                <a:sym typeface="Merriweather Sans"/>
+              </a:rPr>
+            </a:br>
             <a:endParaRPr lang="en-US" sz="2200" b="0" i="0" u="none" strike="noStrike" cap="none" dirty="0">
               <a:solidFill>
                 <a:srgbClr val="000000"/>
@@ -6071,7 +6081,7 @@
                 <a:cs typeface="Merriweather Sans"/>
                 <a:sym typeface="Merriweather Sans"/>
               </a:rPr>
-              <a:t>Because SME-QA is time-intensive for SMEs, we reduced their participation burden by limiting the number of resume pages they review, including only one SME per structured phone interview, and minimizing the length of justification for every cut.  In addition, applicants who do not receive a passing score in the first interview do not proceed to the second interview.</a:t>
+              <a:t>Because SME-QA is time-intensive for SMEs, we reduced their participation burden by limiting the number of resume pages they review, including only one SME per assessment, and minimizing the length of justification for every cut.  In addition, applicants who do not receive a passing score in the first interview do not proceed to the second interview.</a:t>
             </a:r>
           </a:p>
           <a:p>
@@ -6449,7 +6459,7 @@
                 <a:cs typeface="Merriweather Sans"/>
                 <a:sym typeface="Merriweather Sans"/>
               </a:rPr>
-              <a:t>Interviews:</a:t>
+              <a:t>Assessments:</a:t>
             </a:r>
             <a:r>
               <a:rPr lang="en-US" sz="2400" b="0" i="0" u="none" strike="noStrike" cap="none" dirty="0">
@@ -6462,7 +6472,7 @@
                 <a:cs typeface="Merriweather Sans"/>
                 <a:sym typeface="Merriweather Sans"/>
               </a:rPr>
-              <a:t> Before beginning interviews, HR conducts a required 2-hour training with SMEs to practice the structured interview script.</a:t>
+              <a:t> Before beginning assessments, such as interviews, HR conducts a required 2-hour training with SMEs to practice the structured interview script.</a:t>
             </a:r>
           </a:p>
           <a:p>
@@ -6642,7 +6652,7 @@
                 <a:cs typeface="Merriweather Sans"/>
                 <a:sym typeface="Merriweather Sans"/>
               </a:rPr>
-              <a:t>Any disabled veteran who is minimally qualified will float to the top of the best qualified list. Hiring managers must consider them before any other applicant.</a:t>
+              <a:t>Any CPS or CP veteran who is minimally qualified will float to the top of the best qualified list. Hiring managers must consider them before any other applicant. (except for scientific or professional positions at the GS-9 level or higher).</a:t>
             </a:r>
           </a:p>
           <a:p>
@@ -6869,7 +6879,7 @@
                 <a:cs typeface="Arial"/>
                 <a:sym typeface="Arial"/>
               </a:rPr>
-              <a:t>This process allows you to set the qualifications for the role you are hiring for, ensuring that you can find and hire applicants that are fully qualified</a:t>
+              <a:t>This process allows you to set the qualifications for the role you are hiring for, ensuring that you can find and hire applicants that are truly qualified</a:t>
             </a:r>
             <a:endParaRPr sz="1100" dirty="0">
               <a:latin typeface="Arial"/>
@@ -14420,13 +14430,6 @@
             </a:pPr>
             <a:r>
               <a:rPr lang="en-US" dirty="0"/>
-              <a:t>Decide which assessment(s) to use for each competency: </a:t>
-            </a:r>
-          </a:p>
-          <a:p>
-            <a:pPr lvl="1"/>
-            <a:r>
-              <a:rPr lang="en-US" dirty="0"/>
               <a:t>Work Sample </a:t>
             </a:r>
           </a:p>
@@ -14436,7 +14439,7 @@
             </a:pPr>
             <a:r>
               <a:rPr lang="en-US" dirty="0"/>
-              <a:t>+ You’d ask applicants to provide a sample of past work, such as a portfolio submitted along with a resume</a:t>
+              <a:t>+ You’d ask applicants to provide a sample of past work at the time of application, such as a portfolio submitted along with a resume</a:t>
             </a:r>
           </a:p>
           <a:p>
@@ -14445,7 +14448,7 @@
             </a:pPr>
             <a:r>
               <a:rPr lang="en-US" dirty="0"/>
-              <a:t>+ Can help screen out unqualified applicants before a more timely assessment. </a:t>
+              <a:t>+ Can help screen out unqualified applicants before a more time-consuming assessment. </a:t>
             </a:r>
           </a:p>
         </p:txBody>
@@ -14536,18 +14539,7 @@
             </a:pPr>
             <a:r>
               <a:rPr lang="en-US" dirty="0"/>
-              <a:t>Decide which assessment(s) to use for each competency: </a:t>
-            </a:r>
-          </a:p>
-          <a:p>
-            <a:pPr lvl="1"/>
-            <a:r>
-              <a:rPr lang="en-US" dirty="0" err="1"/>
-              <a:t>USAHire</a:t>
-            </a:r>
-            <a:r>
-              <a:rPr lang="en-US" dirty="0"/>
-              <a:t> assessments </a:t>
+              <a:t>USAHire assessments </a:t>
             </a:r>
           </a:p>
           <a:p>
@@ -14899,13 +14891,7 @@
             </a:pPr>
             <a:r>
               <a:rPr lang="en-US" dirty="0"/>
-              <a:t>Decide which assessment(s) to use for each competency: </a:t>
-            </a:r>
-          </a:p>
-          <a:p>
-            <a:r>
-              <a:rPr lang="en-US" dirty="0"/>
-              <a:t>After resume review, or after they apply, we can send applicants a written prompt to complete: </a:t>
+              <a:t>Sending applicants a written prompt to complete: </a:t>
             </a:r>
           </a:p>
           <a:p>
@@ -14914,7 +14900,7 @@
             </a:pPr>
             <a:r>
               <a:rPr lang="en-US" dirty="0"/>
-              <a:t>    + Period of time allowed can range from an hour to a wee</a:t>
+              <a:t>    + Period of time allowed can range from an hour to a week</a:t>
             </a:r>
           </a:p>
           <a:p>
@@ -15018,13 +15004,6 @@
             <a:pPr marL="171467" indent="0">
               <a:buNone/>
             </a:pPr>
-            <a:r>
-              <a:rPr lang="en-US" dirty="0"/>
-              <a:t>Decide which assessment(s) to use for each competency: </a:t>
-            </a:r>
-          </a:p>
-          <a:p>
-            <a:pPr lvl="1"/>
             <a:r>
               <a:rPr lang="en-US" dirty="0"/>
               <a:t>Structured Phone Interview</a:t>

</xml_diff>